<commit_message>
replace R contents 25-30th
</commit_message>
<xml_diff>
--- a/R/スライド/第28回.pptx
+++ b/R/スライド/第28回.pptx
@@ -8,15 +8,15 @@
     <p:notesMasterId r:id="rId11"/>
   </p:notesMasterIdLst>
   <p:sldIdLst>
-    <p:sldId id="257" r:id="rId2"/>
-    <p:sldId id="265" r:id="rId3"/>
-    <p:sldId id="289" r:id="rId4"/>
-    <p:sldId id="288" r:id="rId5"/>
-    <p:sldId id="290" r:id="rId6"/>
-    <p:sldId id="292" r:id="rId7"/>
-    <p:sldId id="291" r:id="rId8"/>
-    <p:sldId id="293" r:id="rId9"/>
-    <p:sldId id="294" r:id="rId10"/>
+    <p:sldId id="256" r:id="rId2"/>
+    <p:sldId id="257" r:id="rId3"/>
+    <p:sldId id="263" r:id="rId4"/>
+    <p:sldId id="267" r:id="rId5"/>
+    <p:sldId id="258" r:id="rId6"/>
+    <p:sldId id="259" r:id="rId7"/>
+    <p:sldId id="261" r:id="rId8"/>
+    <p:sldId id="260" r:id="rId9"/>
+    <p:sldId id="262" r:id="rId10"/>
   </p:sldIdLst>
   <p:sldSz cx="12192000" cy="6858000"/>
   <p:notesSz cx="6858000" cy="9144000"/>
@@ -123,335 +123,239 @@
 </p:presentation>
 </file>
 
-<file path=ppt/revisionInfo.xml><?xml version="1.0" encoding="utf-8"?>
-<p1510:revInfo xmlns:a="http://schemas.openxmlformats.org/drawingml/2006/main" xmlns:r="http://schemas.openxmlformats.org/officeDocument/2006/relationships" xmlns:p1510="http://schemas.microsoft.com/office/powerpoint/2015/10/main">
-  <p1510:revLst>
-    <p1510:client id="{2861F9EA-F600-654F-8E46-7B02198CA6B6}" v="2" dt="2021-11-25T05:58:44.762"/>
-  </p1510:revLst>
-</p1510:revInfo>
-</file>
-
 <file path=ppt/changesInfos/changesInfo1.xml><?xml version="1.0" encoding="utf-8"?>
 <pc:chgInfo xmlns:a="http://schemas.openxmlformats.org/drawingml/2006/main" xmlns:r="http://schemas.openxmlformats.org/officeDocument/2006/relationships" xmlns:ac="http://schemas.microsoft.com/office/drawing/2013/main/command" xmlns:pc="http://schemas.microsoft.com/office/powerpoint/2013/main/command">
   <pc:docChgLst>
-    <pc:chgData name="Fukui Shin" userId="6902ee70c48ce296" providerId="LiveId" clId="{2AFD377D-6132-EA45-8360-9CF58E3B0902}"/>
-    <pc:docChg chg="undo custSel modSld">
-      <pc:chgData name="Fukui Shin" userId="6902ee70c48ce296" providerId="LiveId" clId="{2AFD377D-6132-EA45-8360-9CF58E3B0902}" dt="2021-11-17T02:35:44.721" v="1239" actId="14100"/>
-      <pc:docMkLst>
-        <pc:docMk/>
-      </pc:docMkLst>
-      <pc:sldChg chg="addSp delSp modSp mod">
-        <pc:chgData name="Fukui Shin" userId="6902ee70c48ce296" providerId="LiveId" clId="{2AFD377D-6132-EA45-8360-9CF58E3B0902}" dt="2021-11-17T02:35:44.721" v="1239" actId="14100"/>
-        <pc:sldMkLst>
-          <pc:docMk/>
-          <pc:sldMk cId="2595786992" sldId="290"/>
-        </pc:sldMkLst>
-        <pc:spChg chg="mod">
-          <ac:chgData name="Fukui Shin" userId="6902ee70c48ce296" providerId="LiveId" clId="{2AFD377D-6132-EA45-8360-9CF58E3B0902}" dt="2021-11-08T02:21:43.441" v="11" actId="20577"/>
-          <ac:spMkLst>
-            <pc:docMk/>
-            <pc:sldMk cId="2595786992" sldId="290"/>
-            <ac:spMk id="2" creationId="{52AC1BEC-2208-B441-A40B-CE42D1E9F678}"/>
-          </ac:spMkLst>
-        </pc:spChg>
-        <pc:spChg chg="mod">
-          <ac:chgData name="Fukui Shin" userId="6902ee70c48ce296" providerId="LiveId" clId="{2AFD377D-6132-EA45-8360-9CF58E3B0902}" dt="2021-11-08T04:14:11.966" v="859" actId="20577"/>
-          <ac:spMkLst>
-            <pc:docMk/>
-            <pc:sldMk cId="2595786992" sldId="290"/>
-            <ac:spMk id="3" creationId="{92857569-606C-B048-BBF1-17179C8C8C9A}"/>
-          </ac:spMkLst>
-        </pc:spChg>
-        <pc:spChg chg="add mod">
-          <ac:chgData name="Fukui Shin" userId="6902ee70c48ce296" providerId="LiveId" clId="{2AFD377D-6132-EA45-8360-9CF58E3B0902}" dt="2021-11-17T02:35:44.721" v="1239" actId="14100"/>
-          <ac:spMkLst>
-            <pc:docMk/>
-            <pc:sldMk cId="2595786992" sldId="290"/>
-            <ac:spMk id="10" creationId="{7920EEB4-9D5C-CE4E-8585-350A37871857}"/>
-          </ac:spMkLst>
-        </pc:spChg>
-        <pc:spChg chg="add mod">
-          <ac:chgData name="Fukui Shin" userId="6902ee70c48ce296" providerId="LiveId" clId="{2AFD377D-6132-EA45-8360-9CF58E3B0902}" dt="2021-11-17T02:33:02.165" v="1185" actId="1076"/>
-          <ac:spMkLst>
-            <pc:docMk/>
-            <pc:sldMk cId="2595786992" sldId="290"/>
-            <ac:spMk id="11" creationId="{ECB93667-65E8-7C48-8CED-C905124DF10C}"/>
-          </ac:spMkLst>
-        </pc:spChg>
-        <pc:spChg chg="add mod">
-          <ac:chgData name="Fukui Shin" userId="6902ee70c48ce296" providerId="LiveId" clId="{2AFD377D-6132-EA45-8360-9CF58E3B0902}" dt="2021-11-17T02:32:51.119" v="1183" actId="1076"/>
-          <ac:spMkLst>
-            <pc:docMk/>
-            <pc:sldMk cId="2595786992" sldId="290"/>
-            <ac:spMk id="13" creationId="{368B959A-8D30-504B-90C8-34EBA867A279}"/>
-          </ac:spMkLst>
-        </pc:spChg>
-        <pc:spChg chg="add mod">
-          <ac:chgData name="Fukui Shin" userId="6902ee70c48ce296" providerId="LiveId" clId="{2AFD377D-6132-EA45-8360-9CF58E3B0902}" dt="2021-11-17T02:34:30.408" v="1218" actId="688"/>
-          <ac:spMkLst>
-            <pc:docMk/>
-            <pc:sldMk cId="2595786992" sldId="290"/>
-            <ac:spMk id="14" creationId="{D7AEE5E8-9EF9-B44C-870D-0A7459F4E6A7}"/>
-          </ac:spMkLst>
-        </pc:spChg>
-        <pc:spChg chg="add del mod">
-          <ac:chgData name="Fukui Shin" userId="6902ee70c48ce296" providerId="LiveId" clId="{2AFD377D-6132-EA45-8360-9CF58E3B0902}" dt="2021-11-17T02:29:44.731" v="1028" actId="478"/>
-          <ac:spMkLst>
-            <pc:docMk/>
-            <pc:sldMk cId="2595786992" sldId="290"/>
-            <ac:spMk id="17" creationId="{FB569276-9D66-E14A-923B-649BF9748222}"/>
-          </ac:spMkLst>
-        </pc:spChg>
-        <pc:spChg chg="add mod">
-          <ac:chgData name="Fukui Shin" userId="6902ee70c48ce296" providerId="LiveId" clId="{2AFD377D-6132-EA45-8360-9CF58E3B0902}" dt="2021-11-17T02:33:29.696" v="1189" actId="1076"/>
-          <ac:spMkLst>
-            <pc:docMk/>
-            <pc:sldMk cId="2595786992" sldId="290"/>
-            <ac:spMk id="20" creationId="{4412D54C-E400-A348-9C5D-B9099C670194}"/>
-          </ac:spMkLst>
-        </pc:spChg>
-        <pc:spChg chg="add mod">
-          <ac:chgData name="Fukui Shin" userId="6902ee70c48ce296" providerId="LiveId" clId="{2AFD377D-6132-EA45-8360-9CF58E3B0902}" dt="2021-11-17T02:35:35.128" v="1238" actId="114"/>
-          <ac:spMkLst>
-            <pc:docMk/>
-            <pc:sldMk cId="2595786992" sldId="290"/>
-            <ac:spMk id="25" creationId="{3CC48E9A-D2AF-5A4C-8E75-252BE744E3E9}"/>
-          </ac:spMkLst>
-        </pc:spChg>
-        <pc:cxnChg chg="add mod">
-          <ac:chgData name="Fukui Shin" userId="6902ee70c48ce296" providerId="LiveId" clId="{2AFD377D-6132-EA45-8360-9CF58E3B0902}" dt="2021-11-17T02:28:25.501" v="1022" actId="1076"/>
-          <ac:cxnSpMkLst>
-            <pc:docMk/>
-            <pc:sldMk cId="2595786992" sldId="290"/>
-            <ac:cxnSpMk id="5" creationId="{A06420D0-0E8A-A84B-A1DB-06629A992E59}"/>
-          </ac:cxnSpMkLst>
-        </pc:cxnChg>
-        <pc:cxnChg chg="add del mod">
-          <ac:chgData name="Fukui Shin" userId="6902ee70c48ce296" providerId="LiveId" clId="{2AFD377D-6132-EA45-8360-9CF58E3B0902}" dt="2021-11-17T02:29:42.571" v="1027" actId="478"/>
-          <ac:cxnSpMkLst>
-            <pc:docMk/>
-            <pc:sldMk cId="2595786992" sldId="290"/>
-            <ac:cxnSpMk id="6" creationId="{7CFB65BD-4421-1C4D-BA42-93FA57B45D06}"/>
-          </ac:cxnSpMkLst>
-        </pc:cxnChg>
-        <pc:cxnChg chg="add mod">
-          <ac:chgData name="Fukui Shin" userId="6902ee70c48ce296" providerId="LiveId" clId="{2AFD377D-6132-EA45-8360-9CF58E3B0902}" dt="2021-11-17T02:33:06.081" v="1186" actId="692"/>
-          <ac:cxnSpMkLst>
-            <pc:docMk/>
-            <pc:sldMk cId="2595786992" sldId="290"/>
-            <ac:cxnSpMk id="7" creationId="{30494F45-918C-D745-9577-5C9B611146D9}"/>
-          </ac:cxnSpMkLst>
-        </pc:cxnChg>
-        <pc:cxnChg chg="add mod">
-          <ac:chgData name="Fukui Shin" userId="6902ee70c48ce296" providerId="LiveId" clId="{2AFD377D-6132-EA45-8360-9CF58E3B0902}" dt="2021-11-17T02:32:54.996" v="1184" actId="692"/>
-          <ac:cxnSpMkLst>
-            <pc:docMk/>
-            <pc:sldMk cId="2595786992" sldId="290"/>
-            <ac:cxnSpMk id="9" creationId="{3B6EF299-2EAB-5043-8E41-B77B9661678A}"/>
-          </ac:cxnSpMkLst>
-        </pc:cxnChg>
-        <pc:cxnChg chg="add mod">
-          <ac:chgData name="Fukui Shin" userId="6902ee70c48ce296" providerId="LiveId" clId="{2AFD377D-6132-EA45-8360-9CF58E3B0902}" dt="2021-11-17T02:28:25.501" v="1022" actId="1076"/>
-          <ac:cxnSpMkLst>
-            <pc:docMk/>
-            <pc:sldMk cId="2595786992" sldId="290"/>
-            <ac:cxnSpMk id="15" creationId="{9D9F5C4D-934E-3445-9A13-71AE8417AC32}"/>
-          </ac:cxnSpMkLst>
-        </pc:cxnChg>
-        <pc:cxnChg chg="add mod">
-          <ac:chgData name="Fukui Shin" userId="6902ee70c48ce296" providerId="LiveId" clId="{2AFD377D-6132-EA45-8360-9CF58E3B0902}" dt="2021-11-17T02:33:33.348" v="1190" actId="14100"/>
-          <ac:cxnSpMkLst>
-            <pc:docMk/>
-            <pc:sldMk cId="2595786992" sldId="290"/>
-            <ac:cxnSpMk id="18" creationId="{F9732587-A468-434C-9594-9C3FAAD00357}"/>
-          </ac:cxnSpMkLst>
-        </pc:cxnChg>
-        <pc:cxnChg chg="add mod">
-          <ac:chgData name="Fukui Shin" userId="6902ee70c48ce296" providerId="LiveId" clId="{2AFD377D-6132-EA45-8360-9CF58E3B0902}" dt="2021-11-17T02:32:37.415" v="1182" actId="692"/>
-          <ac:cxnSpMkLst>
-            <pc:docMk/>
-            <pc:sldMk cId="2595786992" sldId="290"/>
-            <ac:cxnSpMk id="21" creationId="{A29A8BBB-E9AB-C84F-B76C-D85219AB31B3}"/>
-          </ac:cxnSpMkLst>
-        </pc:cxnChg>
-      </pc:sldChg>
-      <pc:sldChg chg="addSp delSp modSp mod">
-        <pc:chgData name="Fukui Shin" userId="6902ee70c48ce296" providerId="LiveId" clId="{2AFD377D-6132-EA45-8360-9CF58E3B0902}" dt="2021-11-17T02:20:49.278" v="865" actId="1076"/>
-        <pc:sldMkLst>
-          <pc:docMk/>
-          <pc:sldMk cId="508955002" sldId="291"/>
-        </pc:sldMkLst>
-        <pc:picChg chg="del">
-          <ac:chgData name="Fukui Shin" userId="6902ee70c48ce296" providerId="LiveId" clId="{2AFD377D-6132-EA45-8360-9CF58E3B0902}" dt="2021-11-17T02:20:32.538" v="860" actId="478"/>
-          <ac:picMkLst>
-            <pc:docMk/>
-            <pc:sldMk cId="508955002" sldId="291"/>
-            <ac:picMk id="5" creationId="{99D7514B-7388-6B47-B318-1E894D5946D1}"/>
-          </ac:picMkLst>
-        </pc:picChg>
-        <pc:picChg chg="add mod">
-          <ac:chgData name="Fukui Shin" userId="6902ee70c48ce296" providerId="LiveId" clId="{2AFD377D-6132-EA45-8360-9CF58E3B0902}" dt="2021-11-17T02:20:49.278" v="865" actId="1076"/>
-          <ac:picMkLst>
-            <pc:docMk/>
-            <pc:sldMk cId="508955002" sldId="291"/>
-            <ac:picMk id="6" creationId="{6FC85373-0AA5-554D-A4F9-18721FB1EC9F}"/>
-          </ac:picMkLst>
-        </pc:picChg>
-      </pc:sldChg>
-    </pc:docChg>
-  </pc:docChgLst>
-  <pc:docChgLst>
-    <pc:chgData name="Fukui Shin" userId="6902ee70c48ce296" providerId="LiveId" clId="{2861F9EA-F600-654F-8E46-7B02198CA6B6}"/>
-    <pc:docChg chg="undo custSel modSld">
-      <pc:chgData name="Fukui Shin" userId="6902ee70c48ce296" providerId="LiveId" clId="{2861F9EA-F600-654F-8E46-7B02198CA6B6}" dt="2021-11-25T07:16:06.789" v="638" actId="14100"/>
+    <pc:chgData name="Fukui Shin" userId="6902ee70c48ce296" providerId="LiveId" clId="{3563161F-D15E-4A4A-B8D2-4F599856B73C}"/>
+    <pc:docChg chg="undo redo custSel addSld delSld modSld">
+      <pc:chgData name="Fukui Shin" userId="6902ee70c48ce296" providerId="LiveId" clId="{3563161F-D15E-4A4A-B8D2-4F599856B73C}" dt="2021-11-22T06:10:02.338" v="4355" actId="20577"/>
       <pc:docMkLst>
         <pc:docMk/>
       </pc:docMkLst>
       <pc:sldChg chg="modSp mod">
-        <pc:chgData name="Fukui Shin" userId="6902ee70c48ce296" providerId="LiveId" clId="{2861F9EA-F600-654F-8E46-7B02198CA6B6}" dt="2021-11-24T15:18:25.750" v="3" actId="20577"/>
+        <pc:chgData name="Fukui Shin" userId="6902ee70c48ce296" providerId="LiveId" clId="{3563161F-D15E-4A4A-B8D2-4F599856B73C}" dt="2021-11-17T14:54:59.137" v="4018" actId="20577"/>
         <pc:sldMkLst>
           <pc:docMk/>
-          <pc:sldMk cId="2432279440" sldId="257"/>
+          <pc:sldMk cId="571653398" sldId="257"/>
         </pc:sldMkLst>
         <pc:spChg chg="mod">
-          <ac:chgData name="Fukui Shin" userId="6902ee70c48ce296" providerId="LiveId" clId="{2861F9EA-F600-654F-8E46-7B02198CA6B6}" dt="2021-11-24T15:18:25.750" v="3" actId="20577"/>
+          <ac:chgData name="Fukui Shin" userId="6902ee70c48ce296" providerId="LiveId" clId="{3563161F-D15E-4A4A-B8D2-4F599856B73C}" dt="2021-11-15T04:46:05.370" v="26" actId="20577"/>
           <ac:spMkLst>
             <pc:docMk/>
-            <pc:sldMk cId="2432279440" sldId="257"/>
-            <ac:spMk id="2" creationId="{9B1D7A41-B18F-4D4C-9F52-84D5CFFFCB44}"/>
+            <pc:sldMk cId="571653398" sldId="257"/>
+            <ac:spMk id="2" creationId="{7EEF70A2-80E1-5D42-B09A-7B3C2212747A}"/>
+          </ac:spMkLst>
+        </pc:spChg>
+        <pc:spChg chg="mod">
+          <ac:chgData name="Fukui Shin" userId="6902ee70c48ce296" providerId="LiveId" clId="{3563161F-D15E-4A4A-B8D2-4F599856B73C}" dt="2021-11-17T14:54:59.137" v="4018" actId="20577"/>
+          <ac:spMkLst>
+            <pc:docMk/>
+            <pc:sldMk cId="571653398" sldId="257"/>
+            <ac:spMk id="3" creationId="{A186CAFC-0030-2E49-8268-A98CF64FBA05}"/>
           </ac:spMkLst>
         </pc:spChg>
       </pc:sldChg>
-      <pc:sldChg chg="modSp mod">
-        <pc:chgData name="Fukui Shin" userId="6902ee70c48ce296" providerId="LiveId" clId="{2861F9EA-F600-654F-8E46-7B02198CA6B6}" dt="2021-11-25T07:16:06.789" v="638" actId="14100"/>
+      <pc:sldChg chg="modSp new mod">
+        <pc:chgData name="Fukui Shin" userId="6902ee70c48ce296" providerId="LiveId" clId="{3563161F-D15E-4A4A-B8D2-4F599856B73C}" dt="2021-11-17T14:57:59.362" v="4052" actId="20577"/>
         <pc:sldMkLst>
           <pc:docMk/>
-          <pc:sldMk cId="2393039641" sldId="293"/>
+          <pc:sldMk cId="1216965000" sldId="258"/>
         </pc:sldMkLst>
         <pc:spChg chg="mod">
-          <ac:chgData name="Fukui Shin" userId="6902ee70c48ce296" providerId="LiveId" clId="{2861F9EA-F600-654F-8E46-7B02198CA6B6}" dt="2021-11-25T07:16:06.789" v="638" actId="14100"/>
+          <ac:chgData name="Fukui Shin" userId="6902ee70c48ce296" providerId="LiveId" clId="{3563161F-D15E-4A4A-B8D2-4F599856B73C}" dt="2021-11-17T08:47:26.749" v="1585" actId="20577"/>
           <ac:spMkLst>
             <pc:docMk/>
-            <pc:sldMk cId="2393039641" sldId="293"/>
-            <ac:spMk id="3" creationId="{5D454D60-38A7-4B4C-8C5C-FFAC1D198DE6}"/>
+            <pc:sldMk cId="1216965000" sldId="258"/>
+            <ac:spMk id="2" creationId="{7D1CB8DE-7E37-8843-9926-BCCB00963A6E}"/>
+          </ac:spMkLst>
+        </pc:spChg>
+        <pc:spChg chg="mod">
+          <ac:chgData name="Fukui Shin" userId="6902ee70c48ce296" providerId="LiveId" clId="{3563161F-D15E-4A4A-B8D2-4F599856B73C}" dt="2021-11-17T14:57:59.362" v="4052" actId="20577"/>
+          <ac:spMkLst>
+            <pc:docMk/>
+            <pc:sldMk cId="1216965000" sldId="258"/>
+            <ac:spMk id="3" creationId="{C92B07B6-339F-834A-BA51-25593D8DC76C}"/>
+          </ac:spMkLst>
+        </pc:spChg>
+      </pc:sldChg>
+      <pc:sldChg chg="modSp new mod">
+        <pc:chgData name="Fukui Shin" userId="6902ee70c48ce296" providerId="LiveId" clId="{3563161F-D15E-4A4A-B8D2-4F599856B73C}" dt="2021-11-17T14:59:15.600" v="4074" actId="58"/>
+        <pc:sldMkLst>
+          <pc:docMk/>
+          <pc:sldMk cId="672173733" sldId="259"/>
+        </pc:sldMkLst>
+        <pc:spChg chg="mod">
+          <ac:chgData name="Fukui Shin" userId="6902ee70c48ce296" providerId="LiveId" clId="{3563161F-D15E-4A4A-B8D2-4F599856B73C}" dt="2021-11-15T07:37:34.477" v="976" actId="20577"/>
+          <ac:spMkLst>
+            <pc:docMk/>
+            <pc:sldMk cId="672173733" sldId="259"/>
+            <ac:spMk id="2" creationId="{8735B3ED-534B-9148-BE43-146E345053C2}"/>
+          </ac:spMkLst>
+        </pc:spChg>
+        <pc:spChg chg="mod">
+          <ac:chgData name="Fukui Shin" userId="6902ee70c48ce296" providerId="LiveId" clId="{3563161F-D15E-4A4A-B8D2-4F599856B73C}" dt="2021-11-17T14:59:15.600" v="4074" actId="58"/>
+          <ac:spMkLst>
+            <pc:docMk/>
+            <pc:sldMk cId="672173733" sldId="259"/>
+            <ac:spMk id="3" creationId="{53329B6A-02E6-674F-BCF0-66057978508F}"/>
+          </ac:spMkLst>
+        </pc:spChg>
+      </pc:sldChg>
+      <pc:sldChg chg="modSp new mod">
+        <pc:chgData name="Fukui Shin" userId="6902ee70c48ce296" providerId="LiveId" clId="{3563161F-D15E-4A4A-B8D2-4F599856B73C}" dt="2021-11-22T06:10:02.338" v="4355" actId="20577"/>
+        <pc:sldMkLst>
+          <pc:docMk/>
+          <pc:sldMk cId="4234602352" sldId="260"/>
+        </pc:sldMkLst>
+        <pc:spChg chg="mod">
+          <ac:chgData name="Fukui Shin" userId="6902ee70c48ce296" providerId="LiveId" clId="{3563161F-D15E-4A4A-B8D2-4F599856B73C}" dt="2021-11-17T09:57:43.533" v="3542" actId="20577"/>
+          <ac:spMkLst>
+            <pc:docMk/>
+            <pc:sldMk cId="4234602352" sldId="260"/>
+            <ac:spMk id="2" creationId="{C09836D2-1796-FB42-A1C5-8E63CADB49EB}"/>
+          </ac:spMkLst>
+        </pc:spChg>
+        <pc:spChg chg="mod">
+          <ac:chgData name="Fukui Shin" userId="6902ee70c48ce296" providerId="LiveId" clId="{3563161F-D15E-4A4A-B8D2-4F599856B73C}" dt="2021-11-22T06:10:02.338" v="4355" actId="20577"/>
+          <ac:spMkLst>
+            <pc:docMk/>
+            <pc:sldMk cId="4234602352" sldId="260"/>
+            <ac:spMk id="3" creationId="{98987442-2918-D04B-BB5D-BD5790BC103F}"/>
+          </ac:spMkLst>
+        </pc:spChg>
+      </pc:sldChg>
+      <pc:sldChg chg="addSp delSp modSp new mod">
+        <pc:chgData name="Fukui Shin" userId="6902ee70c48ce296" providerId="LiveId" clId="{3563161F-D15E-4A4A-B8D2-4F599856B73C}" dt="2021-11-17T16:16:06.152" v="4319" actId="20577"/>
+        <pc:sldMkLst>
+          <pc:docMk/>
+          <pc:sldMk cId="3185156017" sldId="261"/>
+        </pc:sldMkLst>
+        <pc:spChg chg="mod">
+          <ac:chgData name="Fukui Shin" userId="6902ee70c48ce296" providerId="LiveId" clId="{3563161F-D15E-4A4A-B8D2-4F599856B73C}" dt="2021-11-17T09:14:38.779" v="2269"/>
+          <ac:spMkLst>
+            <pc:docMk/>
+            <pc:sldMk cId="3185156017" sldId="261"/>
+            <ac:spMk id="2" creationId="{3C700D43-7914-8B49-B1EE-F2FE8202DB90}"/>
+          </ac:spMkLst>
+        </pc:spChg>
+        <pc:spChg chg="del">
+          <ac:chgData name="Fukui Shin" userId="6902ee70c48ce296" providerId="LiveId" clId="{3563161F-D15E-4A4A-B8D2-4F599856B73C}" dt="2021-11-17T09:05:31.683" v="2088" actId="3680"/>
+          <ac:spMkLst>
+            <pc:docMk/>
+            <pc:sldMk cId="3185156017" sldId="261"/>
+            <ac:spMk id="3" creationId="{E1DD4FF8-1667-0D46-AEC6-0B5B3DB8876A}"/>
+          </ac:spMkLst>
+        </pc:spChg>
+        <pc:spChg chg="add del mod">
+          <ac:chgData name="Fukui Shin" userId="6902ee70c48ce296" providerId="LiveId" clId="{3563161F-D15E-4A4A-B8D2-4F599856B73C}" dt="2021-11-17T09:07:59.144" v="2230"/>
+          <ac:spMkLst>
+            <pc:docMk/>
+            <pc:sldMk cId="3185156017" sldId="261"/>
+            <ac:spMk id="5" creationId="{98D531CB-25E3-8C4C-84F7-5CF85AAAF111}"/>
+          </ac:spMkLst>
+        </pc:spChg>
+        <pc:spChg chg="add del mod">
+          <ac:chgData name="Fukui Shin" userId="6902ee70c48ce296" providerId="LiveId" clId="{3563161F-D15E-4A4A-B8D2-4F599856B73C}" dt="2021-11-17T09:22:15.546" v="2622"/>
+          <ac:spMkLst>
+            <pc:docMk/>
+            <pc:sldMk cId="3185156017" sldId="261"/>
+            <ac:spMk id="6" creationId="{62BC719E-E9FF-8943-BF71-336F71B4757E}"/>
+          </ac:spMkLst>
+        </pc:spChg>
+        <pc:spChg chg="add mod">
+          <ac:chgData name="Fukui Shin" userId="6902ee70c48ce296" providerId="LiveId" clId="{3563161F-D15E-4A4A-B8D2-4F599856B73C}" dt="2021-11-17T16:16:06.152" v="4319" actId="20577"/>
+          <ac:spMkLst>
+            <pc:docMk/>
+            <pc:sldMk cId="3185156017" sldId="261"/>
+            <ac:spMk id="7" creationId="{3B3CE665-52A0-C342-89A8-B18E5AC153D9}"/>
+          </ac:spMkLst>
+        </pc:spChg>
+        <pc:graphicFrameChg chg="add mod ord modGraphic">
+          <ac:chgData name="Fukui Shin" userId="6902ee70c48ce296" providerId="LiveId" clId="{3563161F-D15E-4A4A-B8D2-4F599856B73C}" dt="2021-11-17T14:54:28.369" v="4017" actId="255"/>
+          <ac:graphicFrameMkLst>
+            <pc:docMk/>
+            <pc:sldMk cId="3185156017" sldId="261"/>
+            <ac:graphicFrameMk id="4" creationId="{407B999C-F742-4C4B-8A08-6B24FE0BC9FB}"/>
+          </ac:graphicFrameMkLst>
+        </pc:graphicFrameChg>
+      </pc:sldChg>
+      <pc:sldChg chg="modSp new mod">
+        <pc:chgData name="Fukui Shin" userId="6902ee70c48ce296" providerId="LiveId" clId="{3563161F-D15E-4A4A-B8D2-4F599856B73C}" dt="2021-11-22T06:09:28.992" v="4340" actId="20577"/>
+        <pc:sldMkLst>
+          <pc:docMk/>
+          <pc:sldMk cId="2859020871" sldId="262"/>
+        </pc:sldMkLst>
+        <pc:spChg chg="mod">
+          <ac:chgData name="Fukui Shin" userId="6902ee70c48ce296" providerId="LiveId" clId="{3563161F-D15E-4A4A-B8D2-4F599856B73C}" dt="2021-11-17T09:59:35.240" v="3692" actId="20577"/>
+          <ac:spMkLst>
+            <pc:docMk/>
+            <pc:sldMk cId="2859020871" sldId="262"/>
+            <ac:spMk id="2" creationId="{14F383C1-F4F6-F143-BB59-4370B86BFFD5}"/>
+          </ac:spMkLst>
+        </pc:spChg>
+        <pc:spChg chg="mod">
+          <ac:chgData name="Fukui Shin" userId="6902ee70c48ce296" providerId="LiveId" clId="{3563161F-D15E-4A4A-B8D2-4F599856B73C}" dt="2021-11-22T06:09:28.992" v="4340" actId="20577"/>
+          <ac:spMkLst>
+            <pc:docMk/>
+            <pc:sldMk cId="2859020871" sldId="262"/>
+            <ac:spMk id="3" creationId="{3BC21B0A-101C-D044-A534-0DE9DD86BA80}"/>
+          </ac:spMkLst>
+        </pc:spChg>
+      </pc:sldChg>
+      <pc:sldChg chg="modSp new del mod">
+        <pc:chgData name="Fukui Shin" userId="6902ee70c48ce296" providerId="LiveId" clId="{3563161F-D15E-4A4A-B8D2-4F599856B73C}" dt="2021-11-17T15:13:35.038" v="4317" actId="2696"/>
+        <pc:sldMkLst>
+          <pc:docMk/>
+          <pc:sldMk cId="1660451074" sldId="263"/>
+        </pc:sldMkLst>
+        <pc:spChg chg="mod">
+          <ac:chgData name="Fukui Shin" userId="6902ee70c48ce296" providerId="LiveId" clId="{3563161F-D15E-4A4A-B8D2-4F599856B73C}" dt="2021-11-17T15:02:52.051" v="4316" actId="20577"/>
+          <ac:spMkLst>
+            <pc:docMk/>
+            <pc:sldMk cId="1660451074" sldId="263"/>
+            <ac:spMk id="2" creationId="{7E8786A5-99FE-694E-8FC0-336E57357EBA}"/>
           </ac:spMkLst>
         </pc:spChg>
       </pc:sldChg>
     </pc:docChg>
   </pc:docChgLst>
   <pc:docChgLst>
-    <pc:chgData name="Fukui Shin" userId="6902ee70c48ce296" providerId="LiveId" clId="{CAD8029A-6CF2-954F-88AD-D2A417AFA2E1}"/>
-    <pc:docChg chg="undo custSel addSld modSld">
-      <pc:chgData name="Fukui Shin" userId="6902ee70c48ce296" providerId="LiveId" clId="{CAD8029A-6CF2-954F-88AD-D2A417AFA2E1}" dt="2021-11-08T08:18:15.651" v="1075" actId="20577"/>
+    <pc:chgData name="Fukui Shin" userId="6902ee70c48ce296" providerId="LiveId" clId="{C171A0A8-2E99-C24B-9E1C-D9FFA0DC05D0}"/>
+    <pc:docChg chg="undo custSel modSld">
+      <pc:chgData name="Fukui Shin" userId="6902ee70c48ce296" providerId="LiveId" clId="{C171A0A8-2E99-C24B-9E1C-D9FFA0DC05D0}" dt="2021-11-18T02:26:17.784" v="297" actId="20577"/>
       <pc:docMkLst>
         <pc:docMk/>
       </pc:docMkLst>
       <pc:sldChg chg="modSp mod">
-        <pc:chgData name="Fukui Shin" userId="6902ee70c48ce296" providerId="LiveId" clId="{CAD8029A-6CF2-954F-88AD-D2A417AFA2E1}" dt="2021-11-08T07:28:30.638" v="58" actId="20577"/>
+        <pc:chgData name="Fukui Shin" userId="6902ee70c48ce296" providerId="LiveId" clId="{C171A0A8-2E99-C24B-9E1C-D9FFA0DC05D0}" dt="2021-11-18T02:26:17.784" v="297" actId="20577"/>
         <pc:sldMkLst>
           <pc:docMk/>
-          <pc:sldMk cId="2447858462" sldId="288"/>
+          <pc:sldMk cId="3185156017" sldId="261"/>
         </pc:sldMkLst>
         <pc:spChg chg="mod">
-          <ac:chgData name="Fukui Shin" userId="6902ee70c48ce296" providerId="LiveId" clId="{CAD8029A-6CF2-954F-88AD-D2A417AFA2E1}" dt="2021-11-08T07:28:30.638" v="58" actId="20577"/>
+          <ac:chgData name="Fukui Shin" userId="6902ee70c48ce296" providerId="LiveId" clId="{C171A0A8-2E99-C24B-9E1C-D9FFA0DC05D0}" dt="2021-11-18T02:26:17.784" v="297" actId="20577"/>
           <ac:spMkLst>
             <pc:docMk/>
-            <pc:sldMk cId="2447858462" sldId="288"/>
-            <ac:spMk id="3" creationId="{7044DDCB-175D-DC41-A5AC-98AE58CE5A61}"/>
-          </ac:spMkLst>
-        </pc:spChg>
-      </pc:sldChg>
-      <pc:sldChg chg="modSp mod">
-        <pc:chgData name="Fukui Shin" userId="6902ee70c48ce296" providerId="LiveId" clId="{CAD8029A-6CF2-954F-88AD-D2A417AFA2E1}" dt="2021-11-08T08:12:08.863" v="395" actId="20577"/>
-        <pc:sldMkLst>
-          <pc:docMk/>
-          <pc:sldMk cId="2595786992" sldId="290"/>
-        </pc:sldMkLst>
-        <pc:spChg chg="mod">
-          <ac:chgData name="Fukui Shin" userId="6902ee70c48ce296" providerId="LiveId" clId="{CAD8029A-6CF2-954F-88AD-D2A417AFA2E1}" dt="2021-11-08T08:12:08.863" v="395" actId="20577"/>
-          <ac:spMkLst>
-            <pc:docMk/>
-            <pc:sldMk cId="2595786992" sldId="290"/>
-            <ac:spMk id="3" creationId="{92857569-606C-B048-BBF1-17179C8C8C9A}"/>
-          </ac:spMkLst>
-        </pc:spChg>
-      </pc:sldChg>
-      <pc:sldChg chg="addSp modSp new mod">
-        <pc:chgData name="Fukui Shin" userId="6902ee70c48ce296" providerId="LiveId" clId="{CAD8029A-6CF2-954F-88AD-D2A417AFA2E1}" dt="2021-11-08T08:00:38.809" v="161" actId="1076"/>
-        <pc:sldMkLst>
-          <pc:docMk/>
-          <pc:sldMk cId="508955002" sldId="291"/>
-        </pc:sldMkLst>
-        <pc:spChg chg="mod">
-          <ac:chgData name="Fukui Shin" userId="6902ee70c48ce296" providerId="LiveId" clId="{CAD8029A-6CF2-954F-88AD-D2A417AFA2E1}" dt="2021-11-08T07:56:44.670" v="79" actId="20577"/>
-          <ac:spMkLst>
-            <pc:docMk/>
-            <pc:sldMk cId="508955002" sldId="291"/>
-            <ac:spMk id="2" creationId="{97020794-9D15-0745-925F-85D82BC176FF}"/>
+            <pc:sldMk cId="3185156017" sldId="261"/>
+            <ac:spMk id="2" creationId="{3C700D43-7914-8B49-B1EE-F2FE8202DB90}"/>
           </ac:spMkLst>
         </pc:spChg>
         <pc:spChg chg="mod">
-          <ac:chgData name="Fukui Shin" userId="6902ee70c48ce296" providerId="LiveId" clId="{CAD8029A-6CF2-954F-88AD-D2A417AFA2E1}" dt="2021-11-08T08:00:15.456" v="156" actId="20577"/>
+          <ac:chgData name="Fukui Shin" userId="6902ee70c48ce296" providerId="LiveId" clId="{C171A0A8-2E99-C24B-9E1C-D9FFA0DC05D0}" dt="2021-11-18T02:24:43.279" v="275" actId="20577"/>
           <ac:spMkLst>
             <pc:docMk/>
-            <pc:sldMk cId="508955002" sldId="291"/>
-            <ac:spMk id="3" creationId="{54C63FB3-C4DB-084E-968E-7FB5E1F0B009}"/>
+            <pc:sldMk cId="3185156017" sldId="261"/>
+            <ac:spMk id="7" creationId="{3B3CE665-52A0-C342-89A8-B18E5AC153D9}"/>
           </ac:spMkLst>
         </pc:spChg>
-        <pc:picChg chg="add mod">
-          <ac:chgData name="Fukui Shin" userId="6902ee70c48ce296" providerId="LiveId" clId="{CAD8029A-6CF2-954F-88AD-D2A417AFA2E1}" dt="2021-11-08T08:00:38.809" v="161" actId="1076"/>
-          <ac:picMkLst>
+        <pc:graphicFrameChg chg="mod modGraphic">
+          <ac:chgData name="Fukui Shin" userId="6902ee70c48ce296" providerId="LiveId" clId="{C171A0A8-2E99-C24B-9E1C-D9FFA0DC05D0}" dt="2021-11-18T02:16:45.210" v="12" actId="1076"/>
+          <ac:graphicFrameMkLst>
             <pc:docMk/>
-            <pc:sldMk cId="508955002" sldId="291"/>
-            <ac:picMk id="5" creationId="{99D7514B-7388-6B47-B318-1E894D5946D1}"/>
-          </ac:picMkLst>
-        </pc:picChg>
-      </pc:sldChg>
-      <pc:sldChg chg="modSp new mod">
-        <pc:chgData name="Fukui Shin" userId="6902ee70c48ce296" providerId="LiveId" clId="{CAD8029A-6CF2-954F-88AD-D2A417AFA2E1}" dt="2021-11-08T08:14:18.764" v="596" actId="20577"/>
-        <pc:sldMkLst>
-          <pc:docMk/>
-          <pc:sldMk cId="3834722928" sldId="292"/>
-        </pc:sldMkLst>
-        <pc:spChg chg="mod">
-          <ac:chgData name="Fukui Shin" userId="6902ee70c48ce296" providerId="LiveId" clId="{CAD8029A-6CF2-954F-88AD-D2A417AFA2E1}" dt="2021-11-08T08:01:38.590" v="205" actId="20577"/>
-          <ac:spMkLst>
-            <pc:docMk/>
-            <pc:sldMk cId="3834722928" sldId="292"/>
-            <ac:spMk id="2" creationId="{51AA4A24-C87F-0340-9C26-29126700D1D9}"/>
-          </ac:spMkLst>
-        </pc:spChg>
-        <pc:spChg chg="mod">
-          <ac:chgData name="Fukui Shin" userId="6902ee70c48ce296" providerId="LiveId" clId="{CAD8029A-6CF2-954F-88AD-D2A417AFA2E1}" dt="2021-11-08T08:14:18.764" v="596" actId="20577"/>
-          <ac:spMkLst>
-            <pc:docMk/>
-            <pc:sldMk cId="3834722928" sldId="292"/>
-            <ac:spMk id="3" creationId="{A3D0ED53-FAAB-AD43-A6F9-C615C36B1450}"/>
-          </ac:spMkLst>
-        </pc:spChg>
-      </pc:sldChg>
-      <pc:sldChg chg="modSp new mod">
-        <pc:chgData name="Fukui Shin" userId="6902ee70c48ce296" providerId="LiveId" clId="{CAD8029A-6CF2-954F-88AD-D2A417AFA2E1}" dt="2021-11-08T08:18:15.651" v="1075" actId="20577"/>
-        <pc:sldMkLst>
-          <pc:docMk/>
-          <pc:sldMk cId="2393039641" sldId="293"/>
-        </pc:sldMkLst>
-        <pc:spChg chg="mod">
-          <ac:chgData name="Fukui Shin" userId="6902ee70c48ce296" providerId="LiveId" clId="{CAD8029A-6CF2-954F-88AD-D2A417AFA2E1}" dt="2021-11-08T08:15:15.141" v="674" actId="20577"/>
-          <ac:spMkLst>
-            <pc:docMk/>
-            <pc:sldMk cId="2393039641" sldId="293"/>
-            <ac:spMk id="2" creationId="{BE21B35A-2763-C34A-9729-CEAF9258550D}"/>
-          </ac:spMkLst>
-        </pc:spChg>
-        <pc:spChg chg="mod">
-          <ac:chgData name="Fukui Shin" userId="6902ee70c48ce296" providerId="LiveId" clId="{CAD8029A-6CF2-954F-88AD-D2A417AFA2E1}" dt="2021-11-08T08:18:15.651" v="1075" actId="20577"/>
-          <ac:spMkLst>
-            <pc:docMk/>
-            <pc:sldMk cId="2393039641" sldId="293"/>
-            <ac:spMk id="3" creationId="{5D454D60-38A7-4B4C-8C5C-FFAC1D198DE6}"/>
-          </ac:spMkLst>
-        </pc:spChg>
+            <pc:sldMk cId="3185156017" sldId="261"/>
+            <ac:graphicFrameMk id="4" creationId="{407B999C-F742-4C4B-8A08-6B24FE0BC9FB}"/>
+          </ac:graphicFrameMkLst>
+        </pc:graphicFrameChg>
       </pc:sldChg>
     </pc:docChg>
   </pc:docChgLst>
@@ -538,9 +442,9 @@
             </a:lvl1pPr>
           </a:lstStyle>
           <a:p>
-            <a:fld id="{56F9D65D-073B-7846-A770-D643C4EB6194}" type="datetimeFigureOut">
+            <a:fld id="{E6CC64AC-381B-1940-A2A3-3BC52AC77BCA}" type="datetimeFigureOut">
               <a:rPr kumimoji="1" lang="ja-JP" altLang="en-US" smtClean="0"/>
-              <a:t>2022/10/2</a:t>
+              <a:t>2022/11/1</a:t>
             </a:fld>
             <a:endParaRPr kumimoji="1" lang="ja-JP" altLang="en-US"/>
           </a:p>
@@ -728,7 +632,7 @@
             </a:lvl1pPr>
           </a:lstStyle>
           <a:p>
-            <a:fld id="{98F41959-D5E0-5A4B-AB74-B0E813EDE114}" type="slidenum">
+            <a:fld id="{C9FA6667-A6C9-A248-A58F-2989437BD211}" type="slidenum">
               <a:rPr kumimoji="1" lang="ja-JP" altLang="en-US" smtClean="0"/>
               <a:t>‹#›</a:t>
             </a:fld>
@@ -739,7 +643,7 @@
     </p:spTree>
     <p:extLst>
       <p:ext uri="{BB962C8B-B14F-4D97-AF65-F5344CB8AC3E}">
-        <p14:creationId xmlns:p14="http://schemas.microsoft.com/office/powerpoint/2010/main" val="4152115877"/>
+        <p14:creationId xmlns:p14="http://schemas.microsoft.com/office/powerpoint/2010/main" val="990334637"/>
       </p:ext>
     </p:extLst>
   </p:cSld>
@@ -902,9 +806,9 @@
           <a:bodyPr/>
           <a:lstStyle/>
           <a:p>
-            <a:fld id="{98F41959-D5E0-5A4B-AB74-B0E813EDE114}" type="slidenum">
+            <a:fld id="{C9FA6667-A6C9-A248-A58F-2989437BD211}" type="slidenum">
               <a:rPr kumimoji="1" lang="ja-JP" altLang="en-US" smtClean="0"/>
-              <a:t>2</a:t>
+              <a:t>6</a:t>
             </a:fld>
             <a:endParaRPr kumimoji="1" lang="ja-JP" altLang="en-US"/>
           </a:p>
@@ -913,7 +817,7 @@
     </p:spTree>
     <p:extLst>
       <p:ext uri="{BB962C8B-B14F-4D97-AF65-F5344CB8AC3E}">
-        <p14:creationId xmlns:p14="http://schemas.microsoft.com/office/powerpoint/2010/main" val="2542682864"/>
+        <p14:creationId xmlns:p14="http://schemas.microsoft.com/office/powerpoint/2010/main" val="569031379"/>
       </p:ext>
     </p:extLst>
   </p:cSld>
@@ -986,9 +890,9 @@
           <a:bodyPr/>
           <a:lstStyle/>
           <a:p>
-            <a:fld id="{98F41959-D5E0-5A4B-AB74-B0E813EDE114}" type="slidenum">
+            <a:fld id="{C9FA6667-A6C9-A248-A58F-2989437BD211}" type="slidenum">
               <a:rPr kumimoji="1" lang="ja-JP" altLang="en-US" smtClean="0"/>
-              <a:t>5</a:t>
+              <a:t>7</a:t>
             </a:fld>
             <a:endParaRPr kumimoji="1" lang="ja-JP" altLang="en-US"/>
           </a:p>
@@ -997,91 +901,7 @@
     </p:spTree>
     <p:extLst>
       <p:ext uri="{BB962C8B-B14F-4D97-AF65-F5344CB8AC3E}">
-        <p14:creationId xmlns:p14="http://schemas.microsoft.com/office/powerpoint/2010/main" val="3563672187"/>
-      </p:ext>
-    </p:extLst>
-  </p:cSld>
-  <p:clrMapOvr>
-    <a:masterClrMapping/>
-  </p:clrMapOvr>
-</p:notes>
-</file>
-
-<file path=ppt/notesSlides/notesSlide3.xml><?xml version="1.0" encoding="utf-8"?>
-<p:notes xmlns:a="http://schemas.openxmlformats.org/drawingml/2006/main" xmlns:r="http://schemas.openxmlformats.org/officeDocument/2006/relationships" xmlns:p="http://schemas.openxmlformats.org/presentationml/2006/main">
-  <p:cSld>
-    <p:spTree>
-      <p:nvGrpSpPr>
-        <p:cNvPr id="1" name=""/>
-        <p:cNvGrpSpPr/>
-        <p:nvPr/>
-      </p:nvGrpSpPr>
-      <p:grpSpPr>
-        <a:xfrm>
-          <a:off x="0" y="0"/>
-          <a:ext cx="0" cy="0"/>
-          <a:chOff x="0" y="0"/>
-          <a:chExt cx="0" cy="0"/>
-        </a:xfrm>
-      </p:grpSpPr>
-      <p:sp>
-        <p:nvSpPr>
-          <p:cNvPr id="2" name="スライド イメージ プレースホルダー 1"/>
-          <p:cNvSpPr>
-            <a:spLocks noGrp="1" noRot="1" noChangeAspect="1"/>
-          </p:cNvSpPr>
-          <p:nvPr>
-            <p:ph type="sldImg"/>
-          </p:nvPr>
-        </p:nvSpPr>
-        <p:spPr/>
-      </p:sp>
-      <p:sp>
-        <p:nvSpPr>
-          <p:cNvPr id="3" name="ノート プレースホルダー 2"/>
-          <p:cNvSpPr>
-            <a:spLocks noGrp="1"/>
-          </p:cNvSpPr>
-          <p:nvPr>
-            <p:ph type="body" idx="1"/>
-          </p:nvPr>
-        </p:nvSpPr>
-        <p:spPr/>
-        <p:txBody>
-          <a:bodyPr/>
-          <a:lstStyle/>
-          <a:p>
-            <a:endParaRPr kumimoji="1" lang="ja-JP" altLang="en-US"/>
-          </a:p>
-        </p:txBody>
-      </p:sp>
-      <p:sp>
-        <p:nvSpPr>
-          <p:cNvPr id="4" name="スライド番号プレースホルダー 3"/>
-          <p:cNvSpPr>
-            <a:spLocks noGrp="1"/>
-          </p:cNvSpPr>
-          <p:nvPr>
-            <p:ph type="sldNum" sz="quarter" idx="5"/>
-          </p:nvPr>
-        </p:nvSpPr>
-        <p:spPr/>
-        <p:txBody>
-          <a:bodyPr/>
-          <a:lstStyle/>
-          <a:p>
-            <a:fld id="{98F41959-D5E0-5A4B-AB74-B0E813EDE114}" type="slidenum">
-              <a:rPr kumimoji="1" lang="ja-JP" altLang="en-US" smtClean="0"/>
-              <a:t>8</a:t>
-            </a:fld>
-            <a:endParaRPr kumimoji="1" lang="ja-JP" altLang="en-US"/>
-          </a:p>
-        </p:txBody>
-      </p:sp>
-    </p:spTree>
-    <p:extLst>
-      <p:ext uri="{BB962C8B-B14F-4D97-AF65-F5344CB8AC3E}">
-        <p14:creationId xmlns:p14="http://schemas.microsoft.com/office/powerpoint/2010/main" val="2335118428"/>
+        <p14:creationId xmlns:p14="http://schemas.microsoft.com/office/powerpoint/2010/main" val="4069314633"/>
       </p:ext>
     </p:extLst>
   </p:cSld>
@@ -1113,7 +933,7 @@
           <p:cNvPr id="2" name="タイトル 1">
             <a:extLst>
               <a:ext uri="{FF2B5EF4-FFF2-40B4-BE49-F238E27FC236}">
-                <a16:creationId xmlns:a16="http://schemas.microsoft.com/office/drawing/2014/main" id="{6B9931FE-E369-8447-BE55-05DDE8FEB993}"/>
+                <a16:creationId xmlns:a16="http://schemas.microsoft.com/office/drawing/2014/main" id="{730570FC-1B8F-DA4C-805F-27D6AD0E8A4C}"/>
               </a:ext>
             </a:extLst>
           </p:cNvPr>
@@ -1150,7 +970,7 @@
           <p:cNvPr id="3" name="字幕 2">
             <a:extLst>
               <a:ext uri="{FF2B5EF4-FFF2-40B4-BE49-F238E27FC236}">
-                <a16:creationId xmlns:a16="http://schemas.microsoft.com/office/drawing/2014/main" id="{92D83A82-B8AD-924F-A085-93C38585EE03}"/>
+                <a16:creationId xmlns:a16="http://schemas.microsoft.com/office/drawing/2014/main" id="{E4E31D2C-82E9-9C4B-B146-1EECA166322E}"/>
               </a:ext>
             </a:extLst>
           </p:cNvPr>
@@ -1220,7 +1040,7 @@
           <p:cNvPr id="4" name="日付プレースホルダー 3">
             <a:extLst>
               <a:ext uri="{FF2B5EF4-FFF2-40B4-BE49-F238E27FC236}">
-                <a16:creationId xmlns:a16="http://schemas.microsoft.com/office/drawing/2014/main" id="{14A77F26-02D3-7547-A20F-C1E17376D313}"/>
+                <a16:creationId xmlns:a16="http://schemas.microsoft.com/office/drawing/2014/main" id="{0180BADE-8DAA-8C42-BE97-C1B4E6079DE4}"/>
               </a:ext>
             </a:extLst>
           </p:cNvPr>
@@ -1236,9 +1056,9 @@
           <a:bodyPr/>
           <a:lstStyle/>
           <a:p>
-            <a:fld id="{E4245ECD-3E8A-534F-BCF2-3F40B55B6962}" type="datetimeFigureOut">
+            <a:fld id="{109D021F-6DA5-0F41-8FDE-4263179E1E47}" type="datetimeFigureOut">
               <a:rPr kumimoji="1" lang="ja-JP" altLang="en-US" smtClean="0"/>
-              <a:t>2022/10/2</a:t>
+              <a:t>2022/11/1</a:t>
             </a:fld>
             <a:endParaRPr kumimoji="1" lang="ja-JP" altLang="en-US"/>
           </a:p>
@@ -1249,7 +1069,7 @@
           <p:cNvPr id="5" name="フッター プレースホルダー 4">
             <a:extLst>
               <a:ext uri="{FF2B5EF4-FFF2-40B4-BE49-F238E27FC236}">
-                <a16:creationId xmlns:a16="http://schemas.microsoft.com/office/drawing/2014/main" id="{2FF7DE7E-2D80-6B48-BC23-9B4F543EAA01}"/>
+                <a16:creationId xmlns:a16="http://schemas.microsoft.com/office/drawing/2014/main" id="{22197273-5205-7A4C-815D-A12439F54182}"/>
               </a:ext>
             </a:extLst>
           </p:cNvPr>
@@ -1274,7 +1094,7 @@
           <p:cNvPr id="6" name="スライド番号プレースホルダー 5">
             <a:extLst>
               <a:ext uri="{FF2B5EF4-FFF2-40B4-BE49-F238E27FC236}">
-                <a16:creationId xmlns:a16="http://schemas.microsoft.com/office/drawing/2014/main" id="{9E99EAA8-0BEA-8044-9AC2-526CF83873ED}"/>
+                <a16:creationId xmlns:a16="http://schemas.microsoft.com/office/drawing/2014/main" id="{C485851B-6198-B44D-84BF-C254237E8F59}"/>
               </a:ext>
             </a:extLst>
           </p:cNvPr>
@@ -1290,7 +1110,7 @@
           <a:bodyPr/>
           <a:lstStyle/>
           <a:p>
-            <a:fld id="{342D3D8F-692A-914F-83FC-E3B1BE524720}" type="slidenum">
+            <a:fld id="{76ADF933-266D-E746-99F4-C7579547FB03}" type="slidenum">
               <a:rPr kumimoji="1" lang="ja-JP" altLang="en-US" smtClean="0"/>
               <a:t>‹#›</a:t>
             </a:fld>
@@ -1301,7 +1121,7 @@
     </p:spTree>
     <p:extLst>
       <p:ext uri="{BB962C8B-B14F-4D97-AF65-F5344CB8AC3E}">
-        <p14:creationId xmlns:p14="http://schemas.microsoft.com/office/powerpoint/2010/main" val="3482777517"/>
+        <p14:creationId xmlns:p14="http://schemas.microsoft.com/office/powerpoint/2010/main" val="1404797208"/>
       </p:ext>
     </p:extLst>
   </p:cSld>
@@ -1333,7 +1153,7 @@
           <p:cNvPr id="2" name="タイトル 1">
             <a:extLst>
               <a:ext uri="{FF2B5EF4-FFF2-40B4-BE49-F238E27FC236}">
-                <a16:creationId xmlns:a16="http://schemas.microsoft.com/office/drawing/2014/main" id="{16C93D4B-6266-1249-95A7-05858A766292}"/>
+                <a16:creationId xmlns:a16="http://schemas.microsoft.com/office/drawing/2014/main" id="{407F9CCF-BCA7-AF48-876A-B8DA7872E276}"/>
               </a:ext>
             </a:extLst>
           </p:cNvPr>
@@ -1361,7 +1181,7 @@
           <p:cNvPr id="3" name="縦書きテキスト プレースホルダー 2">
             <a:extLst>
               <a:ext uri="{FF2B5EF4-FFF2-40B4-BE49-F238E27FC236}">
-                <a16:creationId xmlns:a16="http://schemas.microsoft.com/office/drawing/2014/main" id="{E819D74C-1468-2E4F-8688-A51CE7D2D65E}"/>
+                <a16:creationId xmlns:a16="http://schemas.microsoft.com/office/drawing/2014/main" id="{BFB900FC-05F6-7843-B917-753A3C9C140F}"/>
               </a:ext>
             </a:extLst>
           </p:cNvPr>
@@ -1450,7 +1270,7 @@
           <p:cNvPr id="4" name="日付プレースホルダー 3">
             <a:extLst>
               <a:ext uri="{FF2B5EF4-FFF2-40B4-BE49-F238E27FC236}">
-                <a16:creationId xmlns:a16="http://schemas.microsoft.com/office/drawing/2014/main" id="{271C5012-F549-EC42-8683-9C88F2AC7C74}"/>
+                <a16:creationId xmlns:a16="http://schemas.microsoft.com/office/drawing/2014/main" id="{108AA086-1729-E741-A141-CE7BA4381942}"/>
               </a:ext>
             </a:extLst>
           </p:cNvPr>
@@ -1466,9 +1286,9 @@
           <a:bodyPr/>
           <a:lstStyle/>
           <a:p>
-            <a:fld id="{E4245ECD-3E8A-534F-BCF2-3F40B55B6962}" type="datetimeFigureOut">
+            <a:fld id="{109D021F-6DA5-0F41-8FDE-4263179E1E47}" type="datetimeFigureOut">
               <a:rPr kumimoji="1" lang="ja-JP" altLang="en-US" smtClean="0"/>
-              <a:t>2022/10/2</a:t>
+              <a:t>2022/11/1</a:t>
             </a:fld>
             <a:endParaRPr kumimoji="1" lang="ja-JP" altLang="en-US"/>
           </a:p>
@@ -1479,7 +1299,7 @@
           <p:cNvPr id="5" name="フッター プレースホルダー 4">
             <a:extLst>
               <a:ext uri="{FF2B5EF4-FFF2-40B4-BE49-F238E27FC236}">
-                <a16:creationId xmlns:a16="http://schemas.microsoft.com/office/drawing/2014/main" id="{FFBEF3E3-9AA2-C84E-BC10-723B6A2359AE}"/>
+                <a16:creationId xmlns:a16="http://schemas.microsoft.com/office/drawing/2014/main" id="{6F6E0E40-3843-3D40-8398-A31C8729B1B3}"/>
               </a:ext>
             </a:extLst>
           </p:cNvPr>
@@ -1504,7 +1324,7 @@
           <p:cNvPr id="6" name="スライド番号プレースホルダー 5">
             <a:extLst>
               <a:ext uri="{FF2B5EF4-FFF2-40B4-BE49-F238E27FC236}">
-                <a16:creationId xmlns:a16="http://schemas.microsoft.com/office/drawing/2014/main" id="{6C6C7E2E-64A3-264E-A583-2D13163CB576}"/>
+                <a16:creationId xmlns:a16="http://schemas.microsoft.com/office/drawing/2014/main" id="{A5131E5A-4119-9448-85DE-83F7F5D5DC40}"/>
               </a:ext>
             </a:extLst>
           </p:cNvPr>
@@ -1520,7 +1340,7 @@
           <a:bodyPr/>
           <a:lstStyle/>
           <a:p>
-            <a:fld id="{342D3D8F-692A-914F-83FC-E3B1BE524720}" type="slidenum">
+            <a:fld id="{76ADF933-266D-E746-99F4-C7579547FB03}" type="slidenum">
               <a:rPr kumimoji="1" lang="ja-JP" altLang="en-US" smtClean="0"/>
               <a:t>‹#›</a:t>
             </a:fld>
@@ -1531,7 +1351,7 @@
     </p:spTree>
     <p:extLst>
       <p:ext uri="{BB962C8B-B14F-4D97-AF65-F5344CB8AC3E}">
-        <p14:creationId xmlns:p14="http://schemas.microsoft.com/office/powerpoint/2010/main" val="2645570358"/>
+        <p14:creationId xmlns:p14="http://schemas.microsoft.com/office/powerpoint/2010/main" val="2173639389"/>
       </p:ext>
     </p:extLst>
   </p:cSld>
@@ -1563,7 +1383,7 @@
           <p:cNvPr id="2" name="縦書きタイトル 1">
             <a:extLst>
               <a:ext uri="{FF2B5EF4-FFF2-40B4-BE49-F238E27FC236}">
-                <a16:creationId xmlns:a16="http://schemas.microsoft.com/office/drawing/2014/main" id="{1AB3C7BC-D1E5-844C-A9C2-107281652321}"/>
+                <a16:creationId xmlns:a16="http://schemas.microsoft.com/office/drawing/2014/main" id="{934FA9CA-CF6B-D048-8591-256D6FE1A9DD}"/>
               </a:ext>
             </a:extLst>
           </p:cNvPr>
@@ -1596,7 +1416,7 @@
           <p:cNvPr id="3" name="縦書きテキスト プレースホルダー 2">
             <a:extLst>
               <a:ext uri="{FF2B5EF4-FFF2-40B4-BE49-F238E27FC236}">
-                <a16:creationId xmlns:a16="http://schemas.microsoft.com/office/drawing/2014/main" id="{0C3835B9-BCC4-444F-9ADF-E1742212852D}"/>
+                <a16:creationId xmlns:a16="http://schemas.microsoft.com/office/drawing/2014/main" id="{67A7481A-C7F7-CC40-9211-5C67FA40A9F2}"/>
               </a:ext>
             </a:extLst>
           </p:cNvPr>
@@ -1690,7 +1510,7 @@
           <p:cNvPr id="4" name="日付プレースホルダー 3">
             <a:extLst>
               <a:ext uri="{FF2B5EF4-FFF2-40B4-BE49-F238E27FC236}">
-                <a16:creationId xmlns:a16="http://schemas.microsoft.com/office/drawing/2014/main" id="{1BA58C7E-F694-7B41-9A98-A4D56F858A3E}"/>
+                <a16:creationId xmlns:a16="http://schemas.microsoft.com/office/drawing/2014/main" id="{C5B19D48-3715-8949-A952-5709B49853EC}"/>
               </a:ext>
             </a:extLst>
           </p:cNvPr>
@@ -1706,9 +1526,9 @@
           <a:bodyPr/>
           <a:lstStyle/>
           <a:p>
-            <a:fld id="{E4245ECD-3E8A-534F-BCF2-3F40B55B6962}" type="datetimeFigureOut">
+            <a:fld id="{109D021F-6DA5-0F41-8FDE-4263179E1E47}" type="datetimeFigureOut">
               <a:rPr kumimoji="1" lang="ja-JP" altLang="en-US" smtClean="0"/>
-              <a:t>2022/10/2</a:t>
+              <a:t>2022/11/1</a:t>
             </a:fld>
             <a:endParaRPr kumimoji="1" lang="ja-JP" altLang="en-US"/>
           </a:p>
@@ -1719,7 +1539,7 @@
           <p:cNvPr id="5" name="フッター プレースホルダー 4">
             <a:extLst>
               <a:ext uri="{FF2B5EF4-FFF2-40B4-BE49-F238E27FC236}">
-                <a16:creationId xmlns:a16="http://schemas.microsoft.com/office/drawing/2014/main" id="{56664FCB-14C4-364F-92F8-E03542A2E6B5}"/>
+                <a16:creationId xmlns:a16="http://schemas.microsoft.com/office/drawing/2014/main" id="{BBE37608-FC26-8845-AF86-4E1651EFE195}"/>
               </a:ext>
             </a:extLst>
           </p:cNvPr>
@@ -1744,7 +1564,7 @@
           <p:cNvPr id="6" name="スライド番号プレースホルダー 5">
             <a:extLst>
               <a:ext uri="{FF2B5EF4-FFF2-40B4-BE49-F238E27FC236}">
-                <a16:creationId xmlns:a16="http://schemas.microsoft.com/office/drawing/2014/main" id="{787484C1-902E-994A-BAE9-0BA5297FF36C}"/>
+                <a16:creationId xmlns:a16="http://schemas.microsoft.com/office/drawing/2014/main" id="{40F9403D-0975-E44B-A5E5-F9B88394312F}"/>
               </a:ext>
             </a:extLst>
           </p:cNvPr>
@@ -1760,7 +1580,7 @@
           <a:bodyPr/>
           <a:lstStyle/>
           <a:p>
-            <a:fld id="{342D3D8F-692A-914F-83FC-E3B1BE524720}" type="slidenum">
+            <a:fld id="{76ADF933-266D-E746-99F4-C7579547FB03}" type="slidenum">
               <a:rPr kumimoji="1" lang="ja-JP" altLang="en-US" smtClean="0"/>
               <a:t>‹#›</a:t>
             </a:fld>
@@ -1771,7 +1591,7 @@
     </p:spTree>
     <p:extLst>
       <p:ext uri="{BB962C8B-B14F-4D97-AF65-F5344CB8AC3E}">
-        <p14:creationId xmlns:p14="http://schemas.microsoft.com/office/powerpoint/2010/main" val="2230204325"/>
+        <p14:creationId xmlns:p14="http://schemas.microsoft.com/office/powerpoint/2010/main" val="97482404"/>
       </p:ext>
     </p:extLst>
   </p:cSld>
@@ -1803,7 +1623,7 @@
           <p:cNvPr id="2" name="タイトル 1">
             <a:extLst>
               <a:ext uri="{FF2B5EF4-FFF2-40B4-BE49-F238E27FC236}">
-                <a16:creationId xmlns:a16="http://schemas.microsoft.com/office/drawing/2014/main" id="{6A4041FE-7B78-C440-9442-4432533204BB}"/>
+                <a16:creationId xmlns:a16="http://schemas.microsoft.com/office/drawing/2014/main" id="{24838409-1998-A945-9243-F98A6A1479DA}"/>
               </a:ext>
             </a:extLst>
           </p:cNvPr>
@@ -1831,7 +1651,7 @@
           <p:cNvPr id="3" name="コンテンツ プレースホルダー 2">
             <a:extLst>
               <a:ext uri="{FF2B5EF4-FFF2-40B4-BE49-F238E27FC236}">
-                <a16:creationId xmlns:a16="http://schemas.microsoft.com/office/drawing/2014/main" id="{BDE6CF2B-06DF-0846-9F64-C503959682FD}"/>
+                <a16:creationId xmlns:a16="http://schemas.microsoft.com/office/drawing/2014/main" id="{D7A90038-BBB6-2143-A549-A48BEAD27711}"/>
               </a:ext>
             </a:extLst>
           </p:cNvPr>
@@ -1920,7 +1740,7 @@
           <p:cNvPr id="4" name="日付プレースホルダー 3">
             <a:extLst>
               <a:ext uri="{FF2B5EF4-FFF2-40B4-BE49-F238E27FC236}">
-                <a16:creationId xmlns:a16="http://schemas.microsoft.com/office/drawing/2014/main" id="{BAFFF86D-F78A-4F4C-A7B0-EA1C3139466A}"/>
+                <a16:creationId xmlns:a16="http://schemas.microsoft.com/office/drawing/2014/main" id="{563A8E0E-9DBB-D049-A75A-3306E484E357}"/>
               </a:ext>
             </a:extLst>
           </p:cNvPr>
@@ -1936,9 +1756,9 @@
           <a:bodyPr/>
           <a:lstStyle/>
           <a:p>
-            <a:fld id="{E4245ECD-3E8A-534F-BCF2-3F40B55B6962}" type="datetimeFigureOut">
+            <a:fld id="{109D021F-6DA5-0F41-8FDE-4263179E1E47}" type="datetimeFigureOut">
               <a:rPr kumimoji="1" lang="ja-JP" altLang="en-US" smtClean="0"/>
-              <a:t>2022/10/2</a:t>
+              <a:t>2022/11/1</a:t>
             </a:fld>
             <a:endParaRPr kumimoji="1" lang="ja-JP" altLang="en-US"/>
           </a:p>
@@ -1949,7 +1769,7 @@
           <p:cNvPr id="5" name="フッター プレースホルダー 4">
             <a:extLst>
               <a:ext uri="{FF2B5EF4-FFF2-40B4-BE49-F238E27FC236}">
-                <a16:creationId xmlns:a16="http://schemas.microsoft.com/office/drawing/2014/main" id="{5A1C01F2-3B00-2741-A881-1A2D47DB70ED}"/>
+                <a16:creationId xmlns:a16="http://schemas.microsoft.com/office/drawing/2014/main" id="{3CD3BDB6-B2F9-E943-A869-E97CE78EEA6F}"/>
               </a:ext>
             </a:extLst>
           </p:cNvPr>
@@ -1974,7 +1794,7 @@
           <p:cNvPr id="6" name="スライド番号プレースホルダー 5">
             <a:extLst>
               <a:ext uri="{FF2B5EF4-FFF2-40B4-BE49-F238E27FC236}">
-                <a16:creationId xmlns:a16="http://schemas.microsoft.com/office/drawing/2014/main" id="{C3B5E374-E9D1-D841-BB6E-789D7A8685FD}"/>
+                <a16:creationId xmlns:a16="http://schemas.microsoft.com/office/drawing/2014/main" id="{95867D05-7060-2240-86BF-F7D9A675B5DE}"/>
               </a:ext>
             </a:extLst>
           </p:cNvPr>
@@ -1990,7 +1810,7 @@
           <a:bodyPr/>
           <a:lstStyle/>
           <a:p>
-            <a:fld id="{342D3D8F-692A-914F-83FC-E3B1BE524720}" type="slidenum">
+            <a:fld id="{76ADF933-266D-E746-99F4-C7579547FB03}" type="slidenum">
               <a:rPr kumimoji="1" lang="ja-JP" altLang="en-US" smtClean="0"/>
               <a:t>‹#›</a:t>
             </a:fld>
@@ -2001,7 +1821,7 @@
     </p:spTree>
     <p:extLst>
       <p:ext uri="{BB962C8B-B14F-4D97-AF65-F5344CB8AC3E}">
-        <p14:creationId xmlns:p14="http://schemas.microsoft.com/office/powerpoint/2010/main" val="3778392142"/>
+        <p14:creationId xmlns:p14="http://schemas.microsoft.com/office/powerpoint/2010/main" val="2860744901"/>
       </p:ext>
     </p:extLst>
   </p:cSld>
@@ -2033,7 +1853,7 @@
           <p:cNvPr id="2" name="タイトル 1">
             <a:extLst>
               <a:ext uri="{FF2B5EF4-FFF2-40B4-BE49-F238E27FC236}">
-                <a16:creationId xmlns:a16="http://schemas.microsoft.com/office/drawing/2014/main" id="{4953725E-9755-704C-BE46-3970AE9BBEB9}"/>
+                <a16:creationId xmlns:a16="http://schemas.microsoft.com/office/drawing/2014/main" id="{C995488E-4363-5547-840D-24EB14DF7471}"/>
               </a:ext>
             </a:extLst>
           </p:cNvPr>
@@ -2070,7 +1890,7 @@
           <p:cNvPr id="3" name="テキスト プレースホルダー 2">
             <a:extLst>
               <a:ext uri="{FF2B5EF4-FFF2-40B4-BE49-F238E27FC236}">
-                <a16:creationId xmlns:a16="http://schemas.microsoft.com/office/drawing/2014/main" id="{765DAA1E-1066-6C4E-9464-D23A79FA6CC6}"/>
+                <a16:creationId xmlns:a16="http://schemas.microsoft.com/office/drawing/2014/main" id="{417E81A1-203C-8849-B2EB-A2F00C0FD677}"/>
               </a:ext>
             </a:extLst>
           </p:cNvPr>
@@ -2195,7 +2015,7 @@
           <p:cNvPr id="4" name="日付プレースホルダー 3">
             <a:extLst>
               <a:ext uri="{FF2B5EF4-FFF2-40B4-BE49-F238E27FC236}">
-                <a16:creationId xmlns:a16="http://schemas.microsoft.com/office/drawing/2014/main" id="{6A715784-F31E-C040-9C31-18BC50E777A8}"/>
+                <a16:creationId xmlns:a16="http://schemas.microsoft.com/office/drawing/2014/main" id="{B1A84F72-57AA-9E41-A7C9-0754AC2DF2CD}"/>
               </a:ext>
             </a:extLst>
           </p:cNvPr>
@@ -2211,9 +2031,9 @@
           <a:bodyPr/>
           <a:lstStyle/>
           <a:p>
-            <a:fld id="{E4245ECD-3E8A-534F-BCF2-3F40B55B6962}" type="datetimeFigureOut">
+            <a:fld id="{109D021F-6DA5-0F41-8FDE-4263179E1E47}" type="datetimeFigureOut">
               <a:rPr kumimoji="1" lang="ja-JP" altLang="en-US" smtClean="0"/>
-              <a:t>2022/10/2</a:t>
+              <a:t>2022/11/1</a:t>
             </a:fld>
             <a:endParaRPr kumimoji="1" lang="ja-JP" altLang="en-US"/>
           </a:p>
@@ -2224,7 +2044,7 @@
           <p:cNvPr id="5" name="フッター プレースホルダー 4">
             <a:extLst>
               <a:ext uri="{FF2B5EF4-FFF2-40B4-BE49-F238E27FC236}">
-                <a16:creationId xmlns:a16="http://schemas.microsoft.com/office/drawing/2014/main" id="{1A7BBFF5-93FE-0A41-9D57-4442CB6EF42D}"/>
+                <a16:creationId xmlns:a16="http://schemas.microsoft.com/office/drawing/2014/main" id="{EE7F14E7-3207-CF45-8DD0-2F444D5F5D71}"/>
               </a:ext>
             </a:extLst>
           </p:cNvPr>
@@ -2249,7 +2069,7 @@
           <p:cNvPr id="6" name="スライド番号プレースホルダー 5">
             <a:extLst>
               <a:ext uri="{FF2B5EF4-FFF2-40B4-BE49-F238E27FC236}">
-                <a16:creationId xmlns:a16="http://schemas.microsoft.com/office/drawing/2014/main" id="{997CDF4D-1CEF-334D-9B32-2C9577EEFFE4}"/>
+                <a16:creationId xmlns:a16="http://schemas.microsoft.com/office/drawing/2014/main" id="{A9A40A7A-A412-DC4E-B1D8-F21CF5D9E69C}"/>
               </a:ext>
             </a:extLst>
           </p:cNvPr>
@@ -2265,7 +2085,7 @@
           <a:bodyPr/>
           <a:lstStyle/>
           <a:p>
-            <a:fld id="{342D3D8F-692A-914F-83FC-E3B1BE524720}" type="slidenum">
+            <a:fld id="{76ADF933-266D-E746-99F4-C7579547FB03}" type="slidenum">
               <a:rPr kumimoji="1" lang="ja-JP" altLang="en-US" smtClean="0"/>
               <a:t>‹#›</a:t>
             </a:fld>
@@ -2276,7 +2096,7 @@
     </p:spTree>
     <p:extLst>
       <p:ext uri="{BB962C8B-B14F-4D97-AF65-F5344CB8AC3E}">
-        <p14:creationId xmlns:p14="http://schemas.microsoft.com/office/powerpoint/2010/main" val="2610203343"/>
+        <p14:creationId xmlns:p14="http://schemas.microsoft.com/office/powerpoint/2010/main" val="3489931564"/>
       </p:ext>
     </p:extLst>
   </p:cSld>
@@ -2308,7 +2128,7 @@
           <p:cNvPr id="2" name="タイトル 1">
             <a:extLst>
               <a:ext uri="{FF2B5EF4-FFF2-40B4-BE49-F238E27FC236}">
-                <a16:creationId xmlns:a16="http://schemas.microsoft.com/office/drawing/2014/main" id="{5B843B5C-AD1F-EF49-B104-BD610DF7E73D}"/>
+                <a16:creationId xmlns:a16="http://schemas.microsoft.com/office/drawing/2014/main" id="{F663162B-A68F-534F-B1EB-BAA8ADEEFA18}"/>
               </a:ext>
             </a:extLst>
           </p:cNvPr>
@@ -2336,7 +2156,7 @@
           <p:cNvPr id="3" name="コンテンツ プレースホルダー 2">
             <a:extLst>
               <a:ext uri="{FF2B5EF4-FFF2-40B4-BE49-F238E27FC236}">
-                <a16:creationId xmlns:a16="http://schemas.microsoft.com/office/drawing/2014/main" id="{33D723F5-B1E8-E843-9655-2652C6EF105A}"/>
+                <a16:creationId xmlns:a16="http://schemas.microsoft.com/office/drawing/2014/main" id="{E3735642-BEA4-5345-8CD2-AEC19B2010AF}"/>
               </a:ext>
             </a:extLst>
           </p:cNvPr>
@@ -2430,7 +2250,7 @@
           <p:cNvPr id="4" name="コンテンツ プレースホルダー 3">
             <a:extLst>
               <a:ext uri="{FF2B5EF4-FFF2-40B4-BE49-F238E27FC236}">
-                <a16:creationId xmlns:a16="http://schemas.microsoft.com/office/drawing/2014/main" id="{1DBA1D5A-C531-2C41-81EB-10C6B7F04C4E}"/>
+                <a16:creationId xmlns:a16="http://schemas.microsoft.com/office/drawing/2014/main" id="{A2EC377E-4895-FA41-A955-9FFFB2E910EB}"/>
               </a:ext>
             </a:extLst>
           </p:cNvPr>
@@ -2524,7 +2344,7 @@
           <p:cNvPr id="5" name="日付プレースホルダー 4">
             <a:extLst>
               <a:ext uri="{FF2B5EF4-FFF2-40B4-BE49-F238E27FC236}">
-                <a16:creationId xmlns:a16="http://schemas.microsoft.com/office/drawing/2014/main" id="{14125230-689E-2C49-A936-99AA8323183D}"/>
+                <a16:creationId xmlns:a16="http://schemas.microsoft.com/office/drawing/2014/main" id="{2B3A31DB-8974-734E-A8C9-7FE173478680}"/>
               </a:ext>
             </a:extLst>
           </p:cNvPr>
@@ -2540,9 +2360,9 @@
           <a:bodyPr/>
           <a:lstStyle/>
           <a:p>
-            <a:fld id="{E4245ECD-3E8A-534F-BCF2-3F40B55B6962}" type="datetimeFigureOut">
+            <a:fld id="{109D021F-6DA5-0F41-8FDE-4263179E1E47}" type="datetimeFigureOut">
               <a:rPr kumimoji="1" lang="ja-JP" altLang="en-US" smtClean="0"/>
-              <a:t>2022/10/2</a:t>
+              <a:t>2022/11/1</a:t>
             </a:fld>
             <a:endParaRPr kumimoji="1" lang="ja-JP" altLang="en-US"/>
           </a:p>
@@ -2553,7 +2373,7 @@
           <p:cNvPr id="6" name="フッター プレースホルダー 5">
             <a:extLst>
               <a:ext uri="{FF2B5EF4-FFF2-40B4-BE49-F238E27FC236}">
-                <a16:creationId xmlns:a16="http://schemas.microsoft.com/office/drawing/2014/main" id="{111BDBE1-642A-C845-A532-F4A5608ED8ED}"/>
+                <a16:creationId xmlns:a16="http://schemas.microsoft.com/office/drawing/2014/main" id="{86373D03-FA62-B24A-8340-D0E5586C46FC}"/>
               </a:ext>
             </a:extLst>
           </p:cNvPr>
@@ -2578,7 +2398,7 @@
           <p:cNvPr id="7" name="スライド番号プレースホルダー 6">
             <a:extLst>
               <a:ext uri="{FF2B5EF4-FFF2-40B4-BE49-F238E27FC236}">
-                <a16:creationId xmlns:a16="http://schemas.microsoft.com/office/drawing/2014/main" id="{B0A4556F-8521-594B-9D16-38C118588021}"/>
+                <a16:creationId xmlns:a16="http://schemas.microsoft.com/office/drawing/2014/main" id="{A57212BE-5433-F141-A4FE-A4736431E751}"/>
               </a:ext>
             </a:extLst>
           </p:cNvPr>
@@ -2594,7 +2414,7 @@
           <a:bodyPr/>
           <a:lstStyle/>
           <a:p>
-            <a:fld id="{342D3D8F-692A-914F-83FC-E3B1BE524720}" type="slidenum">
+            <a:fld id="{76ADF933-266D-E746-99F4-C7579547FB03}" type="slidenum">
               <a:rPr kumimoji="1" lang="ja-JP" altLang="en-US" smtClean="0"/>
               <a:t>‹#›</a:t>
             </a:fld>
@@ -2605,7 +2425,7 @@
     </p:spTree>
     <p:extLst>
       <p:ext uri="{BB962C8B-B14F-4D97-AF65-F5344CB8AC3E}">
-        <p14:creationId xmlns:p14="http://schemas.microsoft.com/office/powerpoint/2010/main" val="1136092828"/>
+        <p14:creationId xmlns:p14="http://schemas.microsoft.com/office/powerpoint/2010/main" val="1876998709"/>
       </p:ext>
     </p:extLst>
   </p:cSld>
@@ -2637,7 +2457,7 @@
           <p:cNvPr id="2" name="タイトル 1">
             <a:extLst>
               <a:ext uri="{FF2B5EF4-FFF2-40B4-BE49-F238E27FC236}">
-                <a16:creationId xmlns:a16="http://schemas.microsoft.com/office/drawing/2014/main" id="{927B3D9A-5E8B-EB4A-943F-D83F71C688DC}"/>
+                <a16:creationId xmlns:a16="http://schemas.microsoft.com/office/drawing/2014/main" id="{1D8466F3-EA94-644F-92A4-C04259812FD6}"/>
               </a:ext>
             </a:extLst>
           </p:cNvPr>
@@ -2670,7 +2490,7 @@
           <p:cNvPr id="3" name="テキスト プレースホルダー 2">
             <a:extLst>
               <a:ext uri="{FF2B5EF4-FFF2-40B4-BE49-F238E27FC236}">
-                <a16:creationId xmlns:a16="http://schemas.microsoft.com/office/drawing/2014/main" id="{7C63FFBC-6D1A-9D41-AC7F-37544C5EF569}"/>
+                <a16:creationId xmlns:a16="http://schemas.microsoft.com/office/drawing/2014/main" id="{A37A16FA-9D1B-B94A-B8D8-26B9E9E9E302}"/>
               </a:ext>
             </a:extLst>
           </p:cNvPr>
@@ -2741,7 +2561,7 @@
           <p:cNvPr id="4" name="コンテンツ プレースホルダー 3">
             <a:extLst>
               <a:ext uri="{FF2B5EF4-FFF2-40B4-BE49-F238E27FC236}">
-                <a16:creationId xmlns:a16="http://schemas.microsoft.com/office/drawing/2014/main" id="{AD6AC0EB-7960-C941-8AC9-E53FA4FF90FD}"/>
+                <a16:creationId xmlns:a16="http://schemas.microsoft.com/office/drawing/2014/main" id="{76B6B40C-8343-804C-AF71-C47D77E7A720}"/>
               </a:ext>
             </a:extLst>
           </p:cNvPr>
@@ -2835,7 +2655,7 @@
           <p:cNvPr id="5" name="テキスト プレースホルダー 4">
             <a:extLst>
               <a:ext uri="{FF2B5EF4-FFF2-40B4-BE49-F238E27FC236}">
-                <a16:creationId xmlns:a16="http://schemas.microsoft.com/office/drawing/2014/main" id="{780AF87D-77D2-0C4D-89D9-4DA72E6AFFAA}"/>
+                <a16:creationId xmlns:a16="http://schemas.microsoft.com/office/drawing/2014/main" id="{07F6ECA0-1445-3149-93DE-2EE3A21B05EE}"/>
               </a:ext>
             </a:extLst>
           </p:cNvPr>
@@ -2906,7 +2726,7 @@
           <p:cNvPr id="6" name="コンテンツ プレースホルダー 5">
             <a:extLst>
               <a:ext uri="{FF2B5EF4-FFF2-40B4-BE49-F238E27FC236}">
-                <a16:creationId xmlns:a16="http://schemas.microsoft.com/office/drawing/2014/main" id="{13F26D6E-FFA0-FB49-9996-F83B079B4D35}"/>
+                <a16:creationId xmlns:a16="http://schemas.microsoft.com/office/drawing/2014/main" id="{8C10214D-458F-3B4A-82D3-FE7ECB326B98}"/>
               </a:ext>
             </a:extLst>
           </p:cNvPr>
@@ -3000,7 +2820,7 @@
           <p:cNvPr id="7" name="日付プレースホルダー 6">
             <a:extLst>
               <a:ext uri="{FF2B5EF4-FFF2-40B4-BE49-F238E27FC236}">
-                <a16:creationId xmlns:a16="http://schemas.microsoft.com/office/drawing/2014/main" id="{EB5A0841-F460-2F4E-A9C8-8CC6A2B19C4A}"/>
+                <a16:creationId xmlns:a16="http://schemas.microsoft.com/office/drawing/2014/main" id="{85B504CC-A3B0-CD4B-BFBA-184EE2D0F517}"/>
               </a:ext>
             </a:extLst>
           </p:cNvPr>
@@ -3016,9 +2836,9 @@
           <a:bodyPr/>
           <a:lstStyle/>
           <a:p>
-            <a:fld id="{E4245ECD-3E8A-534F-BCF2-3F40B55B6962}" type="datetimeFigureOut">
+            <a:fld id="{109D021F-6DA5-0F41-8FDE-4263179E1E47}" type="datetimeFigureOut">
               <a:rPr kumimoji="1" lang="ja-JP" altLang="en-US" smtClean="0"/>
-              <a:t>2022/10/2</a:t>
+              <a:t>2022/11/1</a:t>
             </a:fld>
             <a:endParaRPr kumimoji="1" lang="ja-JP" altLang="en-US"/>
           </a:p>
@@ -3029,7 +2849,7 @@
           <p:cNvPr id="8" name="フッター プレースホルダー 7">
             <a:extLst>
               <a:ext uri="{FF2B5EF4-FFF2-40B4-BE49-F238E27FC236}">
-                <a16:creationId xmlns:a16="http://schemas.microsoft.com/office/drawing/2014/main" id="{F287484E-EEC2-AA4E-928F-DF3E9E121375}"/>
+                <a16:creationId xmlns:a16="http://schemas.microsoft.com/office/drawing/2014/main" id="{8DA8762F-E5B8-4B4B-95FF-D9D9112B85BC}"/>
               </a:ext>
             </a:extLst>
           </p:cNvPr>
@@ -3054,7 +2874,7 @@
           <p:cNvPr id="9" name="スライド番号プレースホルダー 8">
             <a:extLst>
               <a:ext uri="{FF2B5EF4-FFF2-40B4-BE49-F238E27FC236}">
-                <a16:creationId xmlns:a16="http://schemas.microsoft.com/office/drawing/2014/main" id="{EC670D4D-7ADA-9449-9E19-8FDEF7F5DBB2}"/>
+                <a16:creationId xmlns:a16="http://schemas.microsoft.com/office/drawing/2014/main" id="{73A8B584-6A29-984E-A343-F3073C76894F}"/>
               </a:ext>
             </a:extLst>
           </p:cNvPr>
@@ -3070,7 +2890,7 @@
           <a:bodyPr/>
           <a:lstStyle/>
           <a:p>
-            <a:fld id="{342D3D8F-692A-914F-83FC-E3B1BE524720}" type="slidenum">
+            <a:fld id="{76ADF933-266D-E746-99F4-C7579547FB03}" type="slidenum">
               <a:rPr kumimoji="1" lang="ja-JP" altLang="en-US" smtClean="0"/>
               <a:t>‹#›</a:t>
             </a:fld>
@@ -3081,7 +2901,7 @@
     </p:spTree>
     <p:extLst>
       <p:ext uri="{BB962C8B-B14F-4D97-AF65-F5344CB8AC3E}">
-        <p14:creationId xmlns:p14="http://schemas.microsoft.com/office/powerpoint/2010/main" val="223201374"/>
+        <p14:creationId xmlns:p14="http://schemas.microsoft.com/office/powerpoint/2010/main" val="1386520859"/>
       </p:ext>
     </p:extLst>
   </p:cSld>
@@ -3113,7 +2933,7 @@
           <p:cNvPr id="2" name="タイトル 1">
             <a:extLst>
               <a:ext uri="{FF2B5EF4-FFF2-40B4-BE49-F238E27FC236}">
-                <a16:creationId xmlns:a16="http://schemas.microsoft.com/office/drawing/2014/main" id="{32B4CAB1-C532-9849-9147-91D31E286514}"/>
+                <a16:creationId xmlns:a16="http://schemas.microsoft.com/office/drawing/2014/main" id="{CD4F27B5-CEA6-D647-9E43-096DB215F68A}"/>
               </a:ext>
             </a:extLst>
           </p:cNvPr>
@@ -3141,7 +2961,7 @@
           <p:cNvPr id="3" name="日付プレースホルダー 2">
             <a:extLst>
               <a:ext uri="{FF2B5EF4-FFF2-40B4-BE49-F238E27FC236}">
-                <a16:creationId xmlns:a16="http://schemas.microsoft.com/office/drawing/2014/main" id="{1E96DAFC-A822-BE41-99C5-B782EE5F1133}"/>
+                <a16:creationId xmlns:a16="http://schemas.microsoft.com/office/drawing/2014/main" id="{CE0CDE04-E2E2-FA42-A509-D2701F444AE9}"/>
               </a:ext>
             </a:extLst>
           </p:cNvPr>
@@ -3157,9 +2977,9 @@
           <a:bodyPr/>
           <a:lstStyle/>
           <a:p>
-            <a:fld id="{E4245ECD-3E8A-534F-BCF2-3F40B55B6962}" type="datetimeFigureOut">
+            <a:fld id="{109D021F-6DA5-0F41-8FDE-4263179E1E47}" type="datetimeFigureOut">
               <a:rPr kumimoji="1" lang="ja-JP" altLang="en-US" smtClean="0"/>
-              <a:t>2022/10/2</a:t>
+              <a:t>2022/11/1</a:t>
             </a:fld>
             <a:endParaRPr kumimoji="1" lang="ja-JP" altLang="en-US"/>
           </a:p>
@@ -3170,7 +2990,7 @@
           <p:cNvPr id="4" name="フッター プレースホルダー 3">
             <a:extLst>
               <a:ext uri="{FF2B5EF4-FFF2-40B4-BE49-F238E27FC236}">
-                <a16:creationId xmlns:a16="http://schemas.microsoft.com/office/drawing/2014/main" id="{40AB5EBF-881D-B44B-9F4F-324D10880FDE}"/>
+                <a16:creationId xmlns:a16="http://schemas.microsoft.com/office/drawing/2014/main" id="{D6D9906A-1BD4-EB45-A52F-C877DBB1A44D}"/>
               </a:ext>
             </a:extLst>
           </p:cNvPr>
@@ -3195,7 +3015,7 @@
           <p:cNvPr id="5" name="スライド番号プレースホルダー 4">
             <a:extLst>
               <a:ext uri="{FF2B5EF4-FFF2-40B4-BE49-F238E27FC236}">
-                <a16:creationId xmlns:a16="http://schemas.microsoft.com/office/drawing/2014/main" id="{0C5A455D-B80F-AA40-BCE0-78CA543EF946}"/>
+                <a16:creationId xmlns:a16="http://schemas.microsoft.com/office/drawing/2014/main" id="{7DBB184D-A380-7C4D-A79D-912A2F8E6E39}"/>
               </a:ext>
             </a:extLst>
           </p:cNvPr>
@@ -3211,7 +3031,7 @@
           <a:bodyPr/>
           <a:lstStyle/>
           <a:p>
-            <a:fld id="{342D3D8F-692A-914F-83FC-E3B1BE524720}" type="slidenum">
+            <a:fld id="{76ADF933-266D-E746-99F4-C7579547FB03}" type="slidenum">
               <a:rPr kumimoji="1" lang="ja-JP" altLang="en-US" smtClean="0"/>
               <a:t>‹#›</a:t>
             </a:fld>
@@ -3222,7 +3042,7 @@
     </p:spTree>
     <p:extLst>
       <p:ext uri="{BB962C8B-B14F-4D97-AF65-F5344CB8AC3E}">
-        <p14:creationId xmlns:p14="http://schemas.microsoft.com/office/powerpoint/2010/main" val="590762494"/>
+        <p14:creationId xmlns:p14="http://schemas.microsoft.com/office/powerpoint/2010/main" val="712634733"/>
       </p:ext>
     </p:extLst>
   </p:cSld>
@@ -3254,7 +3074,7 @@
           <p:cNvPr id="2" name="日付プレースホルダー 1">
             <a:extLst>
               <a:ext uri="{FF2B5EF4-FFF2-40B4-BE49-F238E27FC236}">
-                <a16:creationId xmlns:a16="http://schemas.microsoft.com/office/drawing/2014/main" id="{9BE4E826-CC05-D843-AB33-9BB25F375C17}"/>
+                <a16:creationId xmlns:a16="http://schemas.microsoft.com/office/drawing/2014/main" id="{806F93D8-B1BA-D747-B056-A10538BA3C95}"/>
               </a:ext>
             </a:extLst>
           </p:cNvPr>
@@ -3270,9 +3090,9 @@
           <a:bodyPr/>
           <a:lstStyle/>
           <a:p>
-            <a:fld id="{E4245ECD-3E8A-534F-BCF2-3F40B55B6962}" type="datetimeFigureOut">
+            <a:fld id="{109D021F-6DA5-0F41-8FDE-4263179E1E47}" type="datetimeFigureOut">
               <a:rPr kumimoji="1" lang="ja-JP" altLang="en-US" smtClean="0"/>
-              <a:t>2022/10/2</a:t>
+              <a:t>2022/11/1</a:t>
             </a:fld>
             <a:endParaRPr kumimoji="1" lang="ja-JP" altLang="en-US"/>
           </a:p>
@@ -3283,7 +3103,7 @@
           <p:cNvPr id="3" name="フッター プレースホルダー 2">
             <a:extLst>
               <a:ext uri="{FF2B5EF4-FFF2-40B4-BE49-F238E27FC236}">
-                <a16:creationId xmlns:a16="http://schemas.microsoft.com/office/drawing/2014/main" id="{EC16B729-7705-A346-ACFE-C96DD05444E3}"/>
+                <a16:creationId xmlns:a16="http://schemas.microsoft.com/office/drawing/2014/main" id="{C20F48FD-23B5-3D43-A42E-3277FC8440F6}"/>
               </a:ext>
             </a:extLst>
           </p:cNvPr>
@@ -3308,7 +3128,7 @@
           <p:cNvPr id="4" name="スライド番号プレースホルダー 3">
             <a:extLst>
               <a:ext uri="{FF2B5EF4-FFF2-40B4-BE49-F238E27FC236}">
-                <a16:creationId xmlns:a16="http://schemas.microsoft.com/office/drawing/2014/main" id="{AC99AAFE-BE1F-4044-803A-71EA1D8EAD56}"/>
+                <a16:creationId xmlns:a16="http://schemas.microsoft.com/office/drawing/2014/main" id="{AB379B4B-79A5-4B43-AD04-78361D9DB0D7}"/>
               </a:ext>
             </a:extLst>
           </p:cNvPr>
@@ -3324,7 +3144,7 @@
           <a:bodyPr/>
           <a:lstStyle/>
           <a:p>
-            <a:fld id="{342D3D8F-692A-914F-83FC-E3B1BE524720}" type="slidenum">
+            <a:fld id="{76ADF933-266D-E746-99F4-C7579547FB03}" type="slidenum">
               <a:rPr kumimoji="1" lang="ja-JP" altLang="en-US" smtClean="0"/>
               <a:t>‹#›</a:t>
             </a:fld>
@@ -3335,7 +3155,7 @@
     </p:spTree>
     <p:extLst>
       <p:ext uri="{BB962C8B-B14F-4D97-AF65-F5344CB8AC3E}">
-        <p14:creationId xmlns:p14="http://schemas.microsoft.com/office/powerpoint/2010/main" val="2322383630"/>
+        <p14:creationId xmlns:p14="http://schemas.microsoft.com/office/powerpoint/2010/main" val="3826443917"/>
       </p:ext>
     </p:extLst>
   </p:cSld>
@@ -3367,7 +3187,7 @@
           <p:cNvPr id="2" name="タイトル 1">
             <a:extLst>
               <a:ext uri="{FF2B5EF4-FFF2-40B4-BE49-F238E27FC236}">
-                <a16:creationId xmlns:a16="http://schemas.microsoft.com/office/drawing/2014/main" id="{21F2D6ED-1F4F-4048-A3C2-7E4A9C029CEC}"/>
+                <a16:creationId xmlns:a16="http://schemas.microsoft.com/office/drawing/2014/main" id="{22A7DDDD-AAB5-3446-8962-D6051943969F}"/>
               </a:ext>
             </a:extLst>
           </p:cNvPr>
@@ -3404,7 +3224,7 @@
           <p:cNvPr id="3" name="コンテンツ プレースホルダー 2">
             <a:extLst>
               <a:ext uri="{FF2B5EF4-FFF2-40B4-BE49-F238E27FC236}">
-                <a16:creationId xmlns:a16="http://schemas.microsoft.com/office/drawing/2014/main" id="{2FA0BD7E-1620-DC46-BD4F-DBD9F48186DD}"/>
+                <a16:creationId xmlns:a16="http://schemas.microsoft.com/office/drawing/2014/main" id="{83E85080-3C1D-CF43-8B30-A2B7E2E704C2}"/>
               </a:ext>
             </a:extLst>
           </p:cNvPr>
@@ -3526,7 +3346,7 @@
           <p:cNvPr id="4" name="テキスト プレースホルダー 3">
             <a:extLst>
               <a:ext uri="{FF2B5EF4-FFF2-40B4-BE49-F238E27FC236}">
-                <a16:creationId xmlns:a16="http://schemas.microsoft.com/office/drawing/2014/main" id="{A2A9CF8A-E2B7-7A4D-AAA3-918186DAFD59}"/>
+                <a16:creationId xmlns:a16="http://schemas.microsoft.com/office/drawing/2014/main" id="{64D0CBF8-922B-D64F-B2C4-1D31CE2DE63E}"/>
               </a:ext>
             </a:extLst>
           </p:cNvPr>
@@ -3597,7 +3417,7 @@
           <p:cNvPr id="5" name="日付プレースホルダー 4">
             <a:extLst>
               <a:ext uri="{FF2B5EF4-FFF2-40B4-BE49-F238E27FC236}">
-                <a16:creationId xmlns:a16="http://schemas.microsoft.com/office/drawing/2014/main" id="{D90EED2A-D5B5-9548-ABC2-596909B4408A}"/>
+                <a16:creationId xmlns:a16="http://schemas.microsoft.com/office/drawing/2014/main" id="{B64DF647-1704-FE4F-91D2-B4CF938F4A80}"/>
               </a:ext>
             </a:extLst>
           </p:cNvPr>
@@ -3613,9 +3433,9 @@
           <a:bodyPr/>
           <a:lstStyle/>
           <a:p>
-            <a:fld id="{E4245ECD-3E8A-534F-BCF2-3F40B55B6962}" type="datetimeFigureOut">
+            <a:fld id="{109D021F-6DA5-0F41-8FDE-4263179E1E47}" type="datetimeFigureOut">
               <a:rPr kumimoji="1" lang="ja-JP" altLang="en-US" smtClean="0"/>
-              <a:t>2022/10/2</a:t>
+              <a:t>2022/11/1</a:t>
             </a:fld>
             <a:endParaRPr kumimoji="1" lang="ja-JP" altLang="en-US"/>
           </a:p>
@@ -3626,7 +3446,7 @@
           <p:cNvPr id="6" name="フッター プレースホルダー 5">
             <a:extLst>
               <a:ext uri="{FF2B5EF4-FFF2-40B4-BE49-F238E27FC236}">
-                <a16:creationId xmlns:a16="http://schemas.microsoft.com/office/drawing/2014/main" id="{E0ABF483-F156-E143-A009-812D341DC765}"/>
+                <a16:creationId xmlns:a16="http://schemas.microsoft.com/office/drawing/2014/main" id="{F09BD143-3216-FB4D-9A6F-5E1EA005A8C6}"/>
               </a:ext>
             </a:extLst>
           </p:cNvPr>
@@ -3651,7 +3471,7 @@
           <p:cNvPr id="7" name="スライド番号プレースホルダー 6">
             <a:extLst>
               <a:ext uri="{FF2B5EF4-FFF2-40B4-BE49-F238E27FC236}">
-                <a16:creationId xmlns:a16="http://schemas.microsoft.com/office/drawing/2014/main" id="{33B998B4-69D7-9E43-8A6A-F298B8E2B821}"/>
+                <a16:creationId xmlns:a16="http://schemas.microsoft.com/office/drawing/2014/main" id="{9A9FC090-C2D9-E44E-ADB8-78D1D29120FC}"/>
               </a:ext>
             </a:extLst>
           </p:cNvPr>
@@ -3667,7 +3487,7 @@
           <a:bodyPr/>
           <a:lstStyle/>
           <a:p>
-            <a:fld id="{342D3D8F-692A-914F-83FC-E3B1BE524720}" type="slidenum">
+            <a:fld id="{76ADF933-266D-E746-99F4-C7579547FB03}" type="slidenum">
               <a:rPr kumimoji="1" lang="ja-JP" altLang="en-US" smtClean="0"/>
               <a:t>‹#›</a:t>
             </a:fld>
@@ -3678,7 +3498,7 @@
     </p:spTree>
     <p:extLst>
       <p:ext uri="{BB962C8B-B14F-4D97-AF65-F5344CB8AC3E}">
-        <p14:creationId xmlns:p14="http://schemas.microsoft.com/office/powerpoint/2010/main" val="3091106615"/>
+        <p14:creationId xmlns:p14="http://schemas.microsoft.com/office/powerpoint/2010/main" val="1256931563"/>
       </p:ext>
     </p:extLst>
   </p:cSld>
@@ -3710,7 +3530,7 @@
           <p:cNvPr id="2" name="タイトル 1">
             <a:extLst>
               <a:ext uri="{FF2B5EF4-FFF2-40B4-BE49-F238E27FC236}">
-                <a16:creationId xmlns:a16="http://schemas.microsoft.com/office/drawing/2014/main" id="{EC0B1A56-A91F-E14F-8EAE-D80D63E13493}"/>
+                <a16:creationId xmlns:a16="http://schemas.microsoft.com/office/drawing/2014/main" id="{123B8ACE-D09F-2141-B70F-29F888EDF26D}"/>
               </a:ext>
             </a:extLst>
           </p:cNvPr>
@@ -3747,7 +3567,7 @@
           <p:cNvPr id="3" name="図プレースホルダー 2">
             <a:extLst>
               <a:ext uri="{FF2B5EF4-FFF2-40B4-BE49-F238E27FC236}">
-                <a16:creationId xmlns:a16="http://schemas.microsoft.com/office/drawing/2014/main" id="{60B07B00-4F23-A140-8B18-077AE5D5389A}"/>
+                <a16:creationId xmlns:a16="http://schemas.microsoft.com/office/drawing/2014/main" id="{82136264-4465-3745-AC15-8B1762D91404}"/>
               </a:ext>
             </a:extLst>
           </p:cNvPr>
@@ -3814,7 +3634,7 @@
           <p:cNvPr id="4" name="テキスト プレースホルダー 3">
             <a:extLst>
               <a:ext uri="{FF2B5EF4-FFF2-40B4-BE49-F238E27FC236}">
-                <a16:creationId xmlns:a16="http://schemas.microsoft.com/office/drawing/2014/main" id="{2EDC7F53-7896-A848-8C6E-6FA2EED799A3}"/>
+                <a16:creationId xmlns:a16="http://schemas.microsoft.com/office/drawing/2014/main" id="{94FA858B-AC96-3C41-858C-CAF348FAA082}"/>
               </a:ext>
             </a:extLst>
           </p:cNvPr>
@@ -3885,7 +3705,7 @@
           <p:cNvPr id="5" name="日付プレースホルダー 4">
             <a:extLst>
               <a:ext uri="{FF2B5EF4-FFF2-40B4-BE49-F238E27FC236}">
-                <a16:creationId xmlns:a16="http://schemas.microsoft.com/office/drawing/2014/main" id="{A4282972-8B79-D547-BBBA-A360D596231A}"/>
+                <a16:creationId xmlns:a16="http://schemas.microsoft.com/office/drawing/2014/main" id="{A6C6F78D-7C69-9449-97A2-159405FD9890}"/>
               </a:ext>
             </a:extLst>
           </p:cNvPr>
@@ -3901,9 +3721,9 @@
           <a:bodyPr/>
           <a:lstStyle/>
           <a:p>
-            <a:fld id="{E4245ECD-3E8A-534F-BCF2-3F40B55B6962}" type="datetimeFigureOut">
+            <a:fld id="{109D021F-6DA5-0F41-8FDE-4263179E1E47}" type="datetimeFigureOut">
               <a:rPr kumimoji="1" lang="ja-JP" altLang="en-US" smtClean="0"/>
-              <a:t>2022/10/2</a:t>
+              <a:t>2022/11/1</a:t>
             </a:fld>
             <a:endParaRPr kumimoji="1" lang="ja-JP" altLang="en-US"/>
           </a:p>
@@ -3914,7 +3734,7 @@
           <p:cNvPr id="6" name="フッター プレースホルダー 5">
             <a:extLst>
               <a:ext uri="{FF2B5EF4-FFF2-40B4-BE49-F238E27FC236}">
-                <a16:creationId xmlns:a16="http://schemas.microsoft.com/office/drawing/2014/main" id="{B5AB3BF7-BA9F-5C4E-B091-0FAE194EDBCF}"/>
+                <a16:creationId xmlns:a16="http://schemas.microsoft.com/office/drawing/2014/main" id="{7ACE7FDD-D0B1-B741-82B1-C792F1A84DFE}"/>
               </a:ext>
             </a:extLst>
           </p:cNvPr>
@@ -3939,7 +3759,7 @@
           <p:cNvPr id="7" name="スライド番号プレースホルダー 6">
             <a:extLst>
               <a:ext uri="{FF2B5EF4-FFF2-40B4-BE49-F238E27FC236}">
-                <a16:creationId xmlns:a16="http://schemas.microsoft.com/office/drawing/2014/main" id="{23C64F60-A906-9C4D-9834-F7025C97951F}"/>
+                <a16:creationId xmlns:a16="http://schemas.microsoft.com/office/drawing/2014/main" id="{B7068EAA-AD71-724F-9BBF-F3793ACDD31C}"/>
               </a:ext>
             </a:extLst>
           </p:cNvPr>
@@ -3955,7 +3775,7 @@
           <a:bodyPr/>
           <a:lstStyle/>
           <a:p>
-            <a:fld id="{342D3D8F-692A-914F-83FC-E3B1BE524720}" type="slidenum">
+            <a:fld id="{76ADF933-266D-E746-99F4-C7579547FB03}" type="slidenum">
               <a:rPr kumimoji="1" lang="ja-JP" altLang="en-US" smtClean="0"/>
               <a:t>‹#›</a:t>
             </a:fld>
@@ -3966,7 +3786,7 @@
     </p:spTree>
     <p:extLst>
       <p:ext uri="{BB962C8B-B14F-4D97-AF65-F5344CB8AC3E}">
-        <p14:creationId xmlns:p14="http://schemas.microsoft.com/office/powerpoint/2010/main" val="2661005260"/>
+        <p14:creationId xmlns:p14="http://schemas.microsoft.com/office/powerpoint/2010/main" val="238216828"/>
       </p:ext>
     </p:extLst>
   </p:cSld>
@@ -4003,7 +3823,7 @@
           <p:cNvPr id="2" name="タイトル プレースホルダー 1">
             <a:extLst>
               <a:ext uri="{FF2B5EF4-FFF2-40B4-BE49-F238E27FC236}">
-                <a16:creationId xmlns:a16="http://schemas.microsoft.com/office/drawing/2014/main" id="{B52294EA-0378-7643-817B-A47C1A238579}"/>
+                <a16:creationId xmlns:a16="http://schemas.microsoft.com/office/drawing/2014/main" id="{7B30FB00-7ECD-734E-87D6-30BE4EE09B25}"/>
               </a:ext>
             </a:extLst>
           </p:cNvPr>
@@ -4041,7 +3861,7 @@
           <p:cNvPr id="3" name="テキスト プレースホルダー 2">
             <a:extLst>
               <a:ext uri="{FF2B5EF4-FFF2-40B4-BE49-F238E27FC236}">
-                <a16:creationId xmlns:a16="http://schemas.microsoft.com/office/drawing/2014/main" id="{C8F85951-3099-1F43-B21F-E6073F2A9C81}"/>
+                <a16:creationId xmlns:a16="http://schemas.microsoft.com/office/drawing/2014/main" id="{3E97E16B-59C2-8A4C-8AA7-04B5F9F03699}"/>
               </a:ext>
             </a:extLst>
           </p:cNvPr>
@@ -4140,7 +3960,7 @@
           <p:cNvPr id="4" name="日付プレースホルダー 3">
             <a:extLst>
               <a:ext uri="{FF2B5EF4-FFF2-40B4-BE49-F238E27FC236}">
-                <a16:creationId xmlns:a16="http://schemas.microsoft.com/office/drawing/2014/main" id="{74DF4CDC-A61C-9F4F-AA07-410BC0139E0B}"/>
+                <a16:creationId xmlns:a16="http://schemas.microsoft.com/office/drawing/2014/main" id="{957E6DED-AD5D-FB4D-94C2-AEBFA3C2EE0F}"/>
               </a:ext>
             </a:extLst>
           </p:cNvPr>
@@ -4174,9 +3994,9 @@
             </a:lvl1pPr>
           </a:lstStyle>
           <a:p>
-            <a:fld id="{E4245ECD-3E8A-534F-BCF2-3F40B55B6962}" type="datetimeFigureOut">
+            <a:fld id="{109D021F-6DA5-0F41-8FDE-4263179E1E47}" type="datetimeFigureOut">
               <a:rPr kumimoji="1" lang="ja-JP" altLang="en-US" smtClean="0"/>
-              <a:t>2022/10/2</a:t>
+              <a:t>2022/11/1</a:t>
             </a:fld>
             <a:endParaRPr kumimoji="1" lang="ja-JP" altLang="en-US"/>
           </a:p>
@@ -4187,7 +4007,7 @@
           <p:cNvPr id="5" name="フッター プレースホルダー 4">
             <a:extLst>
               <a:ext uri="{FF2B5EF4-FFF2-40B4-BE49-F238E27FC236}">
-                <a16:creationId xmlns:a16="http://schemas.microsoft.com/office/drawing/2014/main" id="{BE76919F-D0A5-5B45-99FA-91843F31598E}"/>
+                <a16:creationId xmlns:a16="http://schemas.microsoft.com/office/drawing/2014/main" id="{42187DC3-F007-3A48-86BB-4922014DF936}"/>
               </a:ext>
             </a:extLst>
           </p:cNvPr>
@@ -4230,7 +4050,7 @@
           <p:cNvPr id="6" name="スライド番号プレースホルダー 5">
             <a:extLst>
               <a:ext uri="{FF2B5EF4-FFF2-40B4-BE49-F238E27FC236}">
-                <a16:creationId xmlns:a16="http://schemas.microsoft.com/office/drawing/2014/main" id="{DA878336-173A-D844-8C2A-3DD6C31CD5F3}"/>
+                <a16:creationId xmlns:a16="http://schemas.microsoft.com/office/drawing/2014/main" id="{F39086E3-8628-5748-985E-D39F44335220}"/>
               </a:ext>
             </a:extLst>
           </p:cNvPr>
@@ -4264,7 +4084,7 @@
             </a:lvl1pPr>
           </a:lstStyle>
           <a:p>
-            <a:fld id="{342D3D8F-692A-914F-83FC-E3B1BE524720}" type="slidenum">
+            <a:fld id="{76ADF933-266D-E746-99F4-C7579547FB03}" type="slidenum">
               <a:rPr kumimoji="1" lang="ja-JP" altLang="en-US" smtClean="0"/>
               <a:t>‹#›</a:t>
             </a:fld>
@@ -4275,7 +4095,7 @@
     </p:spTree>
     <p:extLst>
       <p:ext uri="{BB962C8B-B14F-4D97-AF65-F5344CB8AC3E}">
-        <p14:creationId xmlns:p14="http://schemas.microsoft.com/office/powerpoint/2010/main" val="1580284855"/>
+        <p14:creationId xmlns:p14="http://schemas.microsoft.com/office/powerpoint/2010/main" val="1037986318"/>
       </p:ext>
     </p:extLst>
   </p:cSld>
@@ -4598,7 +4418,7 @@
           <p:cNvPr id="2" name="タイトル 1">
             <a:extLst>
               <a:ext uri="{FF2B5EF4-FFF2-40B4-BE49-F238E27FC236}">
-                <a16:creationId xmlns:a16="http://schemas.microsoft.com/office/drawing/2014/main" id="{9B1D7A41-B18F-4D4C-9F52-84D5CFFFCB44}"/>
+                <a16:creationId xmlns:a16="http://schemas.microsoft.com/office/drawing/2014/main" id="{DB93C512-DB56-EB46-B922-040FEF89D99A}"/>
               </a:ext>
             </a:extLst>
           </p:cNvPr>
@@ -4615,21 +4435,14 @@
           <a:lstStyle/>
           <a:p>
             <a:r>
-              <a:rPr kumimoji="1" lang="en-US" altLang="ja-JP" dirty="0"/>
+              <a:rPr lang="en-US" altLang="ja-JP" dirty="0"/>
               <a:t>R</a:t>
             </a:r>
             <a:r>
-              <a:rPr kumimoji="1" lang="ja-JP" altLang="en-US"/>
-              <a:t>初心者講座第２</a:t>
-            </a:r>
-            <a:r>
               <a:rPr lang="ja-JP" altLang="en-US"/>
-              <a:t>８</a:t>
-            </a:r>
-            <a:r>
-              <a:rPr kumimoji="1" lang="ja-JP" altLang="en-US"/>
-              <a:t>回</a:t>
-            </a:r>
+              <a:t>初心者講座第２８回</a:t>
+            </a:r>
+            <a:endParaRPr kumimoji="1" lang="ja-JP" altLang="en-US"/>
           </a:p>
         </p:txBody>
       </p:sp>
@@ -4638,7 +4451,7 @@
           <p:cNvPr id="3" name="字幕 2">
             <a:extLst>
               <a:ext uri="{FF2B5EF4-FFF2-40B4-BE49-F238E27FC236}">
-                <a16:creationId xmlns:a16="http://schemas.microsoft.com/office/drawing/2014/main" id="{05D7D93A-BA42-5D47-893C-FE41C03A53E0}"/>
+                <a16:creationId xmlns:a16="http://schemas.microsoft.com/office/drawing/2014/main" id="{C58A6C60-930C-7D47-BB5D-98F447457DC9}"/>
               </a:ext>
             </a:extLst>
           </p:cNvPr>
@@ -4655,17 +4468,16 @@
           <a:lstStyle/>
           <a:p>
             <a:r>
-              <a:rPr lang="ja-JP" altLang="en-US"/>
-              <a:t>残差逸脱度</a:t>
-            </a:r>
-            <a:endParaRPr kumimoji="1" lang="ja-JP" altLang="en-US"/>
+              <a:rPr kumimoji="1" lang="ja-JP" altLang="en-US"/>
+              <a:t>過分散</a:t>
+            </a:r>
           </a:p>
         </p:txBody>
       </p:sp>
     </p:spTree>
     <p:extLst>
       <p:ext uri="{BB962C8B-B14F-4D97-AF65-F5344CB8AC3E}">
-        <p14:creationId xmlns:p14="http://schemas.microsoft.com/office/powerpoint/2010/main" val="2432279440"/>
+        <p14:creationId xmlns:p14="http://schemas.microsoft.com/office/powerpoint/2010/main" val="3588196403"/>
       </p:ext>
     </p:extLst>
   </p:cSld>
@@ -4697,7 +4509,7 @@
           <p:cNvPr id="2" name="タイトル 1">
             <a:extLst>
               <a:ext uri="{FF2B5EF4-FFF2-40B4-BE49-F238E27FC236}">
-                <a16:creationId xmlns:a16="http://schemas.microsoft.com/office/drawing/2014/main" id="{3894D0AE-3B29-6F44-AE60-46AA9C21E8A6}"/>
+                <a16:creationId xmlns:a16="http://schemas.microsoft.com/office/drawing/2014/main" id="{7EEF70A2-80E1-5D42-B09A-7B3C2212747A}"/>
               </a:ext>
             </a:extLst>
           </p:cNvPr>
@@ -4714,9 +4526,10 @@
           <a:lstStyle/>
           <a:p>
             <a:r>
-              <a:rPr kumimoji="1" lang="ja-JP" altLang="en-US"/>
-              <a:t>最小二乗法</a:t>
-            </a:r>
+              <a:rPr lang="ja-JP" altLang="en-US"/>
+              <a:t>過分散のチェック</a:t>
+            </a:r>
+            <a:endParaRPr kumimoji="1" lang="ja-JP" altLang="en-US"/>
           </a:p>
         </p:txBody>
       </p:sp>
@@ -4725,7 +4538,7 @@
           <p:cNvPr id="3" name="コンテンツ プレースホルダー 2">
             <a:extLst>
               <a:ext uri="{FF2B5EF4-FFF2-40B4-BE49-F238E27FC236}">
-                <a16:creationId xmlns:a16="http://schemas.microsoft.com/office/drawing/2014/main" id="{F7D8FFA7-2B83-234B-B191-ADBB4833C659}"/>
+                <a16:creationId xmlns:a16="http://schemas.microsoft.com/office/drawing/2014/main" id="{A186CAFC-0030-2E49-8268-A98CF64FBA05}"/>
               </a:ext>
             </a:extLst>
           </p:cNvPr>
@@ -4738,42 +4551,61 @@
         </p:nvSpPr>
         <p:spPr/>
         <p:txBody>
-          <a:bodyPr>
-            <a:normAutofit/>
-          </a:bodyPr>
+          <a:bodyPr/>
           <a:lstStyle/>
           <a:p>
             <a:r>
+              <a:rPr lang="en-US" altLang="ja-JP" dirty="0"/>
+              <a:t>GLM</a:t>
+            </a:r>
+            <a:r>
               <a:rPr lang="ja-JP" altLang="en-US"/>
-              <a:t>残差平方和（残差の２乗の和）を最小化するような係数と切片を見つけ出す方法．残差の大きさはモデルのデータへの当てはまりの悪さと言える．</a:t>
+              <a:t>で</a:t>
+            </a:r>
+            <a:r>
+              <a:rPr kumimoji="1" lang="ja-JP" altLang="en-US"/>
+              <a:t>仮定した誤差構造が、観測値の母集団が持つ誤差を表しているか？</a:t>
+            </a:r>
+            <a:endParaRPr kumimoji="1" lang="en-US" altLang="ja-JP" dirty="0"/>
+          </a:p>
+          <a:p>
+            <a:endParaRPr kumimoji="1" lang="en-US" altLang="ja-JP" dirty="0"/>
+          </a:p>
+          <a:p>
+            <a:r>
+              <a:rPr kumimoji="1" lang="ja-JP" altLang="en-US"/>
+              <a:t>観測値とモデルによる予測値をプロットして比較．</a:t>
+            </a:r>
+            <a:endParaRPr kumimoji="1" lang="en-US" altLang="ja-JP" dirty="0"/>
+          </a:p>
+          <a:p>
+            <a:endParaRPr kumimoji="1" lang="en-US" altLang="ja-JP" dirty="0"/>
+          </a:p>
+          <a:p>
+            <a:r>
+              <a:rPr lang="ja-JP" altLang="en-US"/>
+              <a:t>分散パラメータが規定の値と一致するかをチェック．</a:t>
+            </a:r>
+            <a:endParaRPr kumimoji="1" lang="en-US" altLang="ja-JP" dirty="0"/>
+          </a:p>
+          <a:p>
+            <a:pPr lvl="1"/>
+            <a:r>
+              <a:rPr kumimoji="1" lang="ja-JP" altLang="en-US"/>
+              <a:t>残差逸脱度を残差自由度で割る．（目安として便利）</a:t>
+            </a:r>
+            <a:endParaRPr kumimoji="1" lang="en-US" altLang="ja-JP" dirty="0"/>
+          </a:p>
+          <a:p>
+            <a:pPr lvl="1"/>
+            <a:r>
+              <a:rPr lang="ja-JP" altLang="en-US"/>
+              <a:t>ピアソンのカイ二乗を残差自由度で割る．（より正確）</a:t>
             </a:r>
             <a:endParaRPr lang="en-US" altLang="ja-JP" dirty="0"/>
           </a:p>
           <a:p>
-            <a:endParaRPr lang="en-US" altLang="ja-JP" dirty="0"/>
-          </a:p>
-          <a:p>
-            <a:r>
-              <a:rPr lang="en-US" altLang="ja-JP" dirty="0"/>
-              <a:t> </a:t>
-            </a:r>
-            <a:r>
-              <a:rPr lang="ja-JP" altLang="en-US"/>
-              <a:t>重回帰では説明変数を増やせば（モデルを複雑にすれば）データへの当てはまりは良くなる傾向がある．</a:t>
-            </a:r>
-            <a:endParaRPr lang="en-US" altLang="ja-JP" dirty="0"/>
-          </a:p>
-          <a:p>
-            <a:pPr marL="0" indent="0">
-              <a:buNone/>
-            </a:pPr>
-            <a:r>
-              <a:rPr lang="ja-JP" altLang="en-US"/>
-              <a:t>→　残差は小さくなる．</a:t>
-            </a:r>
-            <a:endParaRPr lang="en-US" altLang="ja-JP" dirty="0"/>
-          </a:p>
-          <a:p>
+            <a:pPr lvl="1"/>
             <a:endParaRPr kumimoji="1" lang="ja-JP" altLang="en-US"/>
           </a:p>
         </p:txBody>
@@ -4781,7 +4613,7 @@
     </p:spTree>
     <p:extLst>
       <p:ext uri="{BB962C8B-B14F-4D97-AF65-F5344CB8AC3E}">
-        <p14:creationId xmlns:p14="http://schemas.microsoft.com/office/powerpoint/2010/main" val="1984855260"/>
+        <p14:creationId xmlns:p14="http://schemas.microsoft.com/office/powerpoint/2010/main" val="571653398"/>
       </p:ext>
     </p:extLst>
   </p:cSld>
@@ -4813,7 +4645,7 @@
           <p:cNvPr id="2" name="タイトル 1">
             <a:extLst>
               <a:ext uri="{FF2B5EF4-FFF2-40B4-BE49-F238E27FC236}">
-                <a16:creationId xmlns:a16="http://schemas.microsoft.com/office/drawing/2014/main" id="{F1440143-3F73-4144-95BF-C420B5DDFBE3}"/>
+                <a16:creationId xmlns:a16="http://schemas.microsoft.com/office/drawing/2014/main" id="{B4A23087-716B-7300-92FD-DB0A5A444C92}"/>
               </a:ext>
             </a:extLst>
           </p:cNvPr>
@@ -4830,10 +4662,25 @@
           <a:lstStyle/>
           <a:p>
             <a:r>
-              <a:rPr lang="ja-JP" altLang="en-US"/>
-              <a:t>モデルの当てはまり具合</a:t>
-            </a:r>
-            <a:endParaRPr kumimoji="1" lang="ja-JP" altLang="en-US"/>
+              <a:rPr kumimoji="1" lang="ja-JP" altLang="en-US"/>
+              <a:t>モデルの予測区間</a:t>
+            </a:r>
+            <a:r>
+              <a:rPr kumimoji="1" lang="en-US" altLang="ja-JP" dirty="0"/>
+              <a:t>PI</a:t>
+            </a:r>
+            <a:r>
+              <a:rPr kumimoji="1" lang="ja-JP" altLang="en-US"/>
+              <a:t>（</a:t>
+            </a:r>
+            <a:r>
+              <a:rPr kumimoji="1" lang="en-US" altLang="ja-JP" dirty="0"/>
+              <a:t>prediction interval</a:t>
+            </a:r>
+            <a:r>
+              <a:rPr kumimoji="1" lang="ja-JP" altLang="en-US"/>
+              <a:t>）</a:t>
+            </a:r>
           </a:p>
         </p:txBody>
       </p:sp>
@@ -4842,7 +4689,7 @@
           <p:cNvPr id="3" name="コンテンツ プレースホルダー 2">
             <a:extLst>
               <a:ext uri="{FF2B5EF4-FFF2-40B4-BE49-F238E27FC236}">
-                <a16:creationId xmlns:a16="http://schemas.microsoft.com/office/drawing/2014/main" id="{9D06DEEC-4A94-B945-9CAA-4461713C3864}"/>
+                <a16:creationId xmlns:a16="http://schemas.microsoft.com/office/drawing/2014/main" id="{2BB8D605-BC20-8BD6-D532-8E5CE0E4B8F6}"/>
               </a:ext>
             </a:extLst>
           </p:cNvPr>
@@ -4853,16 +4700,23 @@
             <p:ph idx="1"/>
           </p:nvPr>
         </p:nvSpPr>
-        <p:spPr/>
-        <p:txBody>
-          <a:bodyPr/>
+        <p:spPr>
+          <a:xfrm>
+            <a:off x="838200" y="1825625"/>
+            <a:ext cx="10515600" cy="4862558"/>
+          </a:xfrm>
+        </p:spPr>
+        <p:txBody>
+          <a:bodyPr>
+            <a:normAutofit fontScale="92500" lnSpcReduction="20000"/>
+          </a:bodyPr>
           <a:lstStyle/>
           <a:p>
             <a:r>
-              <a:rPr lang="ja-JP" altLang="en-US"/>
-              <a:t>データの個数だけ説明変数を用意したときモデルの残差を基準に、より少ない説明変数のモデルでの残差と比較．</a:t>
-            </a:r>
-            <a:endParaRPr lang="en-US" altLang="ja-JP" dirty="0"/>
+              <a:rPr kumimoji="1" lang="ja-JP" altLang="en-US"/>
+              <a:t>回帰分析の結果の予測値と目的変数をプロットしても、仮定した誤差構造の分散とどういう関係にあるかわかりにくい。</a:t>
+            </a:r>
+            <a:endParaRPr kumimoji="1" lang="en-US" altLang="ja-JP" dirty="0"/>
           </a:p>
           <a:p>
             <a:pPr marL="0" indent="0">
@@ -4870,31 +4724,161 @@
             </a:pPr>
             <a:r>
               <a:rPr lang="ja-JP" altLang="en-US"/>
-              <a:t>→モデルの当てはまりの悪さを表現．</a:t>
+              <a:t>→ 予測区間（予測値のまわりに仮定した誤差を考慮して未観測の目的変数がとりうる範囲）を示す</a:t>
             </a:r>
             <a:endParaRPr lang="en-US" altLang="ja-JP" dirty="0"/>
           </a:p>
           <a:p>
+            <a:endParaRPr kumimoji="1" lang="en-US" altLang="ja-JP" dirty="0"/>
+          </a:p>
+          <a:p>
+            <a:r>
+              <a:rPr kumimoji="1" lang="ja-JP" altLang="en-US"/>
+              <a:t>線形モデルでは</a:t>
+            </a:r>
+            <a:r>
+              <a:rPr kumimoji="1" lang="en-US" altLang="ja-JP" dirty="0"/>
+              <a:t>predict</a:t>
+            </a:r>
+            <a:r>
+              <a:rPr kumimoji="1" lang="ja-JP" altLang="en-US"/>
+              <a:t>関数で算出可能</a:t>
+            </a:r>
+            <a:endParaRPr kumimoji="1" lang="en-US" altLang="ja-JP" dirty="0"/>
+          </a:p>
+          <a:p>
+            <a:pPr lvl="1"/>
+            <a:r>
+              <a:rPr lang="en-US" altLang="ja-JP" dirty="0"/>
+              <a:t>predict</a:t>
+            </a:r>
+            <a:r>
+              <a:rPr lang="ja-JP" altLang="en-US"/>
+              <a:t>関数は引数のオプション</a:t>
+            </a:r>
+            <a:r>
+              <a:rPr lang="en-US" altLang="ja-JP" dirty="0"/>
+              <a:t>interval=‘prediction’</a:t>
+            </a:r>
+            <a:r>
+              <a:rPr lang="en-US" altLang="ja-JP" baseline="30000" dirty="0"/>
+              <a:t>※</a:t>
+            </a:r>
+            <a:r>
+              <a:rPr lang="ja-JP" altLang="en-US"/>
+              <a:t>を選ぶと推定したモデルで説明変数の範囲における応答変数の予測区間を出力</a:t>
+            </a:r>
             <a:endParaRPr lang="en-US" altLang="ja-JP" dirty="0"/>
           </a:p>
           <a:p>
+            <a:pPr lvl="1"/>
+            <a:r>
+              <a:rPr kumimoji="1" lang="ja-JP" altLang="en-US"/>
+              <a:t>予測区間の幅は</a:t>
+            </a:r>
+            <a:r>
+              <a:rPr kumimoji="1" lang="en-US" altLang="ja-JP" dirty="0"/>
+              <a:t>level</a:t>
+            </a:r>
+            <a:r>
+              <a:rPr kumimoji="1" lang="ja-JP" altLang="en-US"/>
+              <a:t>で指定（デフォルトは</a:t>
+            </a:r>
+            <a:r>
+              <a:rPr kumimoji="1" lang="en-US" altLang="ja-JP" dirty="0"/>
+              <a:t>95</a:t>
+            </a:r>
+            <a:r>
+              <a:rPr kumimoji="1" lang="ja-JP" altLang="en-US"/>
+              <a:t>％）</a:t>
+            </a:r>
+            <a:endParaRPr lang="en-US" altLang="ja-JP" dirty="0"/>
+          </a:p>
+          <a:p>
+            <a:pPr marL="0" indent="0">
+              <a:buNone/>
+            </a:pPr>
+            <a:r>
+              <a:rPr lang="en-US" altLang="ja-JP" dirty="0"/>
+              <a:t>  	PI95 &lt;-predict(</a:t>
+            </a:r>
+            <a:r>
+              <a:rPr lang="en-US" altLang="ja-JP" dirty="0" err="1"/>
+              <a:t>res_lm_catch</a:t>
+            </a:r>
+            <a:r>
+              <a:rPr lang="en-US" altLang="ja-JP" dirty="0"/>
+              <a:t>, interval=‘prediction’)</a:t>
+            </a:r>
+          </a:p>
+          <a:p>
+            <a:pPr lvl="1"/>
+            <a:r>
+              <a:rPr kumimoji="1" lang="ja-JP" altLang="en-US"/>
+              <a:t>出力値は予測値、</a:t>
+            </a:r>
+            <a:r>
+              <a:rPr kumimoji="1" lang="en-US" altLang="ja-JP" dirty="0"/>
+              <a:t>95</a:t>
+            </a:r>
+            <a:r>
+              <a:rPr kumimoji="1" lang="ja-JP" altLang="en-US"/>
+              <a:t>％予測区間の下限、上限</a:t>
+            </a:r>
+            <a:r>
+              <a:rPr kumimoji="1" lang="en-US" altLang="ja-JP" dirty="0"/>
+              <a:t>(</a:t>
+            </a:r>
+            <a:r>
+              <a:rPr lang="en-US" altLang="ja-JP" i="1" dirty="0"/>
+              <a:t>fit, </a:t>
+            </a:r>
+            <a:r>
+              <a:rPr lang="en-US" altLang="ja-JP" i="1" dirty="0" err="1"/>
+              <a:t>lwr</a:t>
+            </a:r>
+            <a:r>
+              <a:rPr lang="en-US" altLang="ja-JP" i="1" dirty="0"/>
+              <a:t>, </a:t>
+            </a:r>
+            <a:r>
+              <a:rPr lang="en-US" altLang="ja-JP" i="1" dirty="0" err="1"/>
+              <a:t>upr</a:t>
+            </a:r>
+            <a:r>
+              <a:rPr kumimoji="1" lang="en-US" altLang="ja-JP" dirty="0"/>
+              <a:t>)</a:t>
+            </a:r>
+            <a:endParaRPr kumimoji="1" lang="ja-JP" altLang="en-US"/>
+          </a:p>
+          <a:p>
+            <a:pPr lvl="1"/>
+            <a:endParaRPr kumimoji="1" lang="en-US" altLang="ja-JP" dirty="0"/>
+          </a:p>
+          <a:p>
+            <a:pPr marL="457200" lvl="1" indent="0">
+              <a:buNone/>
+            </a:pPr>
+            <a:r>
+              <a:rPr lang="en-US" altLang="ja-JP" dirty="0"/>
+              <a:t>※</a:t>
+            </a:r>
             <a:r>
               <a:rPr lang="ja-JP" altLang="en-US"/>
-              <a:t>データの当てはまり具合は尤度でも表される．</a:t>
-            </a:r>
-            <a:endParaRPr lang="en-US" altLang="ja-JP" dirty="0"/>
-          </a:p>
-          <a:p>
+              <a:t>引数のオプション</a:t>
+            </a:r>
+            <a:r>
+              <a:rPr lang="en-US" altLang="ja-JP" dirty="0"/>
+              <a:t>interval=‘prediction’</a:t>
+            </a:r>
+            <a:r>
+              <a:rPr lang="en-US" altLang="ja-JP" baseline="30000" dirty="0"/>
+              <a:t>※</a:t>
+            </a:r>
             <a:r>
               <a:rPr lang="ja-JP" altLang="en-US"/>
-              <a:t>データの個数だけ説明変数を用意したときの尤度を基準に、より少ない説明変数のモデルでの尤度を比較．</a:t>
-            </a:r>
-            <a:endParaRPr lang="en-US" altLang="ja-JP" dirty="0"/>
-          </a:p>
-          <a:p>
-            <a:endParaRPr lang="en-US" altLang="ja-JP" dirty="0"/>
-          </a:p>
-          <a:p>
+              <a:t>を選ぶと推定したモデルで説明変数の範囲における応答変数の信頼区間を出力</a:t>
+            </a:r>
             <a:endParaRPr kumimoji="1" lang="ja-JP" altLang="en-US"/>
           </a:p>
         </p:txBody>
@@ -4902,7 +4886,7 @@
     </p:spTree>
     <p:extLst>
       <p:ext uri="{BB962C8B-B14F-4D97-AF65-F5344CB8AC3E}">
-        <p14:creationId xmlns:p14="http://schemas.microsoft.com/office/powerpoint/2010/main" val="1251635104"/>
+        <p14:creationId xmlns:p14="http://schemas.microsoft.com/office/powerpoint/2010/main" val="3624075660"/>
       </p:ext>
     </p:extLst>
   </p:cSld>
@@ -4934,7 +4918,7 @@
           <p:cNvPr id="2" name="タイトル 1">
             <a:extLst>
               <a:ext uri="{FF2B5EF4-FFF2-40B4-BE49-F238E27FC236}">
-                <a16:creationId xmlns:a16="http://schemas.microsoft.com/office/drawing/2014/main" id="{032164F6-0F1B-1549-B553-24334B2E64E3}"/>
+                <a16:creationId xmlns:a16="http://schemas.microsoft.com/office/drawing/2014/main" id="{8B9362B7-F4F5-DA4C-BE18-04022AD60A3A}"/>
               </a:ext>
             </a:extLst>
           </p:cNvPr>
@@ -4951,179 +4935,122 @@
           <a:lstStyle/>
           <a:p>
             <a:r>
+              <a:rPr kumimoji="1" lang="en-US" altLang="ja-JP" dirty="0" err="1"/>
+              <a:t>glm</a:t>
+            </a:r>
+            <a:r>
+              <a:rPr kumimoji="1" lang="ja-JP" altLang="en-US"/>
+              <a:t>のオブジェクトから予測区間</a:t>
+            </a:r>
+          </a:p>
+        </p:txBody>
+      </p:sp>
+      <p:sp>
+        <p:nvSpPr>
+          <p:cNvPr id="3" name="コンテンツ プレースホルダー 2">
+            <a:extLst>
+              <a:ext uri="{FF2B5EF4-FFF2-40B4-BE49-F238E27FC236}">
+                <a16:creationId xmlns:a16="http://schemas.microsoft.com/office/drawing/2014/main" id="{AAA871B4-6DD8-B644-83B1-987BCCB56D30}"/>
+              </a:ext>
+            </a:extLst>
+          </p:cNvPr>
+          <p:cNvSpPr>
+            <a:spLocks noGrp="1"/>
+          </p:cNvSpPr>
+          <p:nvPr>
+            <p:ph idx="1"/>
+          </p:nvPr>
+        </p:nvSpPr>
+        <p:spPr/>
+        <p:txBody>
+          <a:bodyPr>
+            <a:normAutofit/>
+          </a:bodyPr>
+          <a:lstStyle/>
+          <a:p>
+            <a:r>
               <a:rPr kumimoji="1" lang="en-US" altLang="ja-JP" dirty="0"/>
-              <a:t>GLM</a:t>
-            </a:r>
-            <a:r>
-              <a:rPr kumimoji="1" lang="ja-JP" altLang="en-US"/>
-              <a:t>の残差</a:t>
-            </a:r>
-          </a:p>
-        </p:txBody>
-      </p:sp>
-      <p:sp>
-        <p:nvSpPr>
-          <p:cNvPr id="3" name="コンテンツ プレースホルダー 2">
-            <a:extLst>
-              <a:ext uri="{FF2B5EF4-FFF2-40B4-BE49-F238E27FC236}">
-                <a16:creationId xmlns:a16="http://schemas.microsoft.com/office/drawing/2014/main" id="{7044DDCB-175D-DC41-A5AC-98AE58CE5A61}"/>
-              </a:ext>
-            </a:extLst>
-          </p:cNvPr>
-          <p:cNvSpPr>
-            <a:spLocks noGrp="1"/>
-          </p:cNvSpPr>
-          <p:nvPr>
-            <p:ph idx="1"/>
-          </p:nvPr>
-        </p:nvSpPr>
-        <p:spPr/>
-        <p:txBody>
-          <a:bodyPr/>
-          <a:lstStyle/>
-          <a:p>
-            <a:r>
-              <a:rPr kumimoji="1" lang="ja-JP" altLang="en-US"/>
-              <a:t>誤差分布が正規分布ではない場合、残差は単純に予測値からのズレを使わない．</a:t>
+              <a:t>predict</a:t>
+            </a:r>
+            <a:r>
+              <a:rPr kumimoji="1" lang="ja-JP" altLang="en-US"/>
+              <a:t>関数で</a:t>
+            </a:r>
+            <a:r>
+              <a:rPr kumimoji="1" lang="en-US" altLang="ja-JP" dirty="0" err="1"/>
+              <a:t>lm</a:t>
+            </a:r>
+            <a:r>
+              <a:rPr kumimoji="1" lang="ja-JP" altLang="en-US"/>
+              <a:t>オブジェクトの予測区間を求められるが、</a:t>
+            </a:r>
+            <a:r>
+              <a:rPr kumimoji="1" lang="en-US" altLang="ja-JP" dirty="0" err="1"/>
+              <a:t>glm</a:t>
+            </a:r>
+            <a:r>
+              <a:rPr kumimoji="1" lang="ja-JP" altLang="en-US"/>
+              <a:t>オブジェクトには非対応．</a:t>
             </a:r>
             <a:endParaRPr kumimoji="1" lang="en-US" altLang="ja-JP" dirty="0"/>
           </a:p>
           <a:p>
-            <a:pPr lvl="1"/>
+            <a:pPr marL="457200" lvl="1" indent="0">
+              <a:buNone/>
+            </a:pPr>
+            <a:endParaRPr kumimoji="1" lang="en-US" altLang="ja-JP" dirty="0"/>
+          </a:p>
+          <a:p>
             <a:r>
               <a:rPr lang="ja-JP" altLang="en-US"/>
-              <a:t>線形予測子の値に依存して誤差の分散が変わるので、線形モデルのように簡単でない．</a:t>
+              <a:t>誤差構造で仮定した分布の確率点（</a:t>
+            </a:r>
+            <a:r>
+              <a:rPr lang="en-US" altLang="ja-JP" dirty="0"/>
+              <a:t>e.g. 2.5</a:t>
+            </a:r>
+            <a:r>
+              <a:rPr lang="ja-JP" altLang="en-US"/>
+              <a:t>、</a:t>
+            </a:r>
+            <a:r>
+              <a:rPr lang="en-US" altLang="ja-JP" dirty="0"/>
+              <a:t>97.5</a:t>
+            </a:r>
+            <a:r>
+              <a:rPr lang="ja-JP" altLang="en-US"/>
+              <a:t>パーセンタイル点）を計算できれば、予測区間を求めることができる．</a:t>
             </a:r>
             <a:endParaRPr lang="en-US" altLang="ja-JP" dirty="0"/>
           </a:p>
           <a:p>
-            <a:endParaRPr kumimoji="1" lang="en-US" altLang="ja-JP" dirty="0">
-              <a:solidFill>
-                <a:schemeClr val="bg2">
-                  <a:lumMod val="50000"/>
-                </a:schemeClr>
-              </a:solidFill>
-            </a:endParaRPr>
-          </a:p>
-          <a:p>
+            <a:endParaRPr lang="en-US" altLang="ja-JP" dirty="0"/>
+          </a:p>
+          <a:p>
+            <a:r>
+              <a:rPr lang="en-US" altLang="ja-JP" dirty="0" err="1"/>
+              <a:t>glm</a:t>
+            </a:r>
             <a:r>
               <a:rPr lang="ja-JP" altLang="en-US"/>
-              <a:t>残差</a:t>
-            </a:r>
-            <a:r>
-              <a:rPr kumimoji="1" lang="ja-JP" altLang="en-US"/>
-              <a:t>の代わりに尤度を使えば、</a:t>
-            </a:r>
-            <a:r>
-              <a:rPr kumimoji="1" lang="en-US" altLang="ja-JP" dirty="0"/>
-              <a:t>GLM</a:t>
-            </a:r>
-            <a:r>
-              <a:rPr kumimoji="1" lang="ja-JP" altLang="en-US"/>
-              <a:t>で当てはまりを評価できる</a:t>
-            </a:r>
-            <a:r>
-              <a:rPr kumimoji="1" lang="en-US" altLang="ja-JP" dirty="0"/>
-              <a:t>.</a:t>
+              <a:t>結果オブジェクトから</a:t>
+            </a:r>
+            <a:r>
+              <a:rPr lang="en-US" altLang="ja-JP" dirty="0"/>
+              <a:t>95%</a:t>
+            </a:r>
+            <a:r>
+              <a:rPr lang="ja-JP" altLang="en-US"/>
+              <a:t>の予測区間を計算してプロットしてみよう．</a:t>
             </a:r>
           </a:p>
           <a:p>
             <a:endParaRPr lang="en-US" altLang="ja-JP" dirty="0"/>
           </a:p>
           <a:p>
-            <a:r>
-              <a:rPr lang="en-US" altLang="ja-JP" dirty="0">
-                <a:solidFill>
-                  <a:schemeClr val="bg2">
-                    <a:lumMod val="50000"/>
-                  </a:schemeClr>
-                </a:solidFill>
-              </a:rPr>
-              <a:t>residuals</a:t>
-            </a:r>
-            <a:r>
-              <a:rPr lang="ja-JP" altLang="en-US">
-                <a:solidFill>
-                  <a:schemeClr val="bg2">
-                    <a:lumMod val="50000"/>
-                  </a:schemeClr>
-                </a:solidFill>
-              </a:rPr>
-              <a:t>関数で</a:t>
-            </a:r>
-            <a:r>
-              <a:rPr lang="en-US" altLang="ja-JP" dirty="0">
-                <a:solidFill>
-                  <a:schemeClr val="bg2">
-                    <a:lumMod val="50000"/>
-                  </a:schemeClr>
-                </a:solidFill>
-              </a:rPr>
-              <a:t>deviance</a:t>
-            </a:r>
-            <a:r>
-              <a:rPr lang="ja-JP" altLang="en-US">
-                <a:solidFill>
-                  <a:schemeClr val="bg2">
-                    <a:lumMod val="50000"/>
-                  </a:schemeClr>
-                </a:solidFill>
-              </a:rPr>
-              <a:t>を指定して取り出す．</a:t>
-            </a:r>
-            <a:endParaRPr lang="en-US" altLang="ja-JP" dirty="0">
-              <a:solidFill>
-                <a:schemeClr val="bg2">
-                  <a:lumMod val="50000"/>
-                </a:schemeClr>
-              </a:solidFill>
-            </a:endParaRPr>
-          </a:p>
-          <a:p>
-            <a:pPr lvl="1"/>
-            <a:r>
-              <a:rPr lang="en-US" altLang="ja-JP" dirty="0" err="1">
-                <a:solidFill>
-                  <a:schemeClr val="bg2">
-                    <a:lumMod val="50000"/>
-                  </a:schemeClr>
-                </a:solidFill>
-              </a:rPr>
-              <a:t>resid_glm</a:t>
-            </a:r>
-            <a:r>
-              <a:rPr lang="en-US" altLang="ja-JP" dirty="0">
-                <a:solidFill>
-                  <a:schemeClr val="bg2">
-                    <a:lumMod val="50000"/>
-                  </a:schemeClr>
-                </a:solidFill>
-              </a:rPr>
-              <a:t> &lt;- residuals(</a:t>
-            </a:r>
-            <a:r>
-              <a:rPr lang="en-US" altLang="ja-JP" dirty="0" err="1">
-                <a:solidFill>
-                  <a:schemeClr val="bg2">
-                    <a:lumMod val="50000"/>
-                  </a:schemeClr>
-                </a:solidFill>
-              </a:rPr>
-              <a:t>res_glm</a:t>
-            </a:r>
-            <a:r>
-              <a:rPr lang="en-US" altLang="ja-JP" dirty="0">
-                <a:solidFill>
-                  <a:schemeClr val="bg2">
-                    <a:lumMod val="50000"/>
-                  </a:schemeClr>
-                </a:solidFill>
-              </a:rPr>
-              <a:t>, type=“deviance”)</a:t>
-            </a:r>
-          </a:p>
-          <a:p>
-            <a:pPr lvl="1"/>
+            <a:endParaRPr lang="en-US" altLang="ja-JP" dirty="0"/>
+          </a:p>
+          <a:p>
             <a:endParaRPr lang="en-US" altLang="ja-JP" dirty="0"/>
           </a:p>
         </p:txBody>
@@ -5131,7 +5058,7 @@
     </p:spTree>
     <p:extLst>
       <p:ext uri="{BB962C8B-B14F-4D97-AF65-F5344CB8AC3E}">
-        <p14:creationId xmlns:p14="http://schemas.microsoft.com/office/powerpoint/2010/main" val="2447858462"/>
+        <p14:creationId xmlns:p14="http://schemas.microsoft.com/office/powerpoint/2010/main" val="85445077"/>
       </p:ext>
     </p:extLst>
   </p:cSld>
@@ -5163,7 +5090,7 @@
           <p:cNvPr id="2" name="タイトル 1">
             <a:extLst>
               <a:ext uri="{FF2B5EF4-FFF2-40B4-BE49-F238E27FC236}">
-                <a16:creationId xmlns:a16="http://schemas.microsoft.com/office/drawing/2014/main" id="{52AC1BEC-2208-B441-A40B-CE42D1E9F678}"/>
+                <a16:creationId xmlns:a16="http://schemas.microsoft.com/office/drawing/2014/main" id="{7D1CB8DE-7E37-8843-9926-BCCB00963A6E}"/>
               </a:ext>
             </a:extLst>
           </p:cNvPr>
@@ -5181,7 +5108,15 @@
           <a:p>
             <a:r>
               <a:rPr kumimoji="1" lang="ja-JP" altLang="en-US"/>
-              <a:t>逸脱度</a:t>
+              <a:t>自由度（</a:t>
+            </a:r>
+            <a:r>
+              <a:rPr kumimoji="1" lang="en-US" altLang="ja-JP" dirty="0"/>
+              <a:t>degree of freedom, df</a:t>
+            </a:r>
+            <a:r>
+              <a:rPr kumimoji="1" lang="ja-JP" altLang="en-US"/>
+              <a:t>）</a:t>
             </a:r>
           </a:p>
         </p:txBody>
@@ -5191,7 +5126,7 @@
           <p:cNvPr id="3" name="コンテンツ プレースホルダー 2">
             <a:extLst>
               <a:ext uri="{FF2B5EF4-FFF2-40B4-BE49-F238E27FC236}">
-                <a16:creationId xmlns:a16="http://schemas.microsoft.com/office/drawing/2014/main" id="{92857569-606C-B048-BBF1-17179C8C8C9A}"/>
+                <a16:creationId xmlns:a16="http://schemas.microsoft.com/office/drawing/2014/main" id="{C92B07B6-339F-834A-BA51-25593D8DC76C}"/>
               </a:ext>
             </a:extLst>
           </p:cNvPr>
@@ -5202,758 +5137,231 @@
             <p:ph idx="1"/>
           </p:nvPr>
         </p:nvSpPr>
-        <p:spPr>
-          <a:xfrm>
-            <a:off x="838200" y="1825625"/>
-            <a:ext cx="8940501" cy="4351338"/>
-          </a:xfrm>
-        </p:spPr>
+        <p:spPr/>
         <p:txBody>
           <a:bodyPr>
-            <a:normAutofit fontScale="85000" lnSpcReduction="10000"/>
+            <a:normAutofit lnSpcReduction="10000"/>
           </a:bodyPr>
           <a:lstStyle/>
           <a:p>
             <a:r>
+              <a:rPr lang="ja-JP" altLang="en-US"/>
+              <a:t>平均値など、なんらかの統計量が与えられたとき、束縛されない標本のデータ個数（サンプルサイズ）．</a:t>
+            </a:r>
+            <a:endParaRPr lang="en-US" altLang="ja-JP" dirty="0"/>
+          </a:p>
+          <a:p>
+            <a:pPr lvl="1"/>
+            <a:r>
               <a:rPr kumimoji="1" lang="en-US" altLang="ja-JP" dirty="0"/>
-              <a:t>GLM</a:t>
-            </a:r>
-            <a:r>
-              <a:rPr kumimoji="1" lang="ja-JP" altLang="en-US"/>
-              <a:t>で当てはめたモデルの最尤推定結果から得られる対数尤度</a:t>
+              <a:t>Ex) </a:t>
+            </a:r>
+            <a:r>
+              <a:rPr kumimoji="1" lang="ja-JP" altLang="en-US"/>
+              <a:t>（母）平均が</a:t>
             </a:r>
             <a:r>
               <a:rPr kumimoji="1" lang="en-US" altLang="ja-JP" dirty="0"/>
-              <a:t>L</a:t>
-            </a:r>
-            <a:r>
-              <a:rPr kumimoji="1" lang="en-US" altLang="ja-JP" baseline="30000" dirty="0"/>
-              <a:t>*</a:t>
-            </a:r>
-            <a:r>
-              <a:rPr kumimoji="1" lang="ja-JP" altLang="en-US"/>
-              <a:t>に−</a:t>
+              <a:t>5</a:t>
+            </a:r>
+            <a:r>
+              <a:rPr kumimoji="1" lang="ja-JP" altLang="en-US"/>
+              <a:t>であると仮定したとき、サンプルサイズが</a:t>
             </a:r>
             <a:r>
               <a:rPr kumimoji="1" lang="en-US" altLang="ja-JP" dirty="0"/>
+              <a:t>10 (x</a:t>
+            </a:r>
+            <a:r>
+              <a:rPr kumimoji="1" lang="en-US" altLang="ja-JP" baseline="-25000" dirty="0"/>
+              <a:t>1</a:t>
+            </a:r>
+            <a:r>
+              <a:rPr kumimoji="1" lang="en-US" altLang="ja-JP" dirty="0"/>
+              <a:t>,x</a:t>
+            </a:r>
+            <a:r>
+              <a:rPr kumimoji="1" lang="en-US" altLang="ja-JP" baseline="-25000" dirty="0"/>
               <a:t>2</a:t>
             </a:r>
             <a:r>
-              <a:rPr kumimoji="1" lang="ja-JP" altLang="en-US"/>
-              <a:t>をかけたものを逸脱度</a:t>
-            </a:r>
-            <a:r>
               <a:rPr kumimoji="1" lang="en-US" altLang="ja-JP" dirty="0"/>
-              <a:t>D(deviance)</a:t>
+              <a:t>,…,x</a:t>
+            </a:r>
+            <a:r>
+              <a:rPr kumimoji="1" lang="en-US" altLang="ja-JP" baseline="-25000" dirty="0"/>
+              <a:t>10</a:t>
+            </a:r>
+            <a:r>
+              <a:rPr kumimoji="1" lang="en-US" altLang="ja-JP" dirty="0"/>
+              <a:t>)</a:t>
+            </a:r>
+            <a:r>
+              <a:rPr kumimoji="1" lang="ja-JP" altLang="en-US"/>
+              <a:t>であれば、</a:t>
+            </a:r>
+            <a:r>
+              <a:rPr lang="en-US" altLang="ja-JP" dirty="0"/>
+              <a:t>x</a:t>
+            </a:r>
+            <a:r>
+              <a:rPr lang="en-US" altLang="ja-JP" baseline="-25000" dirty="0"/>
+              <a:t>1</a:t>
+            </a:r>
+            <a:r>
+              <a:rPr lang="en-US" altLang="ja-JP" dirty="0"/>
+              <a:t>〜x</a:t>
+            </a:r>
+            <a:r>
+              <a:rPr lang="en-US" altLang="ja-JP" baseline="-25000" dirty="0"/>
+              <a:t>9</a:t>
             </a:r>
             <a:r>
               <a:rPr lang="ja-JP" altLang="en-US"/>
-              <a:t>という．</a:t>
+              <a:t>までどんな値をとっても</a:t>
+            </a:r>
+            <a:r>
+              <a:rPr lang="en-US" altLang="ja-JP" dirty="0"/>
+              <a:t> x</a:t>
+            </a:r>
+            <a:r>
+              <a:rPr lang="en-US" altLang="ja-JP" baseline="-25000" dirty="0"/>
+              <a:t>10</a:t>
+            </a:r>
+            <a:r>
+              <a:rPr lang="ja-JP" altLang="en-US"/>
+              <a:t>で調整して平均を</a:t>
+            </a:r>
+            <a:r>
+              <a:rPr lang="en-US" altLang="ja-JP" dirty="0"/>
+              <a:t>5</a:t>
+            </a:r>
+            <a:r>
+              <a:rPr lang="ja-JP" altLang="en-US"/>
+              <a:t>にできる．→自由度は</a:t>
+            </a:r>
+            <a:r>
+              <a:rPr lang="en-US" altLang="ja-JP" dirty="0"/>
+              <a:t>9</a:t>
+            </a:r>
+            <a:r>
+              <a:rPr lang="ja-JP" altLang="en-US"/>
+              <a:t>（サンプルサイズー</a:t>
+            </a:r>
+            <a:r>
+              <a:rPr lang="en-US" altLang="ja-JP" dirty="0"/>
+              <a:t>1</a:t>
+            </a:r>
+            <a:r>
+              <a:rPr lang="ja-JP" altLang="en-US"/>
+              <a:t>）</a:t>
             </a:r>
             <a:endParaRPr lang="en-US" altLang="ja-JP" dirty="0"/>
           </a:p>
           <a:p>
             <a:pPr lvl="1"/>
-            <a:r>
-              <a:rPr kumimoji="1" lang="en-US" altLang="ja-JP" i="1" dirty="0"/>
-              <a:t>D</a:t>
+            <a:endParaRPr kumimoji="1" lang="en-US" altLang="ja-JP" dirty="0"/>
+          </a:p>
+          <a:p>
+            <a:r>
+              <a:rPr lang="en-US" altLang="ja-JP" dirty="0"/>
+              <a:t> </a:t>
+            </a:r>
+            <a:r>
+              <a:rPr lang="ja-JP" altLang="en-US"/>
+              <a:t>線形モデルでは</a:t>
+            </a:r>
+            <a:r>
+              <a:rPr kumimoji="1" lang="ja-JP" altLang="en-US"/>
+              <a:t>サンプルサイズから</a:t>
             </a:r>
             <a:r>
               <a:rPr kumimoji="1" lang="en-US" altLang="ja-JP" dirty="0"/>
-              <a:t> = </a:t>
+              <a:t>(</a:t>
+            </a:r>
+            <a:r>
+              <a:rPr kumimoji="1" lang="ja-JP" altLang="en-US"/>
+              <a:t>切片＋推定パラメータ数</a:t>
+            </a:r>
+            <a:r>
+              <a:rPr kumimoji="1" lang="en-US" altLang="ja-JP" dirty="0"/>
+              <a:t>)</a:t>
+            </a:r>
+            <a:r>
+              <a:rPr kumimoji="1" lang="ja-JP" altLang="en-US"/>
+              <a:t> などを差し引く．</a:t>
+            </a:r>
+            <a:endParaRPr kumimoji="1" lang="en-US" altLang="ja-JP" dirty="0"/>
+          </a:p>
+          <a:p>
+            <a:pPr lvl="1"/>
+            <a:r>
+              <a:rPr lang="ja-JP" altLang="en-US"/>
+              <a:t>第</a:t>
             </a:r>
             <a:r>
               <a:rPr lang="en-US" altLang="ja-JP" dirty="0"/>
-              <a:t>−</a:t>
-            </a:r>
-            <a:r>
-              <a:rPr kumimoji="1" lang="en-US" altLang="ja-JP" dirty="0"/>
-              <a:t>2 log </a:t>
-            </a:r>
-            <a:r>
-              <a:rPr kumimoji="1" lang="en-US" altLang="ja-JP" i="1" dirty="0"/>
-              <a:t>L</a:t>
-            </a:r>
-            <a:r>
-              <a:rPr kumimoji="1" lang="en-US" altLang="ja-JP" i="1" baseline="30000" dirty="0"/>
-              <a:t>*</a:t>
-            </a:r>
-          </a:p>
-          <a:p>
+              <a:t>12</a:t>
+            </a:r>
+            <a:r>
+              <a:rPr lang="ja-JP" altLang="en-US"/>
+              <a:t>回の</a:t>
+            </a:r>
+            <a:r>
+              <a:rPr lang="en-US" altLang="ja-JP" dirty="0" err="1"/>
+              <a:t>lm</a:t>
+            </a:r>
+            <a:r>
+              <a:rPr lang="ja-JP" altLang="en-US"/>
+              <a:t>、第</a:t>
+            </a:r>
+            <a:r>
+              <a:rPr lang="en-US" altLang="ja-JP" dirty="0"/>
+              <a:t>20</a:t>
+            </a:r>
+            <a:r>
+              <a:rPr lang="ja-JP" altLang="en-US"/>
+              <a:t>回の</a:t>
+            </a:r>
+            <a:r>
+              <a:rPr lang="en-US" altLang="ja-JP" dirty="0" err="1"/>
+              <a:t>glm</a:t>
+            </a:r>
+            <a:r>
+              <a:rPr lang="ja-JP" altLang="en-US"/>
+              <a:t>解析結果で自由度をチェック</a:t>
+            </a:r>
             <a:endParaRPr lang="en-US" altLang="ja-JP" dirty="0"/>
           </a:p>
           <a:p>
-            <a:r>
-              <a:rPr kumimoji="1" lang="ja-JP" altLang="en-US"/>
-              <a:t>データ数分の説明変数を組んだモデル（フルモデル</a:t>
-            </a:r>
-            <a:r>
-              <a:rPr kumimoji="1" lang="en-US" altLang="ja-JP" baseline="30000" dirty="0"/>
-              <a:t>※</a:t>
-            </a:r>
-            <a:r>
-              <a:rPr kumimoji="1" lang="ja-JP" altLang="en-US"/>
-              <a:t>）で最尤推定した結果から得られる逸脱度を最小逸脱度</a:t>
-            </a:r>
-            <a:endParaRPr kumimoji="1" lang="en-US" altLang="ja-JP" dirty="0"/>
-          </a:p>
-          <a:p>
-            <a:r>
-              <a:rPr kumimoji="1" lang="ja-JP" altLang="en-US"/>
-              <a:t>説明変数はなく、切片のみで組んだモデル</a:t>
-            </a:r>
-            <a:r>
-              <a:rPr lang="ja-JP" altLang="en-US"/>
-              <a:t>（</a:t>
-            </a:r>
+            <a:pPr lvl="1"/>
             <a:r>
               <a:rPr lang="en-US" altLang="ja-JP" dirty="0"/>
-              <a:t>Null</a:t>
-            </a:r>
-            <a:r>
-              <a:rPr lang="ja-JP" altLang="en-US"/>
-              <a:t>モデル）からえられた得られた逸脱度を最大逸脱度としたとき、最大逸脱度と最小逸脱度との差を</a:t>
+              <a:t>summary(</a:t>
+            </a:r>
+            <a:r>
+              <a:rPr lang="en-US" altLang="ja-JP" dirty="0" err="1"/>
+              <a:t>res_lm_catch</a:t>
             </a:r>
             <a:r>
               <a:rPr lang="en-US" altLang="ja-JP" dirty="0"/>
-              <a:t>Null</a:t>
-            </a:r>
-            <a:r>
-              <a:rPr lang="ja-JP" altLang="en-US"/>
-              <a:t>逸脱度</a:t>
-            </a:r>
-            <a:r>
-              <a:rPr lang="en-US" altLang="ja-JP" dirty="0"/>
-              <a:t>(Null deviance)</a:t>
-            </a:r>
-            <a:r>
-              <a:rPr lang="ja-JP" altLang="en-US"/>
-              <a:t>と呼ぶ．</a:t>
-            </a:r>
-            <a:endParaRPr lang="en-US" altLang="ja-JP" dirty="0"/>
-          </a:p>
-          <a:p>
-            <a:endParaRPr kumimoji="1" lang="en-US" altLang="ja-JP" dirty="0"/>
-          </a:p>
-          <a:p>
-            <a:r>
-              <a:rPr kumimoji="1" lang="en-US" altLang="ja-JP" dirty="0"/>
-              <a:t>GLM</a:t>
-            </a:r>
-            <a:r>
-              <a:rPr kumimoji="1" lang="ja-JP" altLang="en-US"/>
-              <a:t>で当てはめた逸脱度</a:t>
-            </a:r>
-            <a:r>
-              <a:rPr lang="en-US" altLang="ja-JP" dirty="0"/>
-              <a:t>D</a:t>
-            </a:r>
-            <a:r>
-              <a:rPr lang="ja-JP" altLang="en-US"/>
-              <a:t>と最小逸脱度の差を残差逸脱度</a:t>
-            </a:r>
-            <a:r>
-              <a:rPr lang="en-US" altLang="ja-JP" dirty="0"/>
-              <a:t>(Residual deviance) </a:t>
-            </a:r>
-            <a:r>
-              <a:rPr lang="ja-JP" altLang="en-US"/>
-              <a:t>とよぶ．</a:t>
+              <a:t>)</a:t>
+            </a:r>
+          </a:p>
+          <a:p>
+            <a:pPr lvl="1"/>
+            <a:r>
+              <a:rPr kumimoji="1" lang="en-US" altLang="ja-JP" dirty="0" err="1"/>
+              <a:t>res_glm_gala</a:t>
             </a:r>
             <a:endParaRPr kumimoji="1" lang="ja-JP" altLang="en-US"/>
-          </a:p>
-        </p:txBody>
-      </p:sp>
-      <p:cxnSp>
-        <p:nvCxnSpPr>
-          <p:cNvPr id="5" name="直線コネクタ 4">
-            <a:extLst>
-              <a:ext uri="{FF2B5EF4-FFF2-40B4-BE49-F238E27FC236}">
-                <a16:creationId xmlns:a16="http://schemas.microsoft.com/office/drawing/2014/main" id="{A06420D0-0E8A-A84B-A1DB-06629A992E59}"/>
-              </a:ext>
-            </a:extLst>
-          </p:cNvPr>
-          <p:cNvCxnSpPr/>
-          <p:nvPr/>
-        </p:nvCxnSpPr>
-        <p:spPr>
-          <a:xfrm>
-            <a:off x="10670203" y="1266940"/>
-            <a:ext cx="0" cy="4737253"/>
-          </a:xfrm>
-          <a:prstGeom prst="line">
-            <a:avLst/>
-          </a:prstGeom>
-          <a:ln w="25400">
-            <a:headEnd type="arrow"/>
-            <a:tailEnd type="arrow"/>
-          </a:ln>
-        </p:spPr>
-        <p:style>
-          <a:lnRef idx="1">
-            <a:schemeClr val="accent1"/>
-          </a:lnRef>
-          <a:fillRef idx="0">
-            <a:schemeClr val="accent1"/>
-          </a:fillRef>
-          <a:effectRef idx="0">
-            <a:schemeClr val="accent1"/>
-          </a:effectRef>
-          <a:fontRef idx="minor">
-            <a:schemeClr val="tx1"/>
-          </a:fontRef>
-        </p:style>
-      </p:cxnSp>
-      <p:cxnSp>
-        <p:nvCxnSpPr>
-          <p:cNvPr id="7" name="直線コネクタ 6">
-            <a:extLst>
-              <a:ext uri="{FF2B5EF4-FFF2-40B4-BE49-F238E27FC236}">
-                <a16:creationId xmlns:a16="http://schemas.microsoft.com/office/drawing/2014/main" id="{30494F45-918C-D745-9577-5C9B611146D9}"/>
-              </a:ext>
-            </a:extLst>
-          </p:cNvPr>
-          <p:cNvCxnSpPr>
-            <a:cxnSpLocks/>
-          </p:cNvCxnSpPr>
-          <p:nvPr/>
-        </p:nvCxnSpPr>
-        <p:spPr>
-          <a:xfrm>
-            <a:off x="10203218" y="6004193"/>
-            <a:ext cx="1318222" cy="0"/>
-          </a:xfrm>
-          <a:prstGeom prst="line">
-            <a:avLst/>
-          </a:prstGeom>
-          <a:ln w="25400">
-            <a:solidFill>
-              <a:schemeClr val="tx1">
-                <a:lumMod val="50000"/>
-                <a:lumOff val="50000"/>
-              </a:schemeClr>
-            </a:solidFill>
-          </a:ln>
-        </p:spPr>
-        <p:style>
-          <a:lnRef idx="1">
-            <a:schemeClr val="accent1"/>
-          </a:lnRef>
-          <a:fillRef idx="0">
-            <a:schemeClr val="accent1"/>
-          </a:fillRef>
-          <a:effectRef idx="0">
-            <a:schemeClr val="accent1"/>
-          </a:effectRef>
-          <a:fontRef idx="minor">
-            <a:schemeClr val="tx1"/>
-          </a:fontRef>
-        </p:style>
-      </p:cxnSp>
-      <p:cxnSp>
-        <p:nvCxnSpPr>
-          <p:cNvPr id="9" name="直線コネクタ 8">
-            <a:extLst>
-              <a:ext uri="{FF2B5EF4-FFF2-40B4-BE49-F238E27FC236}">
-                <a16:creationId xmlns:a16="http://schemas.microsoft.com/office/drawing/2014/main" id="{3B6EF299-2EAB-5043-8E41-B77B9661678A}"/>
-              </a:ext>
-            </a:extLst>
-          </p:cNvPr>
-          <p:cNvCxnSpPr>
-            <a:cxnSpLocks/>
-          </p:cNvCxnSpPr>
-          <p:nvPr/>
-        </p:nvCxnSpPr>
-        <p:spPr>
-          <a:xfrm>
-            <a:off x="10203218" y="1266940"/>
-            <a:ext cx="1318222" cy="0"/>
-          </a:xfrm>
-          <a:prstGeom prst="line">
-            <a:avLst/>
-          </a:prstGeom>
-          <a:ln w="25400">
-            <a:solidFill>
-              <a:schemeClr val="tx1">
-                <a:lumMod val="50000"/>
-                <a:lumOff val="50000"/>
-              </a:schemeClr>
-            </a:solidFill>
-          </a:ln>
-        </p:spPr>
-        <p:style>
-          <a:lnRef idx="1">
-            <a:schemeClr val="accent1"/>
-          </a:lnRef>
-          <a:fillRef idx="0">
-            <a:schemeClr val="accent1"/>
-          </a:fillRef>
-          <a:effectRef idx="0">
-            <a:schemeClr val="accent1"/>
-          </a:effectRef>
-          <a:fontRef idx="minor">
-            <a:schemeClr val="tx1"/>
-          </a:fontRef>
-        </p:style>
-      </p:cxnSp>
-      <p:sp>
-        <p:nvSpPr>
-          <p:cNvPr id="10" name="テキスト ボックス 9">
-            <a:extLst>
-              <a:ext uri="{FF2B5EF4-FFF2-40B4-BE49-F238E27FC236}">
-                <a16:creationId xmlns:a16="http://schemas.microsoft.com/office/drawing/2014/main" id="{7920EEB4-9D5C-CE4E-8585-350A37871857}"/>
-              </a:ext>
-            </a:extLst>
-          </p:cNvPr>
-          <p:cNvSpPr txBox="1"/>
-          <p:nvPr/>
-        </p:nvSpPr>
-        <p:spPr>
-          <a:xfrm rot="16200000">
-            <a:off x="9541911" y="3971492"/>
-            <a:ext cx="1776563" cy="369332"/>
-          </a:xfrm>
-          <a:prstGeom prst="rect">
-            <a:avLst/>
-          </a:prstGeom>
-          <a:noFill/>
-        </p:spPr>
-        <p:txBody>
-          <a:bodyPr wrap="square" rtlCol="0">
-            <a:spAutoFit/>
-          </a:bodyPr>
-          <a:lstStyle/>
-          <a:p>
-            <a:r>
-              <a:rPr kumimoji="1" lang="en-US" altLang="ja-JP" dirty="0">
-                <a:solidFill>
-                  <a:schemeClr val="accent1"/>
-                </a:solidFill>
-              </a:rPr>
-              <a:t>Null deviance</a:t>
-            </a:r>
-            <a:endParaRPr kumimoji="1" lang="ja-JP" altLang="en-US">
-              <a:solidFill>
-                <a:schemeClr val="accent1"/>
-              </a:solidFill>
-            </a:endParaRPr>
-          </a:p>
-        </p:txBody>
-      </p:sp>
-      <p:sp>
-        <p:nvSpPr>
-          <p:cNvPr id="11" name="テキスト ボックス 10">
-            <a:extLst>
-              <a:ext uri="{FF2B5EF4-FFF2-40B4-BE49-F238E27FC236}">
-                <a16:creationId xmlns:a16="http://schemas.microsoft.com/office/drawing/2014/main" id="{ECB93667-65E8-7C48-8CED-C905124DF10C}"/>
-              </a:ext>
-            </a:extLst>
-          </p:cNvPr>
-          <p:cNvSpPr txBox="1"/>
-          <p:nvPr/>
-        </p:nvSpPr>
-        <p:spPr>
-          <a:xfrm>
-            <a:off x="10261663" y="6094162"/>
-            <a:ext cx="1930337" cy="646331"/>
-          </a:xfrm>
-          <a:prstGeom prst="rect">
-            <a:avLst/>
-          </a:prstGeom>
-          <a:noFill/>
-        </p:spPr>
-        <p:txBody>
-          <a:bodyPr wrap="none" rtlCol="0">
-            <a:spAutoFit/>
-          </a:bodyPr>
-          <a:lstStyle/>
-          <a:p>
-            <a:r>
-              <a:rPr lang="en-US" altLang="ja-JP" dirty="0"/>
-              <a:t>full model</a:t>
-            </a:r>
-            <a:r>
-              <a:rPr lang="ja-JP" altLang="en-US"/>
-              <a:t>による</a:t>
-            </a:r>
-            <a:endParaRPr lang="en-US" altLang="ja-JP" dirty="0"/>
-          </a:p>
-          <a:p>
-            <a:r>
-              <a:rPr kumimoji="1" lang="ja-JP" altLang="en-US"/>
-              <a:t>最小の逸脱度</a:t>
-            </a:r>
-          </a:p>
-        </p:txBody>
-      </p:sp>
-      <p:sp>
-        <p:nvSpPr>
-          <p:cNvPr id="13" name="テキスト ボックス 12">
-            <a:extLst>
-              <a:ext uri="{FF2B5EF4-FFF2-40B4-BE49-F238E27FC236}">
-                <a16:creationId xmlns:a16="http://schemas.microsoft.com/office/drawing/2014/main" id="{368B959A-8D30-504B-90C8-34EBA867A279}"/>
-              </a:ext>
-            </a:extLst>
-          </p:cNvPr>
-          <p:cNvSpPr txBox="1"/>
-          <p:nvPr/>
-        </p:nvSpPr>
-        <p:spPr>
-          <a:xfrm>
-            <a:off x="10228661" y="530640"/>
-            <a:ext cx="1999265" cy="646331"/>
-          </a:xfrm>
-          <a:prstGeom prst="rect">
-            <a:avLst/>
-          </a:prstGeom>
-          <a:noFill/>
-        </p:spPr>
-        <p:txBody>
-          <a:bodyPr wrap="none" rtlCol="0">
-            <a:spAutoFit/>
-          </a:bodyPr>
-          <a:lstStyle/>
-          <a:p>
-            <a:r>
-              <a:rPr lang="en-US" altLang="ja-JP" dirty="0"/>
-              <a:t>Null</a:t>
-            </a:r>
-            <a:r>
-              <a:rPr lang="ja-JP" altLang="en-US"/>
-              <a:t>モデルによる</a:t>
-            </a:r>
-            <a:endParaRPr lang="en-US" altLang="ja-JP" dirty="0"/>
-          </a:p>
-          <a:p>
-            <a:r>
-              <a:rPr kumimoji="1" lang="ja-JP" altLang="en-US"/>
-              <a:t>最大の逸脱度</a:t>
-            </a:r>
-          </a:p>
-        </p:txBody>
-      </p:sp>
-      <p:sp>
-        <p:nvSpPr>
-          <p:cNvPr id="14" name="テキスト ボックス 13">
-            <a:extLst>
-              <a:ext uri="{FF2B5EF4-FFF2-40B4-BE49-F238E27FC236}">
-                <a16:creationId xmlns:a16="http://schemas.microsoft.com/office/drawing/2014/main" id="{D7AEE5E8-9EF9-B44C-870D-0A7459F4E6A7}"/>
-              </a:ext>
-            </a:extLst>
-          </p:cNvPr>
-          <p:cNvSpPr txBox="1"/>
-          <p:nvPr/>
-        </p:nvSpPr>
-        <p:spPr>
-          <a:xfrm rot="16200000">
-            <a:off x="10338328" y="4340043"/>
-            <a:ext cx="2111475" cy="369332"/>
-          </a:xfrm>
-          <a:prstGeom prst="rect">
-            <a:avLst/>
-          </a:prstGeom>
-          <a:noFill/>
-        </p:spPr>
-        <p:txBody>
-          <a:bodyPr wrap="none" rtlCol="0">
-            <a:spAutoFit/>
-          </a:bodyPr>
-          <a:lstStyle/>
-          <a:p>
-            <a:r>
-              <a:rPr lang="en-US" altLang="ja-JP" dirty="0">
-                <a:solidFill>
-                  <a:srgbClr val="FF0000"/>
-                </a:solidFill>
-              </a:rPr>
-              <a:t>Residual</a:t>
-            </a:r>
-            <a:r>
-              <a:rPr kumimoji="1" lang="en-US" altLang="ja-JP" dirty="0">
-                <a:solidFill>
-                  <a:srgbClr val="FF0000"/>
-                </a:solidFill>
-              </a:rPr>
-              <a:t> deviance</a:t>
-            </a:r>
-            <a:endParaRPr kumimoji="1" lang="ja-JP" altLang="en-US">
-              <a:solidFill>
-                <a:srgbClr val="FF0000"/>
-              </a:solidFill>
-            </a:endParaRPr>
-          </a:p>
-        </p:txBody>
-      </p:sp>
-      <p:cxnSp>
-        <p:nvCxnSpPr>
-          <p:cNvPr id="15" name="直線コネクタ 14">
-            <a:extLst>
-              <a:ext uri="{FF2B5EF4-FFF2-40B4-BE49-F238E27FC236}">
-                <a16:creationId xmlns:a16="http://schemas.microsoft.com/office/drawing/2014/main" id="{9D9F5C4D-934E-3445-9A13-71AE8417AC32}"/>
-              </a:ext>
-            </a:extLst>
-          </p:cNvPr>
-          <p:cNvCxnSpPr>
-            <a:cxnSpLocks/>
-          </p:cNvCxnSpPr>
-          <p:nvPr/>
-        </p:nvCxnSpPr>
-        <p:spPr>
-          <a:xfrm>
-            <a:off x="11114366" y="3215640"/>
-            <a:ext cx="0" cy="2788553"/>
-          </a:xfrm>
-          <a:prstGeom prst="line">
-            <a:avLst/>
-          </a:prstGeom>
-          <a:ln w="25400">
-            <a:solidFill>
-              <a:srgbClr val="FF0000"/>
-            </a:solidFill>
-            <a:headEnd type="arrow"/>
-            <a:tailEnd type="arrow"/>
-          </a:ln>
-        </p:spPr>
-        <p:style>
-          <a:lnRef idx="1">
-            <a:schemeClr val="accent1"/>
-          </a:lnRef>
-          <a:fillRef idx="0">
-            <a:schemeClr val="accent1"/>
-          </a:fillRef>
-          <a:effectRef idx="0">
-            <a:schemeClr val="accent1"/>
-          </a:effectRef>
-          <a:fontRef idx="minor">
-            <a:schemeClr val="tx1"/>
-          </a:fontRef>
-        </p:style>
-      </p:cxnSp>
-      <p:cxnSp>
-        <p:nvCxnSpPr>
-          <p:cNvPr id="18" name="直線コネクタ 17">
-            <a:extLst>
-              <a:ext uri="{FF2B5EF4-FFF2-40B4-BE49-F238E27FC236}">
-                <a16:creationId xmlns:a16="http://schemas.microsoft.com/office/drawing/2014/main" id="{F9732587-A468-434C-9594-9C3FAAD00357}"/>
-              </a:ext>
-            </a:extLst>
-          </p:cNvPr>
-          <p:cNvCxnSpPr>
-            <a:cxnSpLocks/>
-          </p:cNvCxnSpPr>
-          <p:nvPr/>
-        </p:nvCxnSpPr>
-        <p:spPr>
-          <a:xfrm>
-            <a:off x="10190181" y="3215640"/>
-            <a:ext cx="1356702" cy="0"/>
-          </a:xfrm>
-          <a:prstGeom prst="line">
-            <a:avLst/>
-          </a:prstGeom>
-          <a:ln w="25400">
-            <a:solidFill>
-              <a:schemeClr val="tx1">
-                <a:lumMod val="50000"/>
-                <a:lumOff val="50000"/>
-              </a:schemeClr>
-            </a:solidFill>
-          </a:ln>
-        </p:spPr>
-        <p:style>
-          <a:lnRef idx="1">
-            <a:schemeClr val="accent1"/>
-          </a:lnRef>
-          <a:fillRef idx="0">
-            <a:schemeClr val="accent1"/>
-          </a:fillRef>
-          <a:effectRef idx="0">
-            <a:schemeClr val="accent1"/>
-          </a:effectRef>
-          <a:fontRef idx="minor">
-            <a:schemeClr val="tx1"/>
-          </a:fontRef>
-        </p:style>
-      </p:cxnSp>
-      <p:sp>
-        <p:nvSpPr>
-          <p:cNvPr id="20" name="テキスト ボックス 19">
-            <a:extLst>
-              <a:ext uri="{FF2B5EF4-FFF2-40B4-BE49-F238E27FC236}">
-                <a16:creationId xmlns:a16="http://schemas.microsoft.com/office/drawing/2014/main" id="{4412D54C-E400-A348-9C5D-B9099C670194}"/>
-              </a:ext>
-            </a:extLst>
-          </p:cNvPr>
-          <p:cNvSpPr txBox="1"/>
-          <p:nvPr/>
-        </p:nvSpPr>
-        <p:spPr>
-          <a:xfrm>
-            <a:off x="10670203" y="2479339"/>
-            <a:ext cx="1569660" cy="646331"/>
-          </a:xfrm>
-          <a:prstGeom prst="rect">
-            <a:avLst/>
-          </a:prstGeom>
-          <a:noFill/>
-        </p:spPr>
-        <p:txBody>
-          <a:bodyPr wrap="none" rtlCol="0">
-            <a:spAutoFit/>
-          </a:bodyPr>
-          <a:lstStyle/>
-          <a:p>
-            <a:r>
-              <a:rPr kumimoji="1" lang="ja-JP" altLang="en-US"/>
-              <a:t>対象のモデル</a:t>
-            </a:r>
-            <a:endParaRPr kumimoji="1" lang="en-US" altLang="ja-JP" dirty="0"/>
-          </a:p>
-          <a:p>
-            <a:r>
-              <a:rPr lang="ja-JP" altLang="en-US"/>
-              <a:t>による逸脱度</a:t>
-            </a:r>
-            <a:endParaRPr kumimoji="1" lang="ja-JP" altLang="en-US"/>
-          </a:p>
-        </p:txBody>
-      </p:sp>
-      <p:cxnSp>
-        <p:nvCxnSpPr>
-          <p:cNvPr id="21" name="直線コネクタ 20">
-            <a:extLst>
-              <a:ext uri="{FF2B5EF4-FFF2-40B4-BE49-F238E27FC236}">
-                <a16:creationId xmlns:a16="http://schemas.microsoft.com/office/drawing/2014/main" id="{A29A8BBB-E9AB-C84F-B76C-D85219AB31B3}"/>
-              </a:ext>
-            </a:extLst>
-          </p:cNvPr>
-          <p:cNvCxnSpPr>
-            <a:cxnSpLocks/>
-          </p:cNvCxnSpPr>
-          <p:nvPr/>
-        </p:nvCxnSpPr>
-        <p:spPr>
-          <a:xfrm>
-            <a:off x="10190181" y="620608"/>
-            <a:ext cx="0" cy="5947832"/>
-          </a:xfrm>
-          <a:prstGeom prst="line">
-            <a:avLst/>
-          </a:prstGeom>
-          <a:ln w="25400">
-            <a:solidFill>
-              <a:schemeClr val="tx1"/>
-            </a:solidFill>
-            <a:headEnd type="none"/>
-            <a:tailEnd type="none"/>
-          </a:ln>
-        </p:spPr>
-        <p:style>
-          <a:lnRef idx="1">
-            <a:schemeClr val="accent1"/>
-          </a:lnRef>
-          <a:fillRef idx="0">
-            <a:schemeClr val="accent1"/>
-          </a:fillRef>
-          <a:effectRef idx="0">
-            <a:schemeClr val="accent1"/>
-          </a:effectRef>
-          <a:fontRef idx="minor">
-            <a:schemeClr val="tx1"/>
-          </a:fontRef>
-        </p:style>
-      </p:cxnSp>
-      <p:sp>
-        <p:nvSpPr>
-          <p:cNvPr id="25" name="テキスト ボックス 24">
-            <a:extLst>
-              <a:ext uri="{FF2B5EF4-FFF2-40B4-BE49-F238E27FC236}">
-                <a16:creationId xmlns:a16="http://schemas.microsoft.com/office/drawing/2014/main" id="{3CC48E9A-D2AF-5A4C-8E75-252BE744E3E9}"/>
-              </a:ext>
-            </a:extLst>
-          </p:cNvPr>
-          <p:cNvSpPr txBox="1"/>
-          <p:nvPr/>
-        </p:nvSpPr>
-        <p:spPr>
-          <a:xfrm rot="16200000">
-            <a:off x="8838212" y="3182255"/>
-            <a:ext cx="2252540" cy="369332"/>
-          </a:xfrm>
-          <a:prstGeom prst="rect">
-            <a:avLst/>
-          </a:prstGeom>
-          <a:noFill/>
-        </p:spPr>
-        <p:txBody>
-          <a:bodyPr wrap="none" rtlCol="0">
-            <a:spAutoFit/>
-          </a:bodyPr>
-          <a:lstStyle/>
-          <a:p>
-            <a:r>
-              <a:rPr lang="en-US" altLang="ja-JP" dirty="0"/>
-              <a:t>d</a:t>
-            </a:r>
-            <a:r>
-              <a:rPr kumimoji="1" lang="en-US" altLang="ja-JP" dirty="0"/>
-              <a:t>eviance   -2 log </a:t>
-            </a:r>
-            <a:r>
-              <a:rPr kumimoji="1" lang="en-US" altLang="ja-JP" i="1" dirty="0"/>
-              <a:t>L</a:t>
-            </a:r>
-            <a:r>
-              <a:rPr kumimoji="1" lang="en-US" altLang="ja-JP" baseline="30000" dirty="0"/>
-              <a:t>*</a:t>
-            </a:r>
-            <a:endParaRPr kumimoji="1" lang="ja-JP" altLang="en-US" baseline="30000"/>
-          </a:p>
-        </p:txBody>
-      </p:sp>
-      <p:sp>
-        <p:nvSpPr>
-          <p:cNvPr id="4" name="テキスト ボックス 3">
-            <a:extLst>
-              <a:ext uri="{FF2B5EF4-FFF2-40B4-BE49-F238E27FC236}">
-                <a16:creationId xmlns:a16="http://schemas.microsoft.com/office/drawing/2014/main" id="{D5FEAA56-4932-FD59-DF9A-B4F511BDBF1A}"/>
-              </a:ext>
-            </a:extLst>
-          </p:cNvPr>
-          <p:cNvSpPr txBox="1"/>
-          <p:nvPr/>
-        </p:nvSpPr>
-        <p:spPr>
-          <a:xfrm>
-            <a:off x="923449" y="6488668"/>
-            <a:ext cx="6337829" cy="369332"/>
-          </a:xfrm>
-          <a:prstGeom prst="rect">
-            <a:avLst/>
-          </a:prstGeom>
-          <a:noFill/>
-        </p:spPr>
-        <p:txBody>
-          <a:bodyPr wrap="square" rtlCol="0">
-            <a:spAutoFit/>
-          </a:bodyPr>
-          <a:lstStyle/>
-          <a:p>
-            <a:r>
-              <a:rPr kumimoji="1" lang="en-US" altLang="ja-JP" dirty="0"/>
-              <a:t>※</a:t>
-            </a:r>
-            <a:r>
-              <a:rPr kumimoji="1" lang="ja-JP" altLang="en-US"/>
-              <a:t>フルモデルの定義が、モデル選択の場合と違うので注意</a:t>
-            </a:r>
           </a:p>
         </p:txBody>
       </p:sp>
     </p:spTree>
     <p:extLst>
       <p:ext uri="{BB962C8B-B14F-4D97-AF65-F5344CB8AC3E}">
-        <p14:creationId xmlns:p14="http://schemas.microsoft.com/office/powerpoint/2010/main" val="2595786992"/>
+        <p14:creationId xmlns:p14="http://schemas.microsoft.com/office/powerpoint/2010/main" val="1216965000"/>
       </p:ext>
     </p:extLst>
   </p:cSld>
@@ -5985,7 +5393,7 @@
           <p:cNvPr id="2" name="タイトル 1">
             <a:extLst>
               <a:ext uri="{FF2B5EF4-FFF2-40B4-BE49-F238E27FC236}">
-                <a16:creationId xmlns:a16="http://schemas.microsoft.com/office/drawing/2014/main" id="{51AA4A24-C87F-0340-9C26-29126700D1D9}"/>
+                <a16:creationId xmlns:a16="http://schemas.microsoft.com/office/drawing/2014/main" id="{8735B3ED-534B-9148-BE43-146E345053C2}"/>
               </a:ext>
             </a:extLst>
           </p:cNvPr>
@@ -6002,149 +5410,289 @@
           <a:lstStyle/>
           <a:p>
             <a:r>
+              <a:rPr kumimoji="1" lang="ja-JP" altLang="en-US"/>
+              <a:t>カイ二乗（</a:t>
+            </a:r>
+            <a:r>
+              <a:rPr kumimoji="1" lang="en-US" altLang="ja-JP" dirty="0"/>
+              <a:t>Χ</a:t>
+            </a:r>
+            <a:r>
+              <a:rPr kumimoji="1" lang="en-US" altLang="ja-JP" baseline="30000" dirty="0"/>
+              <a:t>2</a:t>
+            </a:r>
+            <a:r>
+              <a:rPr kumimoji="1" lang="ja-JP" altLang="en-US"/>
+              <a:t>）と検定</a:t>
+            </a:r>
+          </a:p>
+        </p:txBody>
+      </p:sp>
+      <p:sp>
+        <p:nvSpPr>
+          <p:cNvPr id="3" name="コンテンツ プレースホルダー 2">
+            <a:extLst>
+              <a:ext uri="{FF2B5EF4-FFF2-40B4-BE49-F238E27FC236}">
+                <a16:creationId xmlns:a16="http://schemas.microsoft.com/office/drawing/2014/main" id="{53329B6A-02E6-674F-BCF0-66057978508F}"/>
+              </a:ext>
+            </a:extLst>
+          </p:cNvPr>
+          <p:cNvSpPr>
+            <a:spLocks noGrp="1"/>
+          </p:cNvSpPr>
+          <p:nvPr>
+            <p:ph idx="1"/>
+          </p:nvPr>
+        </p:nvSpPr>
+        <p:spPr>
+          <a:xfrm>
+            <a:off x="838199" y="1825625"/>
+            <a:ext cx="10863649" cy="4351338"/>
+          </a:xfrm>
+        </p:spPr>
+        <p:txBody>
+          <a:bodyPr>
+            <a:normAutofit/>
+          </a:bodyPr>
+          <a:lstStyle/>
+          <a:p>
+            <a:r>
+              <a:rPr kumimoji="1" lang="ja-JP" altLang="en-US"/>
+              <a:t>カイ</a:t>
+            </a:r>
+            <a:r>
+              <a:rPr kumimoji="1" lang="en-US" altLang="ja-JP" dirty="0"/>
+              <a:t>2</a:t>
+            </a:r>
+            <a:r>
+              <a:rPr kumimoji="1" lang="ja-JP" altLang="en-US"/>
+              <a:t>乗とは、観測値</a:t>
+            </a:r>
+            <a:r>
+              <a:rPr kumimoji="1" lang="en-US" altLang="ja-JP" dirty="0"/>
+              <a:t>O</a:t>
+            </a:r>
+            <a:r>
+              <a:rPr kumimoji="1" lang="ja-JP" altLang="en-US"/>
+              <a:t>とモデルによる推定値（期待値）</a:t>
+            </a:r>
+            <a:r>
+              <a:rPr kumimoji="1" lang="en-US" altLang="ja-JP" dirty="0"/>
+              <a:t>E</a:t>
+            </a:r>
+            <a:r>
+              <a:rPr kumimoji="1" lang="ja-JP" altLang="en-US"/>
+              <a:t>との差分の二乗</a:t>
+            </a:r>
+            <a:r>
+              <a:rPr kumimoji="1" lang="en-US" altLang="ja-JP" dirty="0"/>
+              <a:t>(O-E)</a:t>
+            </a:r>
+            <a:r>
+              <a:rPr kumimoji="1" lang="ja-JP" altLang="en-US"/>
+              <a:t>を</a:t>
+            </a:r>
+            <a:r>
+              <a:rPr kumimoji="1" lang="en-US" altLang="ja-JP" dirty="0"/>
+              <a:t>E</a:t>
+            </a:r>
+            <a:r>
+              <a:rPr kumimoji="1" lang="ja-JP" altLang="en-US"/>
+              <a:t>で割った総和．</a:t>
+            </a:r>
+            <a:endParaRPr kumimoji="1" lang="en-US" altLang="ja-JP" dirty="0"/>
+          </a:p>
+          <a:p>
+            <a:pPr lvl="1"/>
+            <a:r>
               <a:rPr lang="ja-JP" altLang="en-US"/>
-              <a:t>逸脱度と</a:t>
+              <a:t>サンプルサイズが</a:t>
             </a:r>
             <a:r>
               <a:rPr lang="en-US" altLang="ja-JP" dirty="0"/>
-              <a:t>AIC</a:t>
-            </a:r>
-            <a:endParaRPr kumimoji="1" lang="ja-JP" altLang="en-US"/>
-          </a:p>
-        </p:txBody>
-      </p:sp>
-      <p:sp>
-        <p:nvSpPr>
-          <p:cNvPr id="3" name="コンテンツ プレースホルダー 2">
-            <a:extLst>
-              <a:ext uri="{FF2B5EF4-FFF2-40B4-BE49-F238E27FC236}">
-                <a16:creationId xmlns:a16="http://schemas.microsoft.com/office/drawing/2014/main" id="{A3D0ED53-FAAB-AD43-A6F9-C615C36B1450}"/>
-              </a:ext>
-            </a:extLst>
-          </p:cNvPr>
-          <p:cNvSpPr>
-            <a:spLocks noGrp="1"/>
-          </p:cNvSpPr>
-          <p:nvPr>
-            <p:ph idx="1"/>
-          </p:nvPr>
-        </p:nvSpPr>
-        <p:spPr/>
-        <p:txBody>
-          <a:bodyPr/>
-          <a:lstStyle/>
-          <a:p>
-            <a:r>
-              <a:rPr kumimoji="1" lang="ja-JP" altLang="en-US"/>
-              <a:t>赤池情報量基準</a:t>
-            </a:r>
+              <a:t>n</a:t>
+            </a:r>
+            <a:r>
+              <a:rPr lang="ja-JP" altLang="en-US"/>
+              <a:t>のとき、</a:t>
+            </a:r>
+            <a:r>
+              <a:rPr lang="en-US" altLang="ja-JP" dirty="0"/>
+              <a:t>Χ</a:t>
+            </a:r>
+            <a:r>
+              <a:rPr lang="en-US" altLang="ja-JP" baseline="30000" dirty="0"/>
+              <a:t>2</a:t>
+            </a:r>
+            <a:r>
+              <a:rPr lang="en-US" altLang="ja-JP" dirty="0"/>
+              <a:t> = </a:t>
+            </a:r>
+            <a:r>
+              <a:rPr lang="en-US" altLang="ja-JP" dirty="0" err="1"/>
+              <a:t>Σ</a:t>
+            </a:r>
+            <a:r>
+              <a:rPr lang="en-US" altLang="ja-JP" baseline="-25000" dirty="0" err="1"/>
+              <a:t>i</a:t>
+            </a:r>
+            <a:r>
+              <a:rPr lang="en-US" altLang="ja-JP" baseline="-25000" dirty="0"/>
+              <a:t>=1</a:t>
+            </a:r>
+            <a:r>
+              <a:rPr lang="en-US" altLang="ja-JP" baseline="30000" dirty="0"/>
+              <a:t>n</a:t>
+            </a:r>
+            <a:r>
+              <a:rPr lang="en-US" altLang="ja-JP" dirty="0"/>
+              <a:t>(O</a:t>
+            </a:r>
+            <a:r>
+              <a:rPr lang="en-US" altLang="ja-JP" baseline="-25000" dirty="0"/>
+              <a:t>i</a:t>
+            </a:r>
+            <a:r>
+              <a:rPr lang="en-US" altLang="ja-JP" dirty="0"/>
+              <a:t>-</a:t>
+            </a:r>
+            <a:r>
+              <a:rPr lang="en-US" altLang="ja-JP" dirty="0" err="1"/>
+              <a:t>E</a:t>
+            </a:r>
+            <a:r>
+              <a:rPr lang="en-US" altLang="ja-JP" baseline="-25000" dirty="0" err="1"/>
+              <a:t>i</a:t>
+            </a:r>
+            <a:r>
+              <a:rPr lang="en-US" altLang="ja-JP" dirty="0"/>
+              <a:t>)</a:t>
+            </a:r>
+            <a:r>
+              <a:rPr lang="en-US" altLang="ja-JP" baseline="30000" dirty="0"/>
+              <a:t>^2</a:t>
+            </a:r>
+            <a:r>
+              <a:rPr lang="en-US" altLang="ja-JP" dirty="0"/>
+              <a:t>/</a:t>
+            </a:r>
+            <a:r>
+              <a:rPr lang="en-US" altLang="ja-JP" dirty="0" err="1"/>
+              <a:t>E</a:t>
+            </a:r>
+            <a:r>
+              <a:rPr lang="en-US" altLang="ja-JP" baseline="-25000" dirty="0" err="1"/>
+              <a:t>i</a:t>
+            </a:r>
+            <a:endParaRPr lang="en-US" altLang="ja-JP" baseline="-25000" dirty="0"/>
+          </a:p>
+          <a:p>
+            <a:pPr lvl="1"/>
+            <a:endParaRPr lang="en-US" altLang="ja-JP" dirty="0"/>
+          </a:p>
+          <a:p>
+            <a:r>
+              <a:rPr kumimoji="1" lang="ja-JP" altLang="en-US"/>
+              <a:t>ジャンケンで出す手（グー、チョキ、パー）の例．</a:t>
+            </a:r>
+            <a:endParaRPr kumimoji="1" lang="en-US" altLang="ja-JP" dirty="0"/>
+          </a:p>
+          <a:p>
+            <a:pPr lvl="1"/>
+            <a:r>
+              <a:rPr kumimoji="1" lang="ja-JP" altLang="en-US"/>
+              <a:t>出す手に偏りがない場合</a:t>
+            </a:r>
+            <a:r>
+              <a:rPr lang="ja-JP" altLang="en-US"/>
+              <a:t>（確率</a:t>
+            </a:r>
+            <a:r>
+              <a:rPr lang="en-US" altLang="ja-JP" dirty="0"/>
+              <a:t>1/3</a:t>
+            </a:r>
+            <a:r>
+              <a:rPr lang="ja-JP" altLang="en-US"/>
+              <a:t>でそれぞれの手を出す場合）、</a:t>
+            </a:r>
+            <a:r>
+              <a:rPr lang="en-US" altLang="ja-JP" dirty="0"/>
+              <a:t>100</a:t>
+            </a:r>
+            <a:r>
+              <a:rPr lang="ja-JP" altLang="en-US"/>
+              <a:t>回ジャンケンをするとそれぞれの手が出る期待値は</a:t>
+            </a:r>
+            <a:r>
+              <a:rPr lang="en-US" altLang="ja-JP" dirty="0"/>
+              <a:t>(100/3, 100/3, 100/3)</a:t>
+            </a:r>
+            <a:r>
+              <a:rPr lang="ja-JP" altLang="en-US"/>
+              <a:t>．</a:t>
+            </a:r>
+            <a:endParaRPr lang="en-US" altLang="ja-JP" dirty="0"/>
+          </a:p>
+          <a:p>
+            <a:pPr lvl="1"/>
+            <a:r>
+              <a:rPr lang="ja-JP" altLang="en-US"/>
+              <a:t>これに対して</a:t>
+            </a:r>
+            <a:r>
+              <a:rPr lang="en-US" altLang="ja-JP" dirty="0"/>
+              <a:t>100</a:t>
+            </a:r>
+            <a:r>
+              <a:rPr lang="ja-JP" altLang="en-US"/>
+              <a:t>回のジャンケンで</a:t>
+            </a:r>
+            <a:r>
+              <a:rPr lang="en-US" altLang="ja-JP" dirty="0"/>
+              <a:t>(40,20,40)</a:t>
+            </a:r>
+            <a:r>
+              <a:rPr lang="ja-JP" altLang="en-US"/>
+              <a:t>が観測されたとする．</a:t>
+            </a:r>
+          </a:p>
+          <a:p>
+            <a:pPr lvl="1"/>
+            <a:r>
+              <a:rPr kumimoji="1" lang="ja-JP" altLang="en-US"/>
+              <a:t>このとき、カイ二乗は</a:t>
+            </a:r>
+            <a:endParaRPr kumimoji="1" lang="en-US" altLang="ja-JP" dirty="0"/>
+          </a:p>
+          <a:p>
+            <a:pPr marL="457200" lvl="1" indent="0">
+              <a:buNone/>
+            </a:pPr>
             <a:r>
               <a:rPr kumimoji="1" lang="en-US" altLang="ja-JP" dirty="0"/>
-              <a:t>(AIC)</a:t>
-            </a:r>
-            <a:r>
-              <a:rPr kumimoji="1" lang="ja-JP" altLang="en-US"/>
-              <a:t>は逸脱度</a:t>
-            </a:r>
-            <a:r>
-              <a:rPr kumimoji="1" lang="en-US" altLang="ja-JP" dirty="0"/>
-              <a:t>(D)</a:t>
-            </a:r>
-            <a:r>
-              <a:rPr kumimoji="1" lang="ja-JP" altLang="en-US"/>
-              <a:t>に推定パラメータ数</a:t>
-            </a:r>
-            <a:r>
-              <a:rPr kumimoji="1" lang="en-US" altLang="ja-JP" dirty="0"/>
-              <a:t>(k)</a:t>
-            </a:r>
-            <a:r>
-              <a:rPr kumimoji="1" lang="ja-JP" altLang="en-US"/>
-              <a:t>を加味した指標</a:t>
-            </a:r>
-            <a:endParaRPr lang="en-US" altLang="ja-JP" dirty="0"/>
+              <a:t>    [(40-100/3</a:t>
+            </a:r>
+            <a:r>
+              <a:rPr lang="en-US" altLang="ja-JP" dirty="0"/>
+              <a:t>)^2+(20-100/3) ^2+(40-100/3) ^2]/(100/3) =8</a:t>
+            </a:r>
+          </a:p>
+          <a:p>
+            <a:pPr marL="457200" lvl="1" indent="0">
+              <a:buNone/>
+            </a:pPr>
+            <a:endParaRPr kumimoji="1" lang="en-US" altLang="ja-JP" dirty="0"/>
           </a:p>
           <a:p>
             <a:pPr lvl="1"/>
-            <a:r>
-              <a:rPr kumimoji="1" lang="en-US" altLang="ja-JP" dirty="0"/>
-              <a:t>AIC = </a:t>
-            </a:r>
-            <a:r>
-              <a:rPr lang="en-US" altLang="ja-JP" dirty="0"/>
-              <a:t>–</a:t>
-            </a:r>
-            <a:r>
-              <a:rPr kumimoji="1" lang="en-US" altLang="ja-JP" dirty="0"/>
-              <a:t> 2 (log </a:t>
-            </a:r>
-            <a:r>
-              <a:rPr kumimoji="1" lang="en-US" altLang="ja-JP" i="1" dirty="0"/>
-              <a:t>L</a:t>
-            </a:r>
-            <a:r>
-              <a:rPr kumimoji="1" lang="en-US" altLang="ja-JP" baseline="30000" dirty="0"/>
-              <a:t>*</a:t>
-            </a:r>
-            <a:r>
-              <a:rPr kumimoji="1" lang="en-US" altLang="ja-JP" dirty="0"/>
-              <a:t> –  </a:t>
-            </a:r>
-            <a:r>
-              <a:rPr kumimoji="1" lang="en-US" altLang="ja-JP" i="1" dirty="0"/>
-              <a:t>k</a:t>
-            </a:r>
-            <a:r>
-              <a:rPr lang="en-US" altLang="ja-JP" dirty="0"/>
-              <a:t> )= </a:t>
-            </a:r>
-            <a:r>
-              <a:rPr lang="en-US" altLang="ja-JP" i="1" dirty="0"/>
-              <a:t>D</a:t>
-            </a:r>
-            <a:r>
-              <a:rPr lang="en-US" altLang="ja-JP" dirty="0"/>
-              <a:t> + 2 </a:t>
-            </a:r>
-            <a:r>
-              <a:rPr lang="en-US" altLang="ja-JP" i="1" dirty="0"/>
-              <a:t>k</a:t>
-            </a:r>
-          </a:p>
-          <a:p>
-            <a:endParaRPr kumimoji="1" lang="en-US" altLang="ja-JP" i="1" dirty="0"/>
-          </a:p>
-          <a:p>
-            <a:r>
-              <a:rPr kumimoji="1" lang="ja-JP" altLang="en-US"/>
-              <a:t>推定パラメータ数が多いほどデータへの当てはまりは良くなる．</a:t>
-            </a:r>
             <a:endParaRPr kumimoji="1" lang="en-US" altLang="ja-JP" dirty="0"/>
-          </a:p>
-          <a:p>
-            <a:endParaRPr lang="en-US" altLang="ja-JP" dirty="0"/>
-          </a:p>
-          <a:p>
-            <a:r>
-              <a:rPr lang="ja-JP" altLang="en-US"/>
-              <a:t>当てはまりの悪さ</a:t>
-            </a:r>
-            <a:r>
-              <a:rPr lang="en-US" altLang="ja-JP" dirty="0"/>
-              <a:t>+</a:t>
-            </a:r>
-            <a:r>
-              <a:rPr lang="ja-JP" altLang="en-US"/>
-              <a:t>パラメータ数が小さいものが選ばれる基準になる．</a:t>
-            </a:r>
-            <a:endParaRPr kumimoji="1" lang="ja-JP" altLang="en-US"/>
           </a:p>
         </p:txBody>
       </p:sp>
     </p:spTree>
     <p:extLst>
       <p:ext uri="{BB962C8B-B14F-4D97-AF65-F5344CB8AC3E}">
-        <p14:creationId xmlns:p14="http://schemas.microsoft.com/office/powerpoint/2010/main" val="3834722928"/>
+        <p14:creationId xmlns:p14="http://schemas.microsoft.com/office/powerpoint/2010/main" val="672173733"/>
       </p:ext>
     </p:extLst>
   </p:cSld>
@@ -6176,7 +5724,7 @@
           <p:cNvPr id="2" name="タイトル 1">
             <a:extLst>
               <a:ext uri="{FF2B5EF4-FFF2-40B4-BE49-F238E27FC236}">
-                <a16:creationId xmlns:a16="http://schemas.microsoft.com/office/drawing/2014/main" id="{97020794-9D15-0745-925F-85D82BC176FF}"/>
+                <a16:creationId xmlns:a16="http://schemas.microsoft.com/office/drawing/2014/main" id="{3C700D43-7914-8B49-B1EE-F2FE8202DB90}"/>
               </a:ext>
             </a:extLst>
           </p:cNvPr>
@@ -6193,98 +5741,571 @@
           <a:lstStyle/>
           <a:p>
             <a:r>
-              <a:rPr lang="en-US" altLang="ja-JP" dirty="0" err="1"/>
-              <a:t>glm</a:t>
-            </a:r>
-            <a:r>
-              <a:rPr kumimoji="1" lang="ja-JP" altLang="en-US"/>
-              <a:t>の戻り値</a:t>
-            </a:r>
-          </a:p>
-        </p:txBody>
-      </p:sp>
-      <p:sp>
-        <p:nvSpPr>
-          <p:cNvPr id="3" name="コンテンツ プレースホルダー 2">
-            <a:extLst>
-              <a:ext uri="{FF2B5EF4-FFF2-40B4-BE49-F238E27FC236}">
-                <a16:creationId xmlns:a16="http://schemas.microsoft.com/office/drawing/2014/main" id="{54C63FB3-C4DB-084E-968E-7FB5E1F0B009}"/>
-              </a:ext>
-            </a:extLst>
-          </p:cNvPr>
-          <p:cNvSpPr>
-            <a:spLocks noGrp="1"/>
-          </p:cNvSpPr>
+              <a:rPr lang="ja-JP" altLang="en-US"/>
+              <a:t>カイ二乗（</a:t>
+            </a:r>
+            <a:r>
+              <a:rPr lang="en-US" altLang="ja-JP" dirty="0"/>
+              <a:t> Χ</a:t>
+            </a:r>
+            <a:r>
+              <a:rPr lang="en-US" altLang="ja-JP" baseline="30000" dirty="0"/>
+              <a:t>2 </a:t>
+            </a:r>
+            <a:r>
+              <a:rPr lang="ja-JP" altLang="en-US"/>
+              <a:t>）検定（適合度の検定）</a:t>
+            </a:r>
+            <a:endParaRPr kumimoji="1" lang="ja-JP" altLang="en-US"/>
+          </a:p>
+        </p:txBody>
+      </p:sp>
+      <p:graphicFrame>
+        <p:nvGraphicFramePr>
+          <p:cNvPr id="4" name="表 4">
+            <a:extLst>
+              <a:ext uri="{FF2B5EF4-FFF2-40B4-BE49-F238E27FC236}">
+                <a16:creationId xmlns:a16="http://schemas.microsoft.com/office/drawing/2014/main" id="{407B999C-F742-4C4B-8A08-6B24FE0BC9FB}"/>
+              </a:ext>
+            </a:extLst>
+          </p:cNvPr>
+          <p:cNvGraphicFramePr>
+            <a:graphicFrameLocks noGrp="1"/>
+          </p:cNvGraphicFramePr>
           <p:nvPr>
             <p:ph idx="1"/>
-          </p:nvPr>
-        </p:nvSpPr>
-        <p:spPr/>
-        <p:txBody>
-          <a:bodyPr/>
-          <a:lstStyle/>
-          <a:p>
-            <a:r>
-              <a:rPr kumimoji="1" lang="en-US" altLang="ja-JP" dirty="0"/>
-              <a:t>R</a:t>
-            </a:r>
-            <a:r>
-              <a:rPr kumimoji="1" lang="ja-JP" altLang="en-US"/>
-              <a:t>の</a:t>
-            </a:r>
-            <a:r>
-              <a:rPr kumimoji="1" lang="en-US" altLang="ja-JP" dirty="0" err="1"/>
-              <a:t>glm</a:t>
-            </a:r>
-            <a:r>
-              <a:rPr kumimoji="1" lang="ja-JP" altLang="en-US"/>
-              <a:t>関数は</a:t>
-            </a:r>
-            <a:r>
-              <a:rPr kumimoji="1" lang="en-US" altLang="ja-JP" dirty="0"/>
-              <a:t>Null Deviance, Residual Deviance</a:t>
-            </a:r>
-            <a:r>
-              <a:rPr kumimoji="1" lang="ja-JP" altLang="en-US"/>
-              <a:t>を返す．</a:t>
-            </a:r>
-          </a:p>
-        </p:txBody>
-      </p:sp>
-      <p:pic>
-        <p:nvPicPr>
-          <p:cNvPr id="6" name="図 5" descr="テキスト&#10;&#10;自動的に生成された説明">
-            <a:extLst>
-              <a:ext uri="{FF2B5EF4-FFF2-40B4-BE49-F238E27FC236}">
-                <a16:creationId xmlns:a16="http://schemas.microsoft.com/office/drawing/2014/main" id="{6FC85373-0AA5-554D-A4F9-18721FB1EC9F}"/>
-              </a:ext>
-            </a:extLst>
-          </p:cNvPr>
-          <p:cNvPicPr>
-            <a:picLocks noChangeAspect="1"/>
-          </p:cNvPicPr>
+            <p:extLst>
+              <p:ext uri="{D42A27DB-BD31-4B8C-83A1-F6EECF244321}">
+                <p14:modId xmlns:p14="http://schemas.microsoft.com/office/powerpoint/2010/main" val="2894333901"/>
+              </p:ext>
+            </p:extLst>
+          </p:nvPr>
+        </p:nvGraphicFramePr>
+        <p:xfrm>
+          <a:off x="936171" y="1396774"/>
+          <a:ext cx="9949544" cy="2597766"/>
+        </p:xfrm>
+        <a:graphic>
+          <a:graphicData uri="http://schemas.openxmlformats.org/drawingml/2006/table">
+            <a:tbl>
+              <a:tblPr firstRow="1" bandRow="1">
+                <a:tableStyleId>{5C22544A-7EE6-4342-B048-85BDC9FD1C3A}</a:tableStyleId>
+              </a:tblPr>
+              <a:tblGrid>
+                <a:gridCol w="1998149">
+                  <a:extLst>
+                    <a:ext uri="{9D8B030D-6E8A-4147-A177-3AD203B41FA5}">
+                      <a16:colId xmlns:a16="http://schemas.microsoft.com/office/drawing/2014/main" val="1224390897"/>
+                    </a:ext>
+                  </a:extLst>
+                </a:gridCol>
+                <a:gridCol w="1981668">
+                  <a:extLst>
+                    <a:ext uri="{9D8B030D-6E8A-4147-A177-3AD203B41FA5}">
+                      <a16:colId xmlns:a16="http://schemas.microsoft.com/office/drawing/2014/main" val="1500877206"/>
+                    </a:ext>
+                  </a:extLst>
+                </a:gridCol>
+                <a:gridCol w="1989909">
+                  <a:extLst>
+                    <a:ext uri="{9D8B030D-6E8A-4147-A177-3AD203B41FA5}">
+                      <a16:colId xmlns:a16="http://schemas.microsoft.com/office/drawing/2014/main" val="3912329691"/>
+                    </a:ext>
+                  </a:extLst>
+                </a:gridCol>
+                <a:gridCol w="1989909">
+                  <a:extLst>
+                    <a:ext uri="{9D8B030D-6E8A-4147-A177-3AD203B41FA5}">
+                      <a16:colId xmlns:a16="http://schemas.microsoft.com/office/drawing/2014/main" val="3051161841"/>
+                    </a:ext>
+                  </a:extLst>
+                </a:gridCol>
+                <a:gridCol w="1989909">
+                  <a:extLst>
+                    <a:ext uri="{9D8B030D-6E8A-4147-A177-3AD203B41FA5}">
+                      <a16:colId xmlns:a16="http://schemas.microsoft.com/office/drawing/2014/main" val="539658092"/>
+                    </a:ext>
+                  </a:extLst>
+                </a:gridCol>
+              </a:tblGrid>
+              <a:tr h="530642">
+                <a:tc>
+                  <a:txBody>
+                    <a:bodyPr/>
+                    <a:lstStyle/>
+                    <a:p>
+                      <a:endParaRPr kumimoji="1" lang="ja-JP" altLang="en-US" sz="2000"/>
+                    </a:p>
+                  </a:txBody>
+                  <a:tcPr anchor="ctr"/>
+                </a:tc>
+                <a:tc>
+                  <a:txBody>
+                    <a:bodyPr/>
+                    <a:lstStyle/>
+                    <a:p>
+                      <a:pPr algn="ctr"/>
+                      <a:r>
+                        <a:rPr kumimoji="1" lang="ja-JP" altLang="en-US" sz="2000"/>
+                        <a:t>グー</a:t>
+                      </a:r>
+                    </a:p>
+                  </a:txBody>
+                  <a:tcPr anchor="ctr"/>
+                </a:tc>
+                <a:tc>
+                  <a:txBody>
+                    <a:bodyPr/>
+                    <a:lstStyle/>
+                    <a:p>
+                      <a:pPr algn="ctr"/>
+                      <a:r>
+                        <a:rPr kumimoji="1" lang="ja-JP" altLang="en-US" sz="2000"/>
+                        <a:t>チョキ</a:t>
+                      </a:r>
+                    </a:p>
+                  </a:txBody>
+                  <a:tcPr anchor="ctr"/>
+                </a:tc>
+                <a:tc>
+                  <a:txBody>
+                    <a:bodyPr/>
+                    <a:lstStyle/>
+                    <a:p>
+                      <a:pPr algn="ctr"/>
+                      <a:r>
+                        <a:rPr kumimoji="1" lang="ja-JP" altLang="en-US" sz="2000"/>
+                        <a:t>パー</a:t>
+                      </a:r>
+                    </a:p>
+                  </a:txBody>
+                  <a:tcPr anchor="ctr"/>
+                </a:tc>
+                <a:tc>
+                  <a:txBody>
+                    <a:bodyPr/>
+                    <a:lstStyle/>
+                    <a:p>
+                      <a:pPr algn="ctr"/>
+                      <a:r>
+                        <a:rPr kumimoji="1" lang="ja-JP" altLang="en-US" sz="2000"/>
+                        <a:t>合計</a:t>
+                      </a:r>
+                    </a:p>
+                  </a:txBody>
+                  <a:tcPr anchor="ctr"/>
+                </a:tc>
+                <a:extLst>
+                  <a:ext uri="{0D108BD9-81ED-4DB2-BD59-A6C34878D82A}">
+                    <a16:rowId xmlns:a16="http://schemas.microsoft.com/office/drawing/2014/main" val="2444831965"/>
+                  </a:ext>
+                </a:extLst>
+              </a:tr>
+              <a:tr h="530642">
+                <a:tc>
+                  <a:txBody>
+                    <a:bodyPr/>
+                    <a:lstStyle/>
+                    <a:p>
+                      <a:pPr algn="ctr"/>
+                      <a:r>
+                        <a:rPr kumimoji="1" lang="ja-JP" altLang="en-US" sz="2000"/>
+                        <a:t>観測度数</a:t>
+                      </a:r>
+                    </a:p>
+                  </a:txBody>
+                  <a:tcPr anchor="ctr"/>
+                </a:tc>
+                <a:tc>
+                  <a:txBody>
+                    <a:bodyPr/>
+                    <a:lstStyle/>
+                    <a:p>
+                      <a:pPr algn="r"/>
+                      <a:r>
+                        <a:rPr kumimoji="1" lang="en-US" altLang="ja-JP" sz="2000" dirty="0"/>
+                        <a:t>40</a:t>
+                      </a:r>
+                      <a:endParaRPr kumimoji="1" lang="ja-JP" altLang="en-US" sz="2000"/>
+                    </a:p>
+                  </a:txBody>
+                  <a:tcPr anchor="ctr"/>
+                </a:tc>
+                <a:tc>
+                  <a:txBody>
+                    <a:bodyPr/>
+                    <a:lstStyle/>
+                    <a:p>
+                      <a:pPr algn="r"/>
+                      <a:r>
+                        <a:rPr kumimoji="1" lang="en-US" altLang="ja-JP" sz="2000" dirty="0"/>
+                        <a:t>20</a:t>
+                      </a:r>
+                      <a:endParaRPr kumimoji="1" lang="ja-JP" altLang="en-US" sz="2000"/>
+                    </a:p>
+                  </a:txBody>
+                  <a:tcPr anchor="ctr"/>
+                </a:tc>
+                <a:tc>
+                  <a:txBody>
+                    <a:bodyPr/>
+                    <a:lstStyle/>
+                    <a:p>
+                      <a:pPr algn="r"/>
+                      <a:r>
+                        <a:rPr kumimoji="1" lang="en-US" altLang="ja-JP" sz="2000" dirty="0"/>
+                        <a:t>40</a:t>
+                      </a:r>
+                      <a:endParaRPr kumimoji="1" lang="ja-JP" altLang="en-US" sz="2000"/>
+                    </a:p>
+                  </a:txBody>
+                  <a:tcPr anchor="ctr"/>
+                </a:tc>
+                <a:tc>
+                  <a:txBody>
+                    <a:bodyPr/>
+                    <a:lstStyle/>
+                    <a:p>
+                      <a:pPr algn="r"/>
+                      <a:r>
+                        <a:rPr kumimoji="1" lang="en-US" altLang="ja-JP" sz="2000" dirty="0"/>
+                        <a:t>100</a:t>
+                      </a:r>
+                      <a:endParaRPr kumimoji="1" lang="ja-JP" altLang="en-US" sz="2000"/>
+                    </a:p>
+                  </a:txBody>
+                  <a:tcPr anchor="ctr"/>
+                </a:tc>
+                <a:extLst>
+                  <a:ext uri="{0D108BD9-81ED-4DB2-BD59-A6C34878D82A}">
+                    <a16:rowId xmlns:a16="http://schemas.microsoft.com/office/drawing/2014/main" val="299311301"/>
+                  </a:ext>
+                </a:extLst>
+              </a:tr>
+              <a:tr h="530642">
+                <a:tc>
+                  <a:txBody>
+                    <a:bodyPr/>
+                    <a:lstStyle/>
+                    <a:p>
+                      <a:pPr algn="ctr"/>
+                      <a:r>
+                        <a:rPr kumimoji="1" lang="ja-JP" altLang="en-US" sz="2000"/>
+                        <a:t>期待度数</a:t>
+                      </a:r>
+                    </a:p>
+                  </a:txBody>
+                  <a:tcPr anchor="ctr"/>
+                </a:tc>
+                <a:tc>
+                  <a:txBody>
+                    <a:bodyPr/>
+                    <a:lstStyle/>
+                    <a:p>
+                      <a:pPr algn="r"/>
+                      <a:r>
+                        <a:rPr kumimoji="1" lang="en-US" altLang="ja-JP" sz="2000" dirty="0"/>
+                        <a:t>100/3</a:t>
+                      </a:r>
+                      <a:endParaRPr kumimoji="1" lang="ja-JP" altLang="en-US" sz="2000"/>
+                    </a:p>
+                  </a:txBody>
+                  <a:tcPr anchor="ctr"/>
+                </a:tc>
+                <a:tc>
+                  <a:txBody>
+                    <a:bodyPr/>
+                    <a:lstStyle/>
+                    <a:p>
+                      <a:pPr algn="r"/>
+                      <a:r>
+                        <a:rPr kumimoji="1" lang="en-US" altLang="ja-JP" sz="2000" dirty="0"/>
+                        <a:t>100/3</a:t>
+                      </a:r>
+                      <a:endParaRPr kumimoji="1" lang="ja-JP" altLang="en-US" sz="2000"/>
+                    </a:p>
+                  </a:txBody>
+                  <a:tcPr anchor="ctr"/>
+                </a:tc>
+                <a:tc>
+                  <a:txBody>
+                    <a:bodyPr/>
+                    <a:lstStyle/>
+                    <a:p>
+                      <a:pPr algn="r"/>
+                      <a:r>
+                        <a:rPr kumimoji="1" lang="en-US" altLang="ja-JP" sz="2000" dirty="0"/>
+                        <a:t>100/3</a:t>
+                      </a:r>
+                      <a:endParaRPr kumimoji="1" lang="ja-JP" altLang="en-US" sz="2000"/>
+                    </a:p>
+                  </a:txBody>
+                  <a:tcPr anchor="ctr"/>
+                </a:tc>
+                <a:tc>
+                  <a:txBody>
+                    <a:bodyPr/>
+                    <a:lstStyle/>
+                    <a:p>
+                      <a:pPr algn="r"/>
+                      <a:r>
+                        <a:rPr kumimoji="1" lang="en-US" altLang="ja-JP" sz="2000" dirty="0"/>
+                        <a:t>100</a:t>
+                      </a:r>
+                      <a:endParaRPr kumimoji="1" lang="ja-JP" altLang="en-US" sz="2000"/>
+                    </a:p>
+                  </a:txBody>
+                  <a:tcPr anchor="ctr"/>
+                </a:tc>
+                <a:extLst>
+                  <a:ext uri="{0D108BD9-81ED-4DB2-BD59-A6C34878D82A}">
+                    <a16:rowId xmlns:a16="http://schemas.microsoft.com/office/drawing/2014/main" val="2848846924"/>
+                  </a:ext>
+                </a:extLst>
+              </a:tr>
+              <a:tr h="984587">
+                <a:tc>
+                  <a:txBody>
+                    <a:bodyPr/>
+                    <a:lstStyle/>
+                    <a:p>
+                      <a:pPr algn="ctr"/>
+                      <a:r>
+                        <a:rPr kumimoji="1" lang="ja-JP" altLang="en-US" sz="2000"/>
+                        <a:t>期待度数と観測度数とのズレ</a:t>
+                      </a:r>
+                      <a:endParaRPr kumimoji="1" lang="en-US" altLang="ja-JP" sz="2000" dirty="0"/>
+                    </a:p>
+                    <a:p>
+                      <a:pPr algn="ctr"/>
+                      <a:r>
+                        <a:rPr kumimoji="1" lang="ja-JP" altLang="en-US" sz="2000"/>
+                        <a:t>の</a:t>
+                      </a:r>
+                      <a:r>
+                        <a:rPr kumimoji="1" lang="en-US" altLang="ja-JP" sz="2000" dirty="0"/>
+                        <a:t>2</a:t>
+                      </a:r>
+                      <a:r>
+                        <a:rPr kumimoji="1" lang="ja-JP" altLang="en-US" sz="2000"/>
+                        <a:t>乗</a:t>
+                      </a:r>
+                    </a:p>
+                  </a:txBody>
+                  <a:tcPr anchor="ctr"/>
+                </a:tc>
+                <a:tc>
+                  <a:txBody>
+                    <a:bodyPr/>
+                    <a:lstStyle/>
+                    <a:p>
+                      <a:pPr algn="r"/>
+                      <a:r>
+                        <a:rPr kumimoji="1" lang="en-US" altLang="ja-JP" sz="2000" dirty="0"/>
+                        <a:t>(40-100/3)^2</a:t>
+                      </a:r>
+                      <a:endParaRPr kumimoji="1" lang="ja-JP" altLang="en-US" sz="2000"/>
+                    </a:p>
+                  </a:txBody>
+                  <a:tcPr anchor="ctr"/>
+                </a:tc>
+                <a:tc>
+                  <a:txBody>
+                    <a:bodyPr/>
+                    <a:lstStyle/>
+                    <a:p>
+                      <a:pPr algn="r"/>
+                      <a:r>
+                        <a:rPr kumimoji="1" lang="en-US" altLang="ja-JP" sz="2000" dirty="0"/>
+                        <a:t>(20-100/3)^2</a:t>
+                      </a:r>
+                      <a:endParaRPr kumimoji="1" lang="ja-JP" altLang="en-US" sz="2000"/>
+                    </a:p>
+                  </a:txBody>
+                  <a:tcPr anchor="ctr"/>
+                </a:tc>
+                <a:tc>
+                  <a:txBody>
+                    <a:bodyPr/>
+                    <a:lstStyle/>
+                    <a:p>
+                      <a:pPr algn="r"/>
+                      <a:r>
+                        <a:rPr kumimoji="1" lang="en-US" altLang="ja-JP" sz="2000" dirty="0"/>
+                        <a:t>(40-100/3) )^2</a:t>
+                      </a:r>
+                      <a:endParaRPr kumimoji="1" lang="ja-JP" altLang="en-US" sz="2000"/>
+                    </a:p>
+                  </a:txBody>
+                  <a:tcPr anchor="ctr"/>
+                </a:tc>
+                <a:tc>
+                  <a:txBody>
+                    <a:bodyPr/>
+                    <a:lstStyle/>
+                    <a:p>
+                      <a:pPr algn="r"/>
+                      <a:r>
+                        <a:rPr kumimoji="1" lang="en-US" altLang="ja-JP" sz="1800" b="0" i="0" kern="1200" dirty="0">
+                          <a:solidFill>
+                            <a:schemeClr val="dk1"/>
+                          </a:solidFill>
+                          <a:effectLst/>
+                          <a:latin typeface="+mn-lt"/>
+                          <a:ea typeface="+mn-ea"/>
+                          <a:cs typeface="+mn-cs"/>
+                        </a:rPr>
+                        <a:t>266.6667</a:t>
+                      </a:r>
+                      <a:endParaRPr kumimoji="1" lang="ja-JP" altLang="en-US" sz="2000"/>
+                    </a:p>
+                  </a:txBody>
+                  <a:tcPr anchor="ctr"/>
+                </a:tc>
+                <a:extLst>
+                  <a:ext uri="{0D108BD9-81ED-4DB2-BD59-A6C34878D82A}">
+                    <a16:rowId xmlns:a16="http://schemas.microsoft.com/office/drawing/2014/main" val="475050616"/>
+                  </a:ext>
+                </a:extLst>
+              </a:tr>
+            </a:tbl>
+          </a:graphicData>
+        </a:graphic>
+      </p:graphicFrame>
+      <p:sp>
+        <p:nvSpPr>
+          <p:cNvPr id="7" name="テキスト ボックス 6">
+            <a:extLst>
+              <a:ext uri="{FF2B5EF4-FFF2-40B4-BE49-F238E27FC236}">
+                <a16:creationId xmlns:a16="http://schemas.microsoft.com/office/drawing/2014/main" id="{3B3CE665-52A0-C342-89A8-B18E5AC153D9}"/>
+              </a:ext>
+            </a:extLst>
+          </p:cNvPr>
+          <p:cNvSpPr txBox="1"/>
           <p:nvPr/>
-        </p:nvPicPr>
-        <p:blipFill>
-          <a:blip r:embed="rId2"/>
-          <a:stretch>
-            <a:fillRect/>
-          </a:stretch>
-        </p:blipFill>
+        </p:nvSpPr>
         <p:spPr>
           <a:xfrm>
-            <a:off x="1587316" y="2505075"/>
-            <a:ext cx="9474200" cy="3987800"/>
+            <a:off x="658585" y="4122398"/>
+            <a:ext cx="10874830" cy="2677656"/>
           </a:xfrm>
           <a:prstGeom prst="rect">
             <a:avLst/>
           </a:prstGeom>
+          <a:noFill/>
         </p:spPr>
-      </p:pic>
+        <p:txBody>
+          <a:bodyPr wrap="square" rtlCol="0">
+            <a:spAutoFit/>
+          </a:bodyPr>
+          <a:lstStyle/>
+          <a:p>
+            <a:pPr marL="342900" indent="-342900">
+              <a:buFont typeface="Arial" panose="020B0604020202020204" pitchFamily="34" charset="0"/>
+              <a:buChar char="•"/>
+            </a:pPr>
+            <a:r>
+              <a:rPr lang="ja-JP" altLang="en-US" sz="2400"/>
+              <a:t>この場合の適合度検定におけるカイ二乗検定の帰無仮説は「観測度数は異なるカテゴリ間で違いがないと仮定した期待度数と一致する」</a:t>
+            </a:r>
+            <a:endParaRPr lang="en-US" altLang="ja-JP" sz="2400" dirty="0"/>
+          </a:p>
+          <a:p>
+            <a:pPr marL="342900" indent="-342900">
+              <a:buFont typeface="Arial" panose="020B0604020202020204" pitchFamily="34" charset="0"/>
+              <a:buChar char="•"/>
+            </a:pPr>
+            <a:r>
+              <a:rPr kumimoji="1" lang="ja-JP" altLang="en-US" sz="2400"/>
+              <a:t>カイ二乗は自由度</a:t>
+            </a:r>
+            <a:r>
+              <a:rPr kumimoji="1" lang="en-US" altLang="ja-JP" sz="2400" dirty="0"/>
+              <a:t>(df)=2(</a:t>
+            </a:r>
+            <a:r>
+              <a:rPr kumimoji="1" lang="ja-JP" altLang="en-US" sz="2400"/>
+              <a:t>グーとチョキが決まればパーは一意に決まる</a:t>
+            </a:r>
+            <a:r>
+              <a:rPr kumimoji="1" lang="en-US" altLang="ja-JP" sz="2400" dirty="0"/>
+              <a:t>)</a:t>
+            </a:r>
+            <a:r>
+              <a:rPr kumimoji="1" lang="ja-JP" altLang="en-US" sz="2400"/>
+              <a:t>のカイ二乗分布にしたがう．</a:t>
+            </a:r>
+            <a:r>
+              <a:rPr lang="ja-JP" altLang="en-US" sz="2400"/>
+              <a:t>自由度</a:t>
+            </a:r>
+            <a:r>
+              <a:rPr lang="en-US" altLang="ja-JP" sz="2400" dirty="0"/>
+              <a:t>2</a:t>
+            </a:r>
+            <a:r>
+              <a:rPr lang="ja-JP" altLang="en-US" sz="2400"/>
+              <a:t>で</a:t>
+            </a:r>
+            <a:r>
+              <a:rPr lang="en-US" altLang="ja-JP" sz="2400" dirty="0"/>
+              <a:t>χ</a:t>
+            </a:r>
+            <a:r>
+              <a:rPr lang="en-US" altLang="ja-JP" sz="2400" baseline="30000" dirty="0"/>
+              <a:t>2</a:t>
+            </a:r>
+            <a:r>
+              <a:rPr lang="en-US" altLang="ja-JP" sz="2400" dirty="0"/>
+              <a:t>=8</a:t>
+            </a:r>
+            <a:r>
+              <a:rPr lang="ja-JP" altLang="en-US" sz="2400"/>
+              <a:t>となる確率</a:t>
+            </a:r>
+            <a:r>
+              <a:rPr lang="en-US" altLang="ja-JP" sz="2400" i="1" dirty="0"/>
+              <a:t>p</a:t>
+            </a:r>
+            <a:r>
+              <a:rPr lang="ja-JP" altLang="en-US" sz="2400"/>
+              <a:t>は</a:t>
+            </a:r>
+            <a:r>
+              <a:rPr lang="en-US" altLang="ja-JP" sz="2400" dirty="0"/>
+              <a:t> 0.01832</a:t>
+            </a:r>
+            <a:r>
+              <a:rPr lang="ja-JP" altLang="en-US" sz="2400"/>
+              <a:t>．</a:t>
+            </a:r>
+            <a:endParaRPr lang="en-US" altLang="ja-JP" sz="2400" dirty="0"/>
+          </a:p>
+          <a:p>
+            <a:pPr marL="342900" indent="-342900">
+              <a:buFont typeface="Arial" panose="020B0604020202020204" pitchFamily="34" charset="0"/>
+              <a:buChar char="•"/>
+            </a:pPr>
+            <a:r>
+              <a:rPr lang="ja-JP" altLang="en-US" sz="2400"/>
+              <a:t>この確率が有意水準より小さい場合（例えば</a:t>
+            </a:r>
+            <a:r>
+              <a:rPr lang="en-US" altLang="ja-JP" sz="2400" dirty="0"/>
+              <a:t>0.05</a:t>
+            </a:r>
+            <a:r>
+              <a:rPr lang="ja-JP" altLang="en-US" sz="2400"/>
+              <a:t>）観測値は期待値（グーチョキパーが等確率で出るというモデル）に従っていないと判断される．→モデルと観測値の適合度を検定．</a:t>
+            </a:r>
+            <a:endParaRPr kumimoji="1" lang="ja-JP" altLang="en-US" sz="2400"/>
+          </a:p>
+        </p:txBody>
+      </p:sp>
     </p:spTree>
     <p:extLst>
       <p:ext uri="{BB962C8B-B14F-4D97-AF65-F5344CB8AC3E}">
-        <p14:creationId xmlns:p14="http://schemas.microsoft.com/office/powerpoint/2010/main" val="508955002"/>
+        <p14:creationId xmlns:p14="http://schemas.microsoft.com/office/powerpoint/2010/main" val="3185156017"/>
       </p:ext>
     </p:extLst>
   </p:cSld>
@@ -6316,7 +6337,7 @@
           <p:cNvPr id="2" name="タイトル 1">
             <a:extLst>
               <a:ext uri="{FF2B5EF4-FFF2-40B4-BE49-F238E27FC236}">
-                <a16:creationId xmlns:a16="http://schemas.microsoft.com/office/drawing/2014/main" id="{BE21B35A-2763-C34A-9729-CEAF9258550D}"/>
+                <a16:creationId xmlns:a16="http://schemas.microsoft.com/office/drawing/2014/main" id="{C09836D2-1796-FB42-A1C5-8E63CADB49EB}"/>
               </a:ext>
             </a:extLst>
           </p:cNvPr>
@@ -6337,10 +6358,9 @@
               <a:t>GLM</a:t>
             </a:r>
             <a:r>
-              <a:rPr lang="ja-JP" altLang="en-US"/>
-              <a:t>の妥当性</a:t>
-            </a:r>
-            <a:endParaRPr kumimoji="1" lang="ja-JP" altLang="en-US"/>
+              <a:rPr kumimoji="1" lang="ja-JP" altLang="en-US"/>
+              <a:t>の結果の過分散チェック</a:t>
+            </a:r>
           </a:p>
         </p:txBody>
       </p:sp>
@@ -6349,7 +6369,7 @@
           <p:cNvPr id="3" name="コンテンツ プレースホルダー 2">
             <a:extLst>
               <a:ext uri="{FF2B5EF4-FFF2-40B4-BE49-F238E27FC236}">
-                <a16:creationId xmlns:a16="http://schemas.microsoft.com/office/drawing/2014/main" id="{5D454D60-38A7-4B4C-8C5C-FFAC1D198DE6}"/>
+                <a16:creationId xmlns:a16="http://schemas.microsoft.com/office/drawing/2014/main" id="{98987442-2918-D04B-BB5D-BD5790BC103F}"/>
               </a:ext>
             </a:extLst>
           </p:cNvPr>
@@ -6360,12 +6380,7 @@
             <p:ph idx="1"/>
           </p:nvPr>
         </p:nvSpPr>
-        <p:spPr>
-          <a:xfrm>
-            <a:off x="838200" y="1825624"/>
-            <a:ext cx="10993916" cy="4773479"/>
-          </a:xfrm>
-        </p:spPr>
+        <p:spPr/>
         <p:txBody>
           <a:bodyPr>
             <a:normAutofit/>
@@ -6373,138 +6388,115 @@
           <a:lstStyle/>
           <a:p>
             <a:r>
+              <a:rPr kumimoji="1" lang="ja-JP" altLang="en-US"/>
+              <a:t>第</a:t>
+            </a:r>
+            <a:r>
+              <a:rPr lang="en-US" altLang="ja-JP" dirty="0"/>
+              <a:t>27</a:t>
+            </a:r>
+            <a:r>
+              <a:rPr kumimoji="1" lang="ja-JP" altLang="en-US"/>
+              <a:t>回で解析した</a:t>
+            </a:r>
+            <a:r>
+              <a:rPr kumimoji="1" lang="en-US" altLang="ja-JP" dirty="0"/>
+              <a:t>GLM</a:t>
+            </a:r>
+            <a:r>
+              <a:rPr kumimoji="1" lang="ja-JP" altLang="en-US"/>
+              <a:t>の結果を船ごとに色分けしてプロット</a:t>
+            </a:r>
+            <a:r>
+              <a:rPr lang="en-US" altLang="ja-JP" dirty="0"/>
+              <a:t>	</a:t>
+            </a:r>
+          </a:p>
+          <a:p>
+            <a:endParaRPr lang="en-US" altLang="ja-JP" dirty="0"/>
+          </a:p>
+          <a:p>
+            <a:r>
               <a:rPr lang="en-US" altLang="ja-JP" dirty="0"/>
               <a:t>GLM</a:t>
             </a:r>
             <a:r>
               <a:rPr lang="ja-JP" altLang="en-US"/>
-              <a:t>は</a:t>
+              <a:t>による予測を実線、</a:t>
             </a:r>
             <a:r>
               <a:rPr lang="en-US" altLang="ja-JP" dirty="0"/>
-              <a:t>LM</a:t>
+              <a:t>95%PI</a:t>
             </a:r>
             <a:r>
               <a:rPr lang="ja-JP" altLang="en-US"/>
-              <a:t>よりも柔軟にデータフィッティングすることができる．</a:t>
-            </a:r>
-            <a:endParaRPr lang="en-US" altLang="ja-JP" dirty="0"/>
-          </a:p>
-          <a:p>
-            <a:endParaRPr lang="en-US" altLang="ja-JP" dirty="0"/>
-          </a:p>
-          <a:p>
+              <a:t>を破線で示して、データが</a:t>
+            </a:r>
             <a:r>
               <a:rPr lang="en-US" altLang="ja-JP" dirty="0"/>
-              <a:t>GLM</a:t>
+              <a:t>95</a:t>
             </a:r>
             <a:r>
               <a:rPr lang="ja-JP" altLang="en-US"/>
-              <a:t>を用いて、</a:t>
+              <a:t>％</a:t>
             </a:r>
             <a:r>
               <a:rPr lang="en-US" altLang="ja-JP" dirty="0"/>
-              <a:t>AIC</a:t>
+              <a:t>PI</a:t>
             </a:r>
             <a:r>
               <a:rPr lang="ja-JP" altLang="en-US"/>
-              <a:t>などの基準で選択したモデルがいつでもよい結果をもたらすか？</a:t>
-            </a:r>
-            <a:endParaRPr lang="en-US" altLang="ja-JP" dirty="0"/>
-          </a:p>
-          <a:p>
-            <a:pPr lvl="1"/>
-            <a:r>
-              <a:rPr lang="ja-JP" altLang="en-US"/>
-              <a:t>→</a:t>
-            </a:r>
-            <a:r>
-              <a:rPr lang="en-US" altLang="ja-JP" dirty="0"/>
-              <a:t>No.</a:t>
-            </a:r>
-          </a:p>
-          <a:p>
-            <a:pPr lvl="1"/>
-            <a:endParaRPr lang="en-US" altLang="ja-JP" dirty="0"/>
-          </a:p>
-          <a:p>
-            <a:r>
-              <a:rPr lang="ja-JP" altLang="en-US"/>
-              <a:t>課題設定の問題と推定の妥当性の問題</a:t>
-            </a:r>
-            <a:endParaRPr lang="en-US" altLang="ja-JP" dirty="0"/>
-          </a:p>
-          <a:p>
-            <a:pPr lvl="1"/>
-            <a:r>
-              <a:rPr lang="ja-JP" altLang="en-US"/>
-              <a:t>推定パラメータをモデルに含める妥当性に欠けている</a:t>
-            </a:r>
-            <a:r>
-              <a:rPr lang="en-US" altLang="ja-JP" dirty="0"/>
-              <a:t>(</a:t>
-            </a:r>
-            <a:r>
-              <a:rPr lang="ja-JP" altLang="en-US"/>
-              <a:t>回帰分析一般</a:t>
-            </a:r>
-            <a:r>
-              <a:rPr lang="en-US" altLang="ja-JP" dirty="0"/>
-              <a:t>)</a:t>
-            </a:r>
-            <a:r>
-              <a:rPr lang="ja-JP" altLang="en-US"/>
-              <a:t>．</a:t>
-            </a:r>
-            <a:endParaRPr lang="en-US" altLang="ja-JP" dirty="0"/>
-          </a:p>
-          <a:p>
-            <a:pPr lvl="1"/>
-            <a:r>
-              <a:rPr lang="ja-JP" altLang="en-US"/>
-              <a:t>仮定した誤差構造の分散よりも推定結果の分散が大きいことがある</a:t>
-            </a:r>
-            <a:r>
-              <a:rPr lang="en-US" altLang="ja-JP" dirty="0"/>
-              <a:t>(</a:t>
-            </a:r>
-            <a:r>
-              <a:rPr lang="ja-JP" altLang="en-US"/>
-              <a:t>分散と期待値が同時に決定するポアソン回帰やロジスティック回帰など</a:t>
-            </a:r>
-            <a:r>
-              <a:rPr lang="en-US" altLang="ja-JP" dirty="0"/>
-              <a:t>)</a:t>
-            </a:r>
-            <a:r>
-              <a:rPr lang="ja-JP" altLang="en-US"/>
-              <a:t>．</a:t>
-            </a:r>
-            <a:endParaRPr lang="en-US" altLang="ja-JP" dirty="0"/>
+              <a:t>範囲内にどれだけ収まっているか？</a:t>
+            </a:r>
+            <a:endParaRPr kumimoji="1" lang="en-US" altLang="ja-JP" dirty="0"/>
           </a:p>
           <a:p>
             <a:pPr marL="457200" lvl="1" indent="0">
               <a:buNone/>
             </a:pPr>
             <a:r>
+              <a:rPr lang="ja-JP" altLang="en-US"/>
+              <a:t>→誤差構造はポアソン分布に従っている？</a:t>
+            </a:r>
+            <a:endParaRPr lang="en-US" altLang="ja-JP" dirty="0"/>
+          </a:p>
+          <a:p>
+            <a:pPr lvl="1"/>
+            <a:endParaRPr lang="en-US" altLang="ja-JP" dirty="0"/>
+          </a:p>
+          <a:p>
+            <a:r>
+              <a:rPr kumimoji="1" lang="ja-JP" altLang="en-US"/>
+              <a:t>数値としてチェック</a:t>
+            </a:r>
+            <a:endParaRPr kumimoji="1" lang="en-US" altLang="ja-JP" dirty="0"/>
+          </a:p>
+          <a:p>
+            <a:pPr lvl="1"/>
+            <a:r>
               <a:rPr lang="en-US" altLang="ja-JP" dirty="0"/>
-              <a:t>	</a:t>
+              <a:t>library(performance)</a:t>
             </a:r>
             <a:r>
               <a:rPr lang="ja-JP" altLang="en-US"/>
-              <a:t>→過分散のチェック（次回へ）</a:t>
-            </a:r>
-            <a:endParaRPr lang="en-US" altLang="ja-JP" dirty="0"/>
-          </a:p>
-          <a:p>
-            <a:endParaRPr lang="en-US" altLang="ja-JP" dirty="0"/>
+              <a:t>の</a:t>
+            </a:r>
+            <a:r>
+              <a:rPr lang="en-US" altLang="ja-JP" dirty="0" err="1"/>
+              <a:t>check_overdispersion</a:t>
+            </a:r>
+            <a:r>
+              <a:rPr lang="ja-JP" altLang="en-US"/>
+              <a:t>関数を使う．</a:t>
+            </a:r>
+            <a:endParaRPr kumimoji="1" lang="ja-JP" altLang="en-US"/>
           </a:p>
         </p:txBody>
       </p:sp>
     </p:spTree>
     <p:extLst>
       <p:ext uri="{BB962C8B-B14F-4D97-AF65-F5344CB8AC3E}">
-        <p14:creationId xmlns:p14="http://schemas.microsoft.com/office/powerpoint/2010/main" val="2393039641"/>
+        <p14:creationId xmlns:p14="http://schemas.microsoft.com/office/powerpoint/2010/main" val="4234602352"/>
       </p:ext>
     </p:extLst>
   </p:cSld>
@@ -6536,7 +6528,7 @@
           <p:cNvPr id="2" name="タイトル 1">
             <a:extLst>
               <a:ext uri="{FF2B5EF4-FFF2-40B4-BE49-F238E27FC236}">
-                <a16:creationId xmlns:a16="http://schemas.microsoft.com/office/drawing/2014/main" id="{623612D0-D76F-C74E-891A-707A6005D165}"/>
+                <a16:creationId xmlns:a16="http://schemas.microsoft.com/office/drawing/2014/main" id="{14F383C1-F4F6-F143-BB59-4370B86BFFD5}"/>
               </a:ext>
             </a:extLst>
           </p:cNvPr>
@@ -6553,173 +6545,81 @@
           <a:lstStyle/>
           <a:p>
             <a:r>
+              <a:rPr kumimoji="1" lang="ja-JP" altLang="en-US"/>
+              <a:t>過分散をもたらす原因</a:t>
+            </a:r>
+          </a:p>
+        </p:txBody>
+      </p:sp>
+      <p:sp>
+        <p:nvSpPr>
+          <p:cNvPr id="3" name="コンテンツ プレースホルダー 2">
+            <a:extLst>
+              <a:ext uri="{FF2B5EF4-FFF2-40B4-BE49-F238E27FC236}">
+                <a16:creationId xmlns:a16="http://schemas.microsoft.com/office/drawing/2014/main" id="{3BC21B0A-101C-D044-A534-0DE9DD86BA80}"/>
+              </a:ext>
+            </a:extLst>
+          </p:cNvPr>
+          <p:cNvSpPr>
+            <a:spLocks noGrp="1"/>
+          </p:cNvSpPr>
+          <p:nvPr>
+            <p:ph idx="1"/>
+          </p:nvPr>
+        </p:nvSpPr>
+        <p:spPr/>
+        <p:txBody>
+          <a:bodyPr/>
+          <a:lstStyle/>
+          <a:p>
+            <a:r>
+              <a:rPr kumimoji="1" lang="ja-JP" altLang="en-US"/>
+              <a:t>観測データの背景に仮定していなかった個々の事情がある</a:t>
+            </a:r>
+            <a:endParaRPr kumimoji="1" lang="en-US" altLang="ja-JP" dirty="0"/>
+          </a:p>
+          <a:p>
+            <a:pPr lvl="1"/>
+            <a:r>
               <a:rPr lang="ja-JP" altLang="en-US"/>
-              <a:t>やってみよう！</a:t>
+              <a:t>個体差</a:t>
             </a:r>
             <a:endParaRPr lang="en-US" altLang="ja-JP" dirty="0"/>
           </a:p>
-        </p:txBody>
-      </p:sp>
-      <p:sp>
-        <p:nvSpPr>
-          <p:cNvPr id="3" name="コンテンツ プレースホルダー 2">
-            <a:extLst>
-              <a:ext uri="{FF2B5EF4-FFF2-40B4-BE49-F238E27FC236}">
-                <a16:creationId xmlns:a16="http://schemas.microsoft.com/office/drawing/2014/main" id="{DB2B9403-9C69-B247-888D-FFFF16D2A69C}"/>
-              </a:ext>
-            </a:extLst>
-          </p:cNvPr>
-          <p:cNvSpPr>
-            <a:spLocks noGrp="1"/>
-          </p:cNvSpPr>
-          <p:nvPr>
-            <p:ph idx="1"/>
-          </p:nvPr>
-        </p:nvSpPr>
-        <p:spPr/>
-        <p:txBody>
-          <a:bodyPr>
-            <a:normAutofit fontScale="92500" lnSpcReduction="10000"/>
-          </a:bodyPr>
-          <a:lstStyle/>
-          <a:p>
+          <a:p>
+            <a:pPr lvl="1"/>
             <a:r>
               <a:rPr lang="ja-JP" altLang="en-US"/>
-              <a:t>第</a:t>
-            </a:r>
-            <a:r>
-              <a:rPr lang="en-US" altLang="ja-JP" dirty="0"/>
-              <a:t>12</a:t>
-            </a:r>
+              <a:t>場所の差</a:t>
+            </a:r>
+            <a:endParaRPr lang="en-US" altLang="ja-JP" dirty="0"/>
+          </a:p>
+          <a:p>
+            <a:endParaRPr kumimoji="1" lang="en-US" altLang="ja-JP" dirty="0"/>
+          </a:p>
+          <a:p>
+            <a:r>
+              <a:rPr kumimoji="1" lang="ja-JP" altLang="en-US"/>
+              <a:t>ポアソン分布で誤差を生じる以前にそもそも個体差、操業場所の違いなどで誤差が生じる．</a:t>
+            </a:r>
+            <a:endParaRPr kumimoji="1" lang="en-US" altLang="ja-JP" dirty="0"/>
+          </a:p>
+          <a:p>
+            <a:pPr marL="0" indent="0">
+              <a:buNone/>
+            </a:pPr>
             <a:r>
               <a:rPr lang="ja-JP" altLang="en-US"/>
-              <a:t>回で作成した船・温度ごとの漁獲と同様のデータセット</a:t>
-            </a:r>
-            <a:r>
-              <a:rPr lang="en-US" altLang="ja-JP" dirty="0"/>
-              <a:t>catch_data2.csv</a:t>
-            </a:r>
-            <a:r>
-              <a:rPr lang="ja-JP" altLang="en-US"/>
-              <a:t>を読み込んで、</a:t>
-            </a:r>
-            <a:r>
-              <a:rPr lang="en-US" altLang="ja-JP" dirty="0"/>
-              <a:t>GLM</a:t>
-            </a:r>
-            <a:r>
-              <a:rPr lang="ja-JP" altLang="en-US"/>
-              <a:t>実行．</a:t>
-            </a:r>
-            <a:endParaRPr lang="en-US" altLang="ja-JP" dirty="0"/>
-          </a:p>
-          <a:p>
-            <a:pPr lvl="1"/>
-            <a:r>
-              <a:rPr lang="ja-JP" altLang="en-US"/>
-              <a:t>漁獲は量でなく頭数になっているので誤差構造にポアソン分布、リンク関数を</a:t>
-            </a:r>
-            <a:r>
-              <a:rPr lang="en-US" altLang="ja-JP" dirty="0"/>
-              <a:t>log</a:t>
-            </a:r>
-            <a:r>
-              <a:rPr lang="ja-JP" altLang="en-US"/>
-              <a:t>として解析．</a:t>
-            </a:r>
-            <a:endParaRPr lang="en-US" altLang="ja-JP" dirty="0"/>
-          </a:p>
-          <a:p>
-            <a:pPr lvl="1"/>
-            <a:endParaRPr lang="en-US" altLang="ja-JP" dirty="0"/>
-          </a:p>
-          <a:p>
-            <a:r>
-              <a:rPr lang="ja-JP" altLang="en-US"/>
-              <a:t>目的変数を漁獲、説明変数を船・温度・操業場所として</a:t>
-            </a:r>
-            <a:r>
-              <a:rPr lang="en-US" altLang="ja-JP" dirty="0"/>
-              <a:t>GLM</a:t>
-            </a:r>
-            <a:r>
-              <a:rPr lang="ja-JP" altLang="en-US"/>
-              <a:t>実行．</a:t>
-            </a:r>
-            <a:endParaRPr lang="en-US" altLang="ja-JP" dirty="0"/>
-          </a:p>
-          <a:p>
-            <a:pPr lvl="1"/>
-            <a:r>
-              <a:rPr lang="ja-JP" altLang="en-US"/>
-              <a:t>操業場所の推定係数は安定してそうか？（推定値に対して推定の誤差は大きくないか？大きすぎると統計量</a:t>
-            </a:r>
-            <a:r>
-              <a:rPr lang="en-US" altLang="ja-JP" dirty="0"/>
-              <a:t>z</a:t>
-            </a:r>
-            <a:r>
-              <a:rPr lang="ja-JP" altLang="en-US"/>
-              <a:t>が小さくて有意水準</a:t>
-            </a:r>
-            <a:r>
-              <a:rPr lang="en-US" altLang="ja-JP" dirty="0"/>
-              <a:t>0.05</a:t>
-            </a:r>
-            <a:r>
-              <a:rPr lang="ja-JP" altLang="en-US"/>
-              <a:t>を超えるものも出てくる．あるいはそもそも操業場所ごとのデータ数が少なくないか？）</a:t>
-            </a:r>
-            <a:endParaRPr lang="en-US" altLang="ja-JP" dirty="0"/>
-          </a:p>
-          <a:p>
-            <a:pPr lvl="1"/>
-            <a:endParaRPr lang="en-US" altLang="ja-JP" dirty="0"/>
-          </a:p>
-          <a:p>
-            <a:r>
-              <a:rPr lang="ja-JP" altLang="en-US"/>
-              <a:t>目的変数を漁獲、説明変数を船・温度として</a:t>
-            </a:r>
-            <a:r>
-              <a:rPr lang="en-US" altLang="ja-JP" dirty="0"/>
-              <a:t>GLM</a:t>
-            </a:r>
-            <a:r>
-              <a:rPr lang="ja-JP" altLang="en-US"/>
-              <a:t>実行．</a:t>
-            </a:r>
-            <a:endParaRPr lang="en-US" altLang="ja-JP" dirty="0"/>
-          </a:p>
-          <a:p>
-            <a:pPr lvl="1"/>
-            <a:r>
-              <a:rPr lang="en-US" altLang="ja-JP" dirty="0"/>
-              <a:t>95%PI</a:t>
-            </a:r>
-            <a:r>
-              <a:rPr lang="ja-JP" altLang="en-US"/>
-              <a:t>を計算して船</a:t>
-            </a:r>
-            <a:r>
-              <a:rPr lang="en-US" altLang="ja-JP" dirty="0"/>
-              <a:t>v1</a:t>
-            </a:r>
-            <a:r>
-              <a:rPr lang="ja-JP" altLang="en-US"/>
-              <a:t>に関して、漁獲データと合わせてプロット．モデルの予測区間の外側にデータがどれだけあるだろうか？</a:t>
-            </a:r>
-            <a:endParaRPr lang="en-US" altLang="ja-JP" dirty="0"/>
-          </a:p>
-          <a:p>
-            <a:endParaRPr kumimoji="1" lang="ja-JP" altLang="en-US"/>
+              <a:t>　→ランダム効果として解析．</a:t>
+            </a:r>
+            <a:endParaRPr kumimoji="1" lang="en-US" altLang="ja-JP" dirty="0"/>
           </a:p>
         </p:txBody>
       </p:sp>
     </p:spTree>
     <p:extLst>
       <p:ext uri="{BB962C8B-B14F-4D97-AF65-F5344CB8AC3E}">
-        <p14:creationId xmlns:p14="http://schemas.microsoft.com/office/powerpoint/2010/main" val="487569456"/>
+        <p14:creationId xmlns:p14="http://schemas.microsoft.com/office/powerpoint/2010/main" val="2859020871"/>
       </p:ext>
     </p:extLst>
   </p:cSld>

</xml_diff>